<commit_message>
372 folder with the project in his latest state. Currently working on it. Printing diplom ready.
</commit_message>
<xml_diff>
--- a/372/372.pptx
+++ b/372/372.pptx
@@ -12,13 +12,20 @@
   <p:sldIdLst>
     <p:sldId id="280" r:id="rId7"/>
     <p:sldId id="267" r:id="rId8"/>
-    <p:sldId id="275" r:id="rId9"/>
-    <p:sldId id="274" r:id="rId10"/>
-    <p:sldId id="276" r:id="rId11"/>
-    <p:sldId id="277" r:id="rId12"/>
-    <p:sldId id="278" r:id="rId13"/>
-    <p:sldId id="271" r:id="rId14"/>
-    <p:sldId id="272" r:id="rId15"/>
+    <p:sldId id="281" r:id="rId9"/>
+    <p:sldId id="275" r:id="rId10"/>
+    <p:sldId id="282" r:id="rId11"/>
+    <p:sldId id="274" r:id="rId12"/>
+    <p:sldId id="284" r:id="rId13"/>
+    <p:sldId id="276" r:id="rId14"/>
+    <p:sldId id="277" r:id="rId15"/>
+    <p:sldId id="278" r:id="rId16"/>
+    <p:sldId id="288" r:id="rId17"/>
+    <p:sldId id="271" r:id="rId18"/>
+    <p:sldId id="291" r:id="rId19"/>
+    <p:sldId id="272" r:id="rId20"/>
+    <p:sldId id="292" r:id="rId21"/>
+    <p:sldId id="293" r:id="rId22"/>
   </p:sldIdLst>
   <p:sldSz cx="9144000" cy="6858000" type="screen4x3"/>
   <p:notesSz cx="6858000" cy="9144000"/>
@@ -12898,8 +12905,8 @@
             <a:noFill/>
           </a:ln>
           <a:extLst>
-            <a:ext uri="{91240B29-F687-4f45-9708-019B960494DF}">
-              <a14:hiddenLine xmlns="" xmlns:a14="http://schemas.microsoft.com/office/drawing/2010/main" w="9525">
+            <a:ext uri="{91240B29-F687-4F45-9708-019B960494DF}">
+              <a14:hiddenLine xmlns:a14="http://schemas.microsoft.com/office/drawing/2010/main" w="9525">
                 <a:solidFill>
                   <a:srgbClr val="000000"/>
                 </a:solidFill>
@@ -12953,8 +12960,8 @@
             <a:noFill/>
           </a:ln>
           <a:extLst>
-            <a:ext uri="{91240B29-F687-4f45-9708-019B960494DF}">
-              <a14:hiddenLine xmlns="" xmlns:a14="http://schemas.microsoft.com/office/drawing/2010/main" w="9525">
+            <a:ext uri="{91240B29-F687-4F45-9708-019B960494DF}">
+              <a14:hiddenLine xmlns:a14="http://schemas.microsoft.com/office/drawing/2010/main" w="9525">
                 <a:solidFill>
                   <a:srgbClr val="000000"/>
                 </a:solidFill>
@@ -23885,14 +23892,1577 @@
   <p:clrMapOvr>
     <a:masterClrMapping/>
   </p:clrMapOvr>
-  <mc:AlternateContent xmlns:mc="http://schemas.openxmlformats.org/markup-compatibility/2006">
-    <mc:Choice xmlns:p14="http://schemas.microsoft.com/office/powerpoint/2010/main" Requires="p14">
+  <mc:AlternateContent xmlns:mc="http://schemas.openxmlformats.org/markup-compatibility/2006" xmlns:p14="http://schemas.microsoft.com/office/powerpoint/2010/main">
+    <mc:Choice Requires="p14">
       <p:transition spd="slow" p14:dur="2000"/>
     </mc:Choice>
-    <mc:Fallback>
+    <mc:Fallback xmlns="">
       <p:transition spd="slow"/>
     </mc:Fallback>
   </mc:AlternateContent>
+  <p:timing>
+    <p:tnLst>
+      <p:par>
+        <p:cTn id="1" dur="indefinite" restart="never" nodeType="tmRoot"/>
+      </p:par>
+    </p:tnLst>
+  </p:timing>
+</p:sld>
+</file>
+
+<file path=ppt/slides/slide10.xml><?xml version="1.0" encoding="utf-8"?>
+<p:sld xmlns:a="http://schemas.openxmlformats.org/drawingml/2006/main" xmlns:r="http://schemas.openxmlformats.org/officeDocument/2006/relationships" xmlns:p="http://schemas.openxmlformats.org/presentationml/2006/main">
+  <p:cSld>
+    <p:spTree>
+      <p:nvGrpSpPr>
+        <p:cNvPr id="1" name=""/>
+        <p:cNvGrpSpPr/>
+        <p:nvPr/>
+      </p:nvGrpSpPr>
+      <p:grpSpPr>
+        <a:xfrm>
+          <a:off x="0" y="0"/>
+          <a:ext cx="0" cy="0"/>
+          <a:chOff x="0" y="0"/>
+          <a:chExt cx="0" cy="0"/>
+        </a:xfrm>
+      </p:grpSpPr>
+      <p:sp>
+        <p:nvSpPr>
+          <p:cNvPr id="2" name="Title 1"/>
+          <p:cNvSpPr>
+            <a:spLocks noGrp="1"/>
+          </p:cNvSpPr>
+          <p:nvPr>
+            <p:ph type="title"/>
+          </p:nvPr>
+        </p:nvSpPr>
+        <p:spPr>
+          <a:xfrm>
+            <a:off x="982133" y="304800"/>
+            <a:ext cx="7704667" cy="609599"/>
+          </a:xfrm>
+        </p:spPr>
+        <p:txBody>
+          <a:bodyPr>
+            <a:noAutofit/>
+          </a:bodyPr>
+          <a:lstStyle/>
+          <a:p>
+            <a:endParaRPr lang="bg-BG" sz="4800" dirty="0"/>
+          </a:p>
+        </p:txBody>
+      </p:sp>
+      <p:sp>
+        <p:nvSpPr>
+          <p:cNvPr id="3" name="Content Placeholder 2"/>
+          <p:cNvSpPr>
+            <a:spLocks noGrp="1"/>
+          </p:cNvSpPr>
+          <p:nvPr>
+            <p:ph idx="1"/>
+          </p:nvPr>
+        </p:nvSpPr>
+        <p:spPr>
+          <a:xfrm>
+            <a:off x="982133" y="990600"/>
+            <a:ext cx="8161867" cy="5562599"/>
+          </a:xfrm>
+        </p:spPr>
+        <p:txBody>
+          <a:bodyPr>
+            <a:noAutofit/>
+          </a:bodyPr>
+          <a:lstStyle/>
+          <a:p>
+            <a:pPr marL="720725" lvl="0" indent="0" defTabSz="914400" fontAlgn="base">
+              <a:spcBef>
+                <a:spcPct val="0"/>
+              </a:spcBef>
+              <a:spcAft>
+                <a:spcPct val="0"/>
+              </a:spcAft>
+              <a:buClrTx/>
+              <a:buSzTx/>
+              <a:buNone/>
+            </a:pPr>
+            <a:r>
+              <a:rPr lang="ru-RU" sz="3000" dirty="0" smtClean="0">
+                <a:solidFill>
+                  <a:srgbClr val="1B75C7"/>
+                </a:solidFill>
+                <a:latin typeface="Arial" panose="020B0604020202020204" pitchFamily="34" charset="0"/>
+                <a:cs typeface="Arial" panose="020B0604020202020204" pitchFamily="34" charset="0"/>
+              </a:rPr>
+              <a:t>Дейности на програмата:</a:t>
+            </a:r>
+          </a:p>
+          <a:p>
+            <a:pPr marL="720725" lvl="0" indent="0" defTabSz="914400" fontAlgn="base">
+              <a:spcBef>
+                <a:spcPct val="0"/>
+              </a:spcBef>
+              <a:spcAft>
+                <a:spcPct val="0"/>
+              </a:spcAft>
+              <a:buClrTx/>
+              <a:buSzTx/>
+              <a:buNone/>
+            </a:pPr>
+            <a:r>
+              <a:rPr lang="ru-RU" sz="3200" dirty="0" smtClean="0">
+                <a:solidFill>
+                  <a:srgbClr val="1B75C7"/>
+                </a:solidFill>
+                <a:latin typeface="Arial" panose="020B0604020202020204" pitchFamily="34" charset="0"/>
+                <a:cs typeface="Arial" panose="020B0604020202020204" pitchFamily="34" charset="0"/>
+              </a:rPr>
+              <a:t> </a:t>
+            </a:r>
+          </a:p>
+          <a:p>
+            <a:pPr marL="1063625" lvl="0" indent="-342900" defTabSz="914400" fontAlgn="base">
+              <a:spcBef>
+                <a:spcPct val="0"/>
+              </a:spcBef>
+              <a:spcAft>
+                <a:spcPct val="0"/>
+              </a:spcAft>
+              <a:buClrTx/>
+              <a:buSzTx/>
+              <a:buFont typeface="Wingdings" panose="05000000000000000000" pitchFamily="2" charset="2"/>
+              <a:buChar char="ü"/>
+            </a:pPr>
+            <a:r>
+              <a:rPr lang="ru-RU" sz="2900" dirty="0" smtClean="0">
+                <a:solidFill>
+                  <a:srgbClr val="1B75C7"/>
+                </a:solidFill>
+                <a:latin typeface="Arial" panose="020B0604020202020204" pitchFamily="34" charset="0"/>
+                <a:cs typeface="Arial" panose="020B0604020202020204" pitchFamily="34" charset="0"/>
+              </a:rPr>
+              <a:t> Изчислява оценките</a:t>
+            </a:r>
+            <a:r>
+              <a:rPr lang="ru-RU" sz="2900" dirty="0">
+                <a:solidFill>
+                  <a:srgbClr val="1B75C7"/>
+                </a:solidFill>
+                <a:latin typeface="Arial" panose="020B0604020202020204" pitchFamily="34" charset="0"/>
+                <a:cs typeface="Arial" panose="020B0604020202020204" pitchFamily="34" charset="0"/>
+              </a:rPr>
+              <a:t>, които ще участват в </a:t>
+            </a:r>
+            <a:r>
+              <a:rPr lang="ru-RU" sz="2900" dirty="0" smtClean="0">
+                <a:solidFill>
+                  <a:srgbClr val="1B75C7"/>
+                </a:solidFill>
+                <a:latin typeface="Arial" panose="020B0604020202020204" pitchFamily="34" charset="0"/>
+                <a:cs typeface="Arial" panose="020B0604020202020204" pitchFamily="34" charset="0"/>
+              </a:rPr>
+              <a:t>дипломата;</a:t>
+            </a:r>
+            <a:endParaRPr lang="ru-RU" sz="2900" dirty="0">
+              <a:solidFill>
+                <a:srgbClr val="1B75C7"/>
+              </a:solidFill>
+              <a:latin typeface="Arial" panose="020B0604020202020204" pitchFamily="34" charset="0"/>
+              <a:cs typeface="Arial" panose="020B0604020202020204" pitchFamily="34" charset="0"/>
+            </a:endParaRPr>
+          </a:p>
+          <a:p>
+            <a:pPr marL="1063625" lvl="0" indent="-342900" defTabSz="914400" fontAlgn="base">
+              <a:spcBef>
+                <a:spcPct val="0"/>
+              </a:spcBef>
+              <a:spcAft>
+                <a:spcPct val="0"/>
+              </a:spcAft>
+              <a:buClrTx/>
+              <a:buSzTx/>
+              <a:buFont typeface="Wingdings" panose="05000000000000000000" pitchFamily="2" charset="2"/>
+              <a:buChar char="ü"/>
+            </a:pPr>
+            <a:r>
+              <a:rPr lang="ru-RU" sz="2900" dirty="0" smtClean="0">
+                <a:solidFill>
+                  <a:srgbClr val="1B75C7"/>
+                </a:solidFill>
+                <a:latin typeface="Arial" panose="020B0604020202020204" pitchFamily="34" charset="0"/>
+                <a:cs typeface="Arial" panose="020B0604020202020204" pitchFamily="34" charset="0"/>
+              </a:rPr>
+              <a:t> Изчислява средния </a:t>
+            </a:r>
+            <a:r>
+              <a:rPr lang="ru-RU" sz="2900" dirty="0">
+                <a:solidFill>
+                  <a:srgbClr val="1B75C7"/>
+                </a:solidFill>
+                <a:latin typeface="Arial" panose="020B0604020202020204" pitchFamily="34" charset="0"/>
+                <a:cs typeface="Arial" panose="020B0604020202020204" pitchFamily="34" charset="0"/>
+              </a:rPr>
+              <a:t>успех </a:t>
+            </a:r>
+            <a:r>
+              <a:rPr lang="ru-RU" sz="2900" dirty="0" smtClean="0">
+                <a:solidFill>
+                  <a:srgbClr val="1B75C7"/>
+                </a:solidFill>
+                <a:latin typeface="Arial" panose="020B0604020202020204" pitchFamily="34" charset="0"/>
+                <a:cs typeface="Arial" panose="020B0604020202020204" pitchFamily="34" charset="0"/>
+              </a:rPr>
+              <a:t>от </a:t>
+            </a:r>
+            <a:r>
+              <a:rPr lang="ru-RU" sz="2900" dirty="0">
+                <a:solidFill>
+                  <a:srgbClr val="1B75C7"/>
+                </a:solidFill>
+                <a:latin typeface="Arial" panose="020B0604020202020204" pitchFamily="34" charset="0"/>
+                <a:cs typeface="Arial" panose="020B0604020202020204" pitchFamily="34" charset="0"/>
+              </a:rPr>
+              <a:t>диплома за завършено средно </a:t>
+            </a:r>
+            <a:r>
+              <a:rPr lang="ru-RU" sz="2900" dirty="0" smtClean="0">
+                <a:solidFill>
+                  <a:srgbClr val="1B75C7"/>
+                </a:solidFill>
+                <a:latin typeface="Arial" panose="020B0604020202020204" pitchFamily="34" charset="0"/>
+                <a:cs typeface="Arial" panose="020B0604020202020204" pitchFamily="34" charset="0"/>
+              </a:rPr>
+              <a:t>образование;</a:t>
+            </a:r>
+          </a:p>
+          <a:p>
+            <a:pPr marL="1063625" lvl="0" indent="-342900" defTabSz="914400" fontAlgn="base">
+              <a:spcBef>
+                <a:spcPct val="0"/>
+              </a:spcBef>
+              <a:spcAft>
+                <a:spcPct val="0"/>
+              </a:spcAft>
+              <a:buClrTx/>
+              <a:buSzTx/>
+              <a:buFont typeface="Wingdings" panose="05000000000000000000" pitchFamily="2" charset="2"/>
+              <a:buChar char="ü"/>
+            </a:pPr>
+            <a:r>
+              <a:rPr lang="ru-RU" sz="2900" dirty="0" smtClean="0">
+                <a:solidFill>
+                  <a:srgbClr val="1B75C7"/>
+                </a:solidFill>
+                <a:latin typeface="Arial" panose="020B0604020202020204" pitchFamily="34" charset="0"/>
+                <a:cs typeface="Arial" panose="020B0604020202020204" pitchFamily="34" charset="0"/>
+              </a:rPr>
+              <a:t> Разпечатва документ с тези оценки, който може да послужи за вход на програмата АдминПро, чрез която официално се отпечатват дипломите.</a:t>
+            </a:r>
+            <a:endParaRPr lang="ru-RU" sz="2900" dirty="0">
+              <a:solidFill>
+                <a:srgbClr val="1B75C7"/>
+              </a:solidFill>
+              <a:latin typeface="Arial" panose="020B0604020202020204" pitchFamily="34" charset="0"/>
+              <a:cs typeface="Arial" panose="020B0604020202020204" pitchFamily="34" charset="0"/>
+            </a:endParaRPr>
+          </a:p>
+          <a:p>
+            <a:endParaRPr lang="bg-BG" sz="3200" dirty="0"/>
+          </a:p>
+        </p:txBody>
+      </p:sp>
+    </p:spTree>
+    <p:extLst>
+      <p:ext uri="{BB962C8B-B14F-4D97-AF65-F5344CB8AC3E}">
+        <p14:creationId xmlns:p14="http://schemas.microsoft.com/office/powerpoint/2010/main" val="2222802274"/>
+      </p:ext>
+    </p:extLst>
+  </p:cSld>
+  <p:clrMapOvr>
+    <a:masterClrMapping/>
+  </p:clrMapOvr>
+  <p:timing>
+    <p:tnLst>
+      <p:par>
+        <p:cTn id="1" dur="indefinite" restart="never" nodeType="tmRoot"/>
+      </p:par>
+    </p:tnLst>
+  </p:timing>
+</p:sld>
+</file>
+
+<file path=ppt/slides/slide11.xml><?xml version="1.0" encoding="utf-8"?>
+<p:sld xmlns:a="http://schemas.openxmlformats.org/drawingml/2006/main" xmlns:r="http://schemas.openxmlformats.org/officeDocument/2006/relationships" xmlns:p="http://schemas.openxmlformats.org/presentationml/2006/main">
+  <p:cSld>
+    <p:spTree>
+      <p:nvGrpSpPr>
+        <p:cNvPr id="1" name=""/>
+        <p:cNvGrpSpPr/>
+        <p:nvPr/>
+      </p:nvGrpSpPr>
+      <p:grpSpPr>
+        <a:xfrm>
+          <a:off x="0" y="0"/>
+          <a:ext cx="0" cy="0"/>
+          <a:chOff x="0" y="0"/>
+          <a:chExt cx="0" cy="0"/>
+        </a:xfrm>
+      </p:grpSpPr>
+      <p:sp>
+        <p:nvSpPr>
+          <p:cNvPr id="2" name="Title 1"/>
+          <p:cNvSpPr>
+            <a:spLocks noGrp="1"/>
+          </p:cNvSpPr>
+          <p:nvPr>
+            <p:ph type="title"/>
+          </p:nvPr>
+        </p:nvSpPr>
+        <p:spPr/>
+        <p:txBody>
+          <a:bodyPr>
+            <a:normAutofit/>
+          </a:bodyPr>
+          <a:lstStyle/>
+          <a:p>
+            <a:r>
+              <a:rPr lang="bg-BG" sz="6200" b="1" i="1" dirty="0" smtClean="0">
+                <a:solidFill>
+                  <a:schemeClr val="accent1">
+                    <a:lumMod val="75000"/>
+                  </a:schemeClr>
+                </a:solidFill>
+              </a:rPr>
+              <a:t>Използвани технологии</a:t>
+            </a:r>
+            <a:endParaRPr lang="en-US" sz="6200" b="1" i="1" dirty="0">
+              <a:solidFill>
+                <a:schemeClr val="accent1">
+                  <a:lumMod val="75000"/>
+                </a:schemeClr>
+              </a:solidFill>
+            </a:endParaRPr>
+          </a:p>
+        </p:txBody>
+      </p:sp>
+      <p:sp>
+        <p:nvSpPr>
+          <p:cNvPr id="3" name="Text Placeholder 2"/>
+          <p:cNvSpPr>
+            <a:spLocks noGrp="1"/>
+          </p:cNvSpPr>
+          <p:nvPr>
+            <p:ph type="body" idx="1"/>
+          </p:nvPr>
+        </p:nvSpPr>
+        <p:spPr/>
+        <p:txBody>
+          <a:bodyPr/>
+          <a:lstStyle/>
+          <a:p>
+            <a:endParaRPr lang="en-US"/>
+          </a:p>
+        </p:txBody>
+      </p:sp>
+    </p:spTree>
+    <p:extLst>
+      <p:ext uri="{BB962C8B-B14F-4D97-AF65-F5344CB8AC3E}">
+        <p14:creationId xmlns:p14="http://schemas.microsoft.com/office/powerpoint/2010/main" val="1220066995"/>
+      </p:ext>
+    </p:extLst>
+  </p:cSld>
+  <p:clrMapOvr>
+    <a:masterClrMapping/>
+  </p:clrMapOvr>
+  <p:timing>
+    <p:tnLst>
+      <p:par>
+        <p:cTn id="1" dur="indefinite" restart="never" nodeType="tmRoot"/>
+      </p:par>
+    </p:tnLst>
+  </p:timing>
+</p:sld>
+</file>
+
+<file path=ppt/slides/slide12.xml><?xml version="1.0" encoding="utf-8"?>
+<p:sld xmlns:a="http://schemas.openxmlformats.org/drawingml/2006/main" xmlns:r="http://schemas.openxmlformats.org/officeDocument/2006/relationships" xmlns:p="http://schemas.openxmlformats.org/presentationml/2006/main">
+  <p:cSld>
+    <p:bg>
+      <p:bgRef idx="1003">
+        <a:schemeClr val="bg2"/>
+      </p:bgRef>
+    </p:bg>
+    <p:spTree>
+      <p:nvGrpSpPr>
+        <p:cNvPr id="1" name=""/>
+        <p:cNvGrpSpPr/>
+        <p:nvPr/>
+      </p:nvGrpSpPr>
+      <p:grpSpPr>
+        <a:xfrm>
+          <a:off x="0" y="0"/>
+          <a:ext cx="0" cy="0"/>
+          <a:chOff x="0" y="0"/>
+          <a:chExt cx="0" cy="0"/>
+        </a:xfrm>
+      </p:grpSpPr>
+      <p:sp>
+        <p:nvSpPr>
+          <p:cNvPr id="2" name="Title 1"/>
+          <p:cNvSpPr>
+            <a:spLocks noGrp="1"/>
+          </p:cNvSpPr>
+          <p:nvPr>
+            <p:ph type="title"/>
+          </p:nvPr>
+        </p:nvSpPr>
+        <p:spPr>
+          <a:xfrm>
+            <a:off x="1219200" y="457201"/>
+            <a:ext cx="7467600" cy="914399"/>
+          </a:xfrm>
+        </p:spPr>
+        <p:txBody>
+          <a:bodyPr>
+            <a:normAutofit/>
+          </a:bodyPr>
+          <a:lstStyle/>
+          <a:p>
+            <a:endParaRPr lang="bg-BG" sz="4400" dirty="0">
+              <a:ln w="3175" cmpd="sng">
+                <a:solidFill>
+                  <a:schemeClr val="tx2">
+                    <a:lumMod val="50000"/>
+                    <a:lumOff val="50000"/>
+                  </a:schemeClr>
+                </a:solidFill>
+              </a:ln>
+              <a:solidFill>
+                <a:srgbClr val="4094E0"/>
+              </a:solidFill>
+              <a:effectLst>
+                <a:outerShdw blurRad="38100" dist="38100" dir="2700000" algn="tl">
+                  <a:srgbClr val="000000">
+                    <a:alpha val="43137"/>
+                  </a:srgbClr>
+                </a:outerShdw>
+              </a:effectLst>
+            </a:endParaRPr>
+          </a:p>
+        </p:txBody>
+      </p:sp>
+      <p:sp>
+        <p:nvSpPr>
+          <p:cNvPr id="3" name="Content Placeholder 2"/>
+          <p:cNvSpPr>
+            <a:spLocks noGrp="1"/>
+          </p:cNvSpPr>
+          <p:nvPr>
+            <p:ph idx="1"/>
+          </p:nvPr>
+        </p:nvSpPr>
+        <p:spPr>
+          <a:xfrm>
+            <a:off x="982133" y="1676400"/>
+            <a:ext cx="7704667" cy="3332816"/>
+          </a:xfrm>
+        </p:spPr>
+        <p:txBody>
+          <a:bodyPr>
+            <a:normAutofit fontScale="85000" lnSpcReduction="10000"/>
+          </a:bodyPr>
+          <a:lstStyle/>
+          <a:p>
+            <a:pPr marL="0" indent="0">
+              <a:buNone/>
+            </a:pPr>
+            <a:r>
+              <a:rPr lang="ru-RU" sz="3200" dirty="0" smtClean="0">
+                <a:solidFill>
+                  <a:srgbClr val="1B75C7"/>
+                </a:solidFill>
+                <a:latin typeface="Arial" charset="0"/>
+                <a:cs typeface="Arial" charset="0"/>
+              </a:rPr>
+              <a:t>	При </a:t>
+            </a:r>
+            <a:r>
+              <a:rPr lang="ru-RU" sz="3200" dirty="0">
+                <a:solidFill>
+                  <a:srgbClr val="1B75C7"/>
+                </a:solidFill>
+                <a:latin typeface="Arial" charset="0"/>
+                <a:cs typeface="Arial" charset="0"/>
+              </a:rPr>
+              <a:t>реализацията на проекта използвахме Microsoft SQL Server за създаване и поддържане на базата от </a:t>
+            </a:r>
+            <a:r>
+              <a:rPr lang="ru-RU" sz="3200" dirty="0" smtClean="0">
+                <a:solidFill>
+                  <a:srgbClr val="1B75C7"/>
+                </a:solidFill>
+                <a:latin typeface="Arial" charset="0"/>
+                <a:cs typeface="Arial" charset="0"/>
+              </a:rPr>
+              <a:t>данни и Microsoft </a:t>
+            </a:r>
+            <a:r>
+              <a:rPr lang="ru-RU" sz="3200" dirty="0">
+                <a:solidFill>
+                  <a:srgbClr val="1B75C7"/>
+                </a:solidFill>
+                <a:latin typeface="Arial" charset="0"/>
+                <a:cs typeface="Arial" charset="0"/>
+              </a:rPr>
+              <a:t>Visual Studio за </a:t>
+            </a:r>
+            <a:r>
+              <a:rPr lang="ru-RU" sz="3200" dirty="0" smtClean="0">
+                <a:solidFill>
+                  <a:srgbClr val="1B75C7"/>
+                </a:solidFill>
+                <a:latin typeface="Arial" charset="0"/>
+                <a:cs typeface="Arial" charset="0"/>
+              </a:rPr>
+              <a:t>осъществяване на интерфейса и бизнес-логиката. </a:t>
+            </a:r>
+          </a:p>
+          <a:p>
+            <a:pPr marL="0" indent="0">
+              <a:buNone/>
+            </a:pPr>
+            <a:endParaRPr lang="ru-RU" sz="3200" dirty="0">
+              <a:solidFill>
+                <a:srgbClr val="1B75C7"/>
+              </a:solidFill>
+              <a:latin typeface="Arial" charset="0"/>
+              <a:cs typeface="Arial" charset="0"/>
+            </a:endParaRPr>
+          </a:p>
+          <a:p>
+            <a:pPr marL="0" indent="0">
+              <a:buNone/>
+            </a:pPr>
+            <a:r>
+              <a:rPr lang="ru-RU" sz="3200" dirty="0" smtClean="0">
+                <a:solidFill>
+                  <a:srgbClr val="1B75C7"/>
+                </a:solidFill>
+                <a:latin typeface="Arial" charset="0"/>
+                <a:cs typeface="Arial" charset="0"/>
+              </a:rPr>
+              <a:t>	Програмният </a:t>
+            </a:r>
+            <a:r>
+              <a:rPr lang="ru-RU" sz="3200" dirty="0">
+                <a:solidFill>
+                  <a:srgbClr val="1B75C7"/>
+                </a:solidFill>
+                <a:latin typeface="Arial" charset="0"/>
+                <a:cs typeface="Arial" charset="0"/>
+              </a:rPr>
+              <a:t>код </a:t>
+            </a:r>
+            <a:r>
+              <a:rPr lang="ru-RU" sz="3200" dirty="0" smtClean="0">
+                <a:solidFill>
+                  <a:srgbClr val="1B75C7"/>
+                </a:solidFill>
+                <a:latin typeface="Arial" charset="0"/>
+                <a:cs typeface="Arial" charset="0"/>
+              </a:rPr>
+              <a:t>е на C#. </a:t>
+            </a:r>
+            <a:endParaRPr lang="bg-BG" sz="3200" dirty="0">
+              <a:solidFill>
+                <a:srgbClr val="1B75C7"/>
+              </a:solidFill>
+              <a:latin typeface="Arial" charset="0"/>
+              <a:cs typeface="Arial" charset="0"/>
+            </a:endParaRPr>
+          </a:p>
+        </p:txBody>
+      </p:sp>
+    </p:spTree>
+    <p:extLst>
+      <p:ext uri="{BB962C8B-B14F-4D97-AF65-F5344CB8AC3E}">
+        <p14:creationId xmlns:p14="http://schemas.microsoft.com/office/powerpoint/2010/main" val="243558547"/>
+      </p:ext>
+    </p:extLst>
+  </p:cSld>
+  <p:clrMapOvr>
+    <a:overrideClrMapping bg1="lt1" tx1="dk1" bg2="lt2" tx2="dk2" accent1="accent1" accent2="accent2" accent3="accent3" accent4="accent4" accent5="accent5" accent6="accent6" hlink="hlink" folHlink="folHlink"/>
+  </p:clrMapOvr>
+  <p:timing>
+    <p:tnLst>
+      <p:par>
+        <p:cTn id="1" dur="indefinite" restart="never" nodeType="tmRoot"/>
+      </p:par>
+    </p:tnLst>
+  </p:timing>
+</p:sld>
+</file>
+
+<file path=ppt/slides/slide13.xml><?xml version="1.0" encoding="utf-8"?>
+<p:sld xmlns:a="http://schemas.openxmlformats.org/drawingml/2006/main" xmlns:r="http://schemas.openxmlformats.org/officeDocument/2006/relationships" xmlns:p="http://schemas.openxmlformats.org/presentationml/2006/main">
+  <p:cSld>
+    <p:spTree>
+      <p:nvGrpSpPr>
+        <p:cNvPr id="1" name=""/>
+        <p:cNvGrpSpPr/>
+        <p:nvPr/>
+      </p:nvGrpSpPr>
+      <p:grpSpPr>
+        <a:xfrm>
+          <a:off x="0" y="0"/>
+          <a:ext cx="0" cy="0"/>
+          <a:chOff x="0" y="0"/>
+          <a:chExt cx="0" cy="0"/>
+        </a:xfrm>
+      </p:grpSpPr>
+      <p:sp>
+        <p:nvSpPr>
+          <p:cNvPr id="2" name="Title 1"/>
+          <p:cNvSpPr>
+            <a:spLocks noGrp="1"/>
+          </p:cNvSpPr>
+          <p:nvPr>
+            <p:ph type="title"/>
+          </p:nvPr>
+        </p:nvSpPr>
+        <p:spPr/>
+        <p:txBody>
+          <a:bodyPr>
+            <a:normAutofit/>
+          </a:bodyPr>
+          <a:lstStyle/>
+          <a:p>
+            <a:r>
+              <a:rPr lang="bg-BG" sz="6200" b="1" i="1" dirty="0" smtClean="0">
+                <a:solidFill>
+                  <a:schemeClr val="accent1">
+                    <a:lumMod val="75000"/>
+                  </a:schemeClr>
+                </a:solidFill>
+              </a:rPr>
+              <a:t>Заключение</a:t>
+            </a:r>
+            <a:endParaRPr lang="en-US" sz="6200" b="1" i="1" dirty="0">
+              <a:solidFill>
+                <a:schemeClr val="accent1">
+                  <a:lumMod val="75000"/>
+                </a:schemeClr>
+              </a:solidFill>
+            </a:endParaRPr>
+          </a:p>
+        </p:txBody>
+      </p:sp>
+      <p:sp>
+        <p:nvSpPr>
+          <p:cNvPr id="3" name="Text Placeholder 2"/>
+          <p:cNvSpPr>
+            <a:spLocks noGrp="1"/>
+          </p:cNvSpPr>
+          <p:nvPr>
+            <p:ph type="body" idx="1"/>
+          </p:nvPr>
+        </p:nvSpPr>
+        <p:spPr/>
+        <p:txBody>
+          <a:bodyPr/>
+          <a:lstStyle/>
+          <a:p>
+            <a:endParaRPr lang="en-US"/>
+          </a:p>
+        </p:txBody>
+      </p:sp>
+    </p:spTree>
+    <p:extLst>
+      <p:ext uri="{BB962C8B-B14F-4D97-AF65-F5344CB8AC3E}">
+        <p14:creationId xmlns:p14="http://schemas.microsoft.com/office/powerpoint/2010/main" val="1578359462"/>
+      </p:ext>
+    </p:extLst>
+  </p:cSld>
+  <p:clrMapOvr>
+    <a:masterClrMapping/>
+  </p:clrMapOvr>
+  <p:timing>
+    <p:tnLst>
+      <p:par>
+        <p:cTn id="1" dur="indefinite" restart="never" nodeType="tmRoot"/>
+      </p:par>
+    </p:tnLst>
+  </p:timing>
+</p:sld>
+</file>
+
+<file path=ppt/slides/slide14.xml><?xml version="1.0" encoding="utf-8"?>
+<p:sld xmlns:a="http://schemas.openxmlformats.org/drawingml/2006/main" xmlns:r="http://schemas.openxmlformats.org/officeDocument/2006/relationships" xmlns:p="http://schemas.openxmlformats.org/presentationml/2006/main">
+  <p:cSld>
+    <p:bg>
+      <p:bgRef idx="1003">
+        <a:schemeClr val="bg2"/>
+      </p:bgRef>
+    </p:bg>
+    <p:spTree>
+      <p:nvGrpSpPr>
+        <p:cNvPr id="1" name=""/>
+        <p:cNvGrpSpPr/>
+        <p:nvPr/>
+      </p:nvGrpSpPr>
+      <p:grpSpPr>
+        <a:xfrm>
+          <a:off x="0" y="0"/>
+          <a:ext cx="0" cy="0"/>
+          <a:chOff x="0" y="0"/>
+          <a:chExt cx="0" cy="0"/>
+        </a:xfrm>
+      </p:grpSpPr>
+      <p:sp>
+        <p:nvSpPr>
+          <p:cNvPr id="2" name="Title 1"/>
+          <p:cNvSpPr>
+            <a:spLocks noGrp="1"/>
+          </p:cNvSpPr>
+          <p:nvPr>
+            <p:ph type="title"/>
+          </p:nvPr>
+        </p:nvSpPr>
+        <p:spPr>
+          <a:xfrm>
+            <a:off x="1367366" y="228600"/>
+            <a:ext cx="7315200" cy="838199"/>
+          </a:xfrm>
+        </p:spPr>
+        <p:txBody>
+          <a:bodyPr>
+            <a:normAutofit/>
+          </a:bodyPr>
+          <a:lstStyle/>
+          <a:p>
+            <a:endParaRPr lang="bg-BG" sz="4800" dirty="0">
+              <a:ln w="3175" cmpd="sng">
+                <a:solidFill>
+                  <a:schemeClr val="tx2">
+                    <a:lumMod val="50000"/>
+                    <a:lumOff val="50000"/>
+                  </a:schemeClr>
+                </a:solidFill>
+              </a:ln>
+              <a:solidFill>
+                <a:srgbClr val="4094E0"/>
+              </a:solidFill>
+              <a:effectLst>
+                <a:outerShdw blurRad="38100" dist="38100" dir="2700000" algn="tl">
+                  <a:srgbClr val="000000">
+                    <a:alpha val="43137"/>
+                  </a:srgbClr>
+                </a:outerShdw>
+              </a:effectLst>
+            </a:endParaRPr>
+          </a:p>
+        </p:txBody>
+      </p:sp>
+      <p:sp>
+        <p:nvSpPr>
+          <p:cNvPr id="3" name="Content Placeholder 2"/>
+          <p:cNvSpPr>
+            <a:spLocks noGrp="1"/>
+          </p:cNvSpPr>
+          <p:nvPr>
+            <p:ph idx="1"/>
+          </p:nvPr>
+        </p:nvSpPr>
+        <p:spPr>
+          <a:xfrm>
+            <a:off x="1600200" y="1066799"/>
+            <a:ext cx="7467600" cy="5562601"/>
+          </a:xfrm>
+        </p:spPr>
+        <p:txBody>
+          <a:bodyPr>
+            <a:noAutofit/>
+          </a:bodyPr>
+          <a:lstStyle/>
+          <a:p>
+            <a:pPr marL="0" indent="0">
+              <a:buNone/>
+            </a:pPr>
+            <a:r>
+              <a:rPr lang="bg-BG" sz="2800" dirty="0" smtClean="0">
+                <a:solidFill>
+                  <a:srgbClr val="1B75C7"/>
+                </a:solidFill>
+                <a:latin typeface="Arial" charset="0"/>
+                <a:cs typeface="Arial" charset="0"/>
+              </a:rPr>
+              <a:t>	</a:t>
+            </a:r>
+            <a:r>
+              <a:rPr lang="en-US" sz="2600" dirty="0" err="1" smtClean="0">
+                <a:solidFill>
+                  <a:srgbClr val="1B75C7"/>
+                </a:solidFill>
+                <a:latin typeface="Arial" charset="0"/>
+                <a:cs typeface="Arial" charset="0"/>
+              </a:rPr>
+              <a:t>Прилож</a:t>
+            </a:r>
+            <a:r>
+              <a:rPr lang="bg-BG" sz="2600" dirty="0">
+                <a:solidFill>
+                  <a:srgbClr val="1B75C7"/>
+                </a:solidFill>
+                <a:latin typeface="Arial" charset="0"/>
+                <a:cs typeface="Arial" charset="0"/>
+              </a:rPr>
+              <a:t>ната програма</a:t>
+            </a:r>
+            <a:r>
+              <a:rPr lang="en-US" sz="2600" dirty="0">
+                <a:solidFill>
+                  <a:srgbClr val="1B75C7"/>
+                </a:solidFill>
+                <a:latin typeface="Arial" charset="0"/>
+                <a:cs typeface="Arial" charset="0"/>
+              </a:rPr>
+              <a:t> напълно автоматизира воденето на личния картон на </a:t>
+            </a:r>
+            <a:r>
+              <a:rPr lang="en-US" sz="2600" dirty="0" smtClean="0">
+                <a:solidFill>
+                  <a:srgbClr val="1B75C7"/>
+                </a:solidFill>
+                <a:latin typeface="Arial" charset="0"/>
+                <a:cs typeface="Arial" charset="0"/>
+              </a:rPr>
+              <a:t>ученика</a:t>
+            </a:r>
+            <a:r>
+              <a:rPr lang="bg-BG" sz="2600" dirty="0" smtClean="0">
+                <a:solidFill>
+                  <a:srgbClr val="1B75C7"/>
+                </a:solidFill>
+                <a:latin typeface="Arial" charset="0"/>
+                <a:cs typeface="Arial" charset="0"/>
+              </a:rPr>
+              <a:t>.</a:t>
+            </a:r>
+            <a:r>
+              <a:rPr lang="en-US" sz="2600" dirty="0" smtClean="0">
+                <a:solidFill>
+                  <a:srgbClr val="1B75C7"/>
+                </a:solidFill>
+                <a:latin typeface="Arial" charset="0"/>
+                <a:cs typeface="Arial" charset="0"/>
+              </a:rPr>
+              <a:t> </a:t>
+            </a:r>
+            <a:endParaRPr lang="bg-BG" sz="2600" dirty="0" smtClean="0">
+              <a:solidFill>
+                <a:srgbClr val="1B75C7"/>
+              </a:solidFill>
+              <a:latin typeface="Arial" charset="0"/>
+              <a:cs typeface="Arial" charset="0"/>
+            </a:endParaRPr>
+          </a:p>
+          <a:p>
+            <a:pPr>
+              <a:buFont typeface="Wingdings" panose="05000000000000000000" pitchFamily="2" charset="2"/>
+              <a:buChar char="ü"/>
+            </a:pPr>
+            <a:r>
+              <a:rPr lang="bg-BG" sz="2600" dirty="0" smtClean="0">
+                <a:solidFill>
+                  <a:srgbClr val="1B75C7"/>
+                </a:solidFill>
+                <a:latin typeface="Arial" charset="0"/>
+                <a:cs typeface="Arial" charset="0"/>
+              </a:rPr>
+              <a:t> </a:t>
+            </a:r>
+            <a:r>
+              <a:rPr lang="bg-BG" dirty="0" smtClean="0">
+                <a:solidFill>
+                  <a:srgbClr val="1B75C7"/>
+                </a:solidFill>
+                <a:latin typeface="Arial" charset="0"/>
+                <a:cs typeface="Arial" charset="0"/>
+              </a:rPr>
+              <a:t>Справя се с въвеждането/извичането на оценки и отсъствия. </a:t>
+            </a:r>
+          </a:p>
+          <a:p>
+            <a:pPr>
+              <a:buFont typeface="Wingdings" panose="05000000000000000000" pitchFamily="2" charset="2"/>
+              <a:buChar char="ü"/>
+            </a:pPr>
+            <a:r>
+              <a:rPr lang="bg-BG" dirty="0" smtClean="0">
+                <a:solidFill>
+                  <a:srgbClr val="1B75C7"/>
+                </a:solidFill>
+                <a:latin typeface="Arial" charset="0"/>
+                <a:cs typeface="Arial" charset="0"/>
+              </a:rPr>
+              <a:t> Изчислява крайния успех на целия випуск ученици и успешно действа при въвеждане на всяка една от предишно споменатите дейности.</a:t>
+            </a:r>
+          </a:p>
+          <a:p>
+            <a:pPr>
+              <a:buFont typeface="Wingdings" panose="05000000000000000000" pitchFamily="2" charset="2"/>
+              <a:buChar char="ü"/>
+            </a:pPr>
+            <a:r>
+              <a:rPr lang="bg-BG" dirty="0" smtClean="0">
+                <a:solidFill>
+                  <a:srgbClr val="1B75C7"/>
+                </a:solidFill>
+                <a:latin typeface="Arial" charset="0"/>
+                <a:cs typeface="Arial" charset="0"/>
+              </a:rPr>
+              <a:t> Работата на учителя е напълно автоматизирана, позволяваща му по-ефикасно водене на ученическия дневник и следователно улесняваща служебните му задължения.</a:t>
+            </a:r>
+          </a:p>
+          <a:p>
+            <a:pPr marL="0" indent="0">
+              <a:buNone/>
+            </a:pPr>
+            <a:endParaRPr lang="bg-BG" sz="2800" dirty="0">
+              <a:solidFill>
+                <a:srgbClr val="1B75C7"/>
+              </a:solidFill>
+              <a:latin typeface="Arial" charset="0"/>
+              <a:cs typeface="Arial" charset="0"/>
+            </a:endParaRPr>
+          </a:p>
+        </p:txBody>
+      </p:sp>
+    </p:spTree>
+    <p:extLst>
+      <p:ext uri="{BB962C8B-B14F-4D97-AF65-F5344CB8AC3E}">
+        <p14:creationId xmlns:p14="http://schemas.microsoft.com/office/powerpoint/2010/main" val="1961729163"/>
+      </p:ext>
+    </p:extLst>
+  </p:cSld>
+  <p:clrMapOvr>
+    <a:overrideClrMapping bg1="lt1" tx1="dk1" bg2="lt2" tx2="dk2" accent1="accent1" accent2="accent2" accent3="accent3" accent4="accent4" accent5="accent5" accent6="accent6" hlink="hlink" folHlink="folHlink"/>
+  </p:clrMapOvr>
+  <p:timing>
+    <p:tnLst>
+      <p:par>
+        <p:cTn id="1" dur="indefinite" restart="never" nodeType="tmRoot"/>
+      </p:par>
+    </p:tnLst>
+  </p:timing>
+</p:sld>
+</file>
+
+<file path=ppt/slides/slide15.xml><?xml version="1.0" encoding="utf-8"?>
+<p:sld xmlns:a="http://schemas.openxmlformats.org/drawingml/2006/main" xmlns:r="http://schemas.openxmlformats.org/officeDocument/2006/relationships" xmlns:p="http://schemas.openxmlformats.org/presentationml/2006/main">
+  <p:cSld>
+    <p:spTree>
+      <p:nvGrpSpPr>
+        <p:cNvPr id="1" name=""/>
+        <p:cNvGrpSpPr/>
+        <p:nvPr/>
+      </p:nvGrpSpPr>
+      <p:grpSpPr>
+        <a:xfrm>
+          <a:off x="0" y="0"/>
+          <a:ext cx="0" cy="0"/>
+          <a:chOff x="0" y="0"/>
+          <a:chExt cx="0" cy="0"/>
+        </a:xfrm>
+      </p:grpSpPr>
+      <p:sp>
+        <p:nvSpPr>
+          <p:cNvPr id="2" name="Title 1"/>
+          <p:cNvSpPr>
+            <a:spLocks noGrp="1"/>
+          </p:cNvSpPr>
+          <p:nvPr>
+            <p:ph type="ctrTitle"/>
+          </p:nvPr>
+        </p:nvSpPr>
+        <p:spPr/>
+        <p:txBody>
+          <a:bodyPr>
+            <a:normAutofit fontScale="90000"/>
+          </a:bodyPr>
+          <a:lstStyle/>
+          <a:p>
+            <a:pPr algn="l"/>
+            <a:r>
+              <a:rPr lang="bg-BG" sz="2900" dirty="0">
+                <a:solidFill>
+                  <a:srgbClr val="1B75C7"/>
+                </a:solidFill>
+                <a:latin typeface="Arial" charset="0"/>
+                <a:cs typeface="Arial" charset="0"/>
+              </a:rPr>
+              <a:t/>
+            </a:r>
+            <a:br>
+              <a:rPr lang="bg-BG" sz="2900" dirty="0">
+                <a:solidFill>
+                  <a:srgbClr val="1B75C7"/>
+                </a:solidFill>
+                <a:latin typeface="Arial" charset="0"/>
+                <a:cs typeface="Arial" charset="0"/>
+              </a:rPr>
+            </a:br>
+            <a:r>
+              <a:rPr lang="bg-BG" sz="2400" dirty="0" smtClean="0">
+                <a:solidFill>
+                  <a:srgbClr val="1B75C7"/>
+                </a:solidFill>
+                <a:latin typeface="Arial" charset="0"/>
+                <a:cs typeface="Arial" charset="0"/>
+              </a:rPr>
+              <a:t/>
+            </a:r>
+            <a:br>
+              <a:rPr lang="bg-BG" sz="2400" dirty="0" smtClean="0">
+                <a:solidFill>
+                  <a:srgbClr val="1B75C7"/>
+                </a:solidFill>
+                <a:latin typeface="Arial" charset="0"/>
+                <a:cs typeface="Arial" charset="0"/>
+              </a:rPr>
+            </a:br>
+            <a:r>
+              <a:rPr lang="bg-BG" sz="2400" dirty="0">
+                <a:solidFill>
+                  <a:srgbClr val="1B75C7"/>
+                </a:solidFill>
+                <a:latin typeface="Arial" charset="0"/>
+                <a:cs typeface="Arial" charset="0"/>
+              </a:rPr>
+              <a:t/>
+            </a:r>
+            <a:br>
+              <a:rPr lang="bg-BG" sz="2400" dirty="0">
+                <a:solidFill>
+                  <a:srgbClr val="1B75C7"/>
+                </a:solidFill>
+                <a:latin typeface="Arial" charset="0"/>
+                <a:cs typeface="Arial" charset="0"/>
+              </a:rPr>
+            </a:br>
+            <a:r>
+              <a:rPr lang="bg-BG" sz="2400" dirty="0" smtClean="0">
+                <a:solidFill>
+                  <a:srgbClr val="1B75C7"/>
+                </a:solidFill>
+                <a:latin typeface="Arial" charset="0"/>
+                <a:cs typeface="Arial" charset="0"/>
+              </a:rPr>
+              <a:t>	</a:t>
+            </a:r>
+            <a:r>
+              <a:rPr lang="en-US" sz="2400" dirty="0" err="1" smtClean="0">
+                <a:solidFill>
+                  <a:srgbClr val="1B75C7"/>
+                </a:solidFill>
+                <a:latin typeface="Arial" charset="0"/>
+                <a:cs typeface="Arial" charset="0"/>
+              </a:rPr>
+              <a:t>Натрупаните</a:t>
+            </a:r>
+            <a:r>
+              <a:rPr lang="en-US" sz="2400" dirty="0" smtClean="0">
+                <a:solidFill>
+                  <a:srgbClr val="1B75C7"/>
+                </a:solidFill>
+                <a:latin typeface="Arial" charset="0"/>
+                <a:cs typeface="Arial" charset="0"/>
+              </a:rPr>
+              <a:t> </a:t>
+            </a:r>
+            <a:r>
+              <a:rPr lang="en-US" sz="2400" dirty="0">
+                <a:solidFill>
+                  <a:srgbClr val="1B75C7"/>
+                </a:solidFill>
+                <a:latin typeface="Arial" charset="0"/>
+                <a:cs typeface="Arial" charset="0"/>
+              </a:rPr>
+              <a:t>в </a:t>
+            </a:r>
+            <a:r>
+              <a:rPr lang="en-US" sz="2400" dirty="0" err="1">
+                <a:solidFill>
+                  <a:srgbClr val="1B75C7"/>
+                </a:solidFill>
+                <a:latin typeface="Arial" charset="0"/>
+                <a:cs typeface="Arial" charset="0"/>
+              </a:rPr>
+              <a:t>продължение</a:t>
+            </a:r>
+            <a:r>
+              <a:rPr lang="en-US" sz="2400" dirty="0">
+                <a:solidFill>
+                  <a:srgbClr val="1B75C7"/>
+                </a:solidFill>
+                <a:latin typeface="Arial" charset="0"/>
+                <a:cs typeface="Arial" charset="0"/>
+              </a:rPr>
+              <a:t> </a:t>
+            </a:r>
+            <a:r>
+              <a:rPr lang="en-US" sz="2400" dirty="0" err="1">
+                <a:solidFill>
+                  <a:srgbClr val="1B75C7"/>
+                </a:solidFill>
+                <a:latin typeface="Arial" charset="0"/>
+                <a:cs typeface="Arial" charset="0"/>
+              </a:rPr>
+              <a:t>на</a:t>
+            </a:r>
+            <a:r>
+              <a:rPr lang="en-US" sz="2400" dirty="0">
+                <a:solidFill>
+                  <a:srgbClr val="1B75C7"/>
+                </a:solidFill>
+                <a:latin typeface="Arial" charset="0"/>
+                <a:cs typeface="Arial" charset="0"/>
+              </a:rPr>
+              <a:t> 4 </a:t>
+            </a:r>
+            <a:r>
+              <a:rPr lang="en-US" sz="2400" dirty="0" err="1">
+                <a:solidFill>
+                  <a:srgbClr val="1B75C7"/>
+                </a:solidFill>
+                <a:latin typeface="Arial" charset="0"/>
+                <a:cs typeface="Arial" charset="0"/>
+              </a:rPr>
+              <a:t>години</a:t>
+            </a:r>
+            <a:r>
+              <a:rPr lang="en-US" sz="2400" dirty="0">
+                <a:solidFill>
+                  <a:srgbClr val="1B75C7"/>
+                </a:solidFill>
+                <a:latin typeface="Arial" charset="0"/>
+                <a:cs typeface="Arial" charset="0"/>
+              </a:rPr>
+              <a:t> </a:t>
+            </a:r>
+            <a:r>
+              <a:rPr lang="en-US" sz="2400" dirty="0" err="1">
+                <a:solidFill>
+                  <a:srgbClr val="1B75C7"/>
+                </a:solidFill>
+                <a:latin typeface="Arial" charset="0"/>
+                <a:cs typeface="Arial" charset="0"/>
+              </a:rPr>
+              <a:t>данни</a:t>
+            </a:r>
+            <a:r>
+              <a:rPr lang="en-US" sz="2400" dirty="0">
+                <a:solidFill>
+                  <a:srgbClr val="1B75C7"/>
+                </a:solidFill>
+                <a:latin typeface="Arial" charset="0"/>
+                <a:cs typeface="Arial" charset="0"/>
+              </a:rPr>
+              <a:t> в </a:t>
+            </a:r>
+            <a:r>
+              <a:rPr lang="en-US" sz="2400" dirty="0" err="1">
+                <a:solidFill>
+                  <a:srgbClr val="1B75C7"/>
+                </a:solidFill>
+                <a:latin typeface="Arial" charset="0"/>
+                <a:cs typeface="Arial" charset="0"/>
+              </a:rPr>
+              <a:t>базата</a:t>
+            </a:r>
+            <a:r>
+              <a:rPr lang="en-US" sz="2400" dirty="0">
+                <a:solidFill>
+                  <a:srgbClr val="1B75C7"/>
+                </a:solidFill>
+                <a:latin typeface="Arial" charset="0"/>
+                <a:cs typeface="Arial" charset="0"/>
+              </a:rPr>
+              <a:t> </a:t>
+            </a:r>
+            <a:r>
+              <a:rPr lang="en-US" sz="2400" dirty="0" err="1">
+                <a:solidFill>
+                  <a:srgbClr val="1B75C7"/>
+                </a:solidFill>
+                <a:latin typeface="Arial" charset="0"/>
+                <a:cs typeface="Arial" charset="0"/>
+              </a:rPr>
+              <a:t>се</a:t>
+            </a:r>
+            <a:r>
+              <a:rPr lang="en-US" sz="2400" dirty="0">
+                <a:solidFill>
+                  <a:srgbClr val="1B75C7"/>
+                </a:solidFill>
+                <a:latin typeface="Arial" charset="0"/>
+                <a:cs typeface="Arial" charset="0"/>
+              </a:rPr>
+              <a:t> </a:t>
+            </a:r>
+            <a:r>
+              <a:rPr lang="en-US" sz="2400" dirty="0" err="1">
+                <a:solidFill>
+                  <a:srgbClr val="1B75C7"/>
+                </a:solidFill>
+                <a:latin typeface="Arial" charset="0"/>
+                <a:cs typeface="Arial" charset="0"/>
+              </a:rPr>
+              <a:t>пренасят</a:t>
+            </a:r>
+            <a:r>
+              <a:rPr lang="en-US" sz="2400" dirty="0">
+                <a:solidFill>
+                  <a:srgbClr val="1B75C7"/>
+                </a:solidFill>
+                <a:latin typeface="Arial" charset="0"/>
+                <a:cs typeface="Arial" charset="0"/>
+              </a:rPr>
+              <a:t>  </a:t>
+            </a:r>
+            <a:r>
+              <a:rPr lang="en-US" sz="2400" dirty="0" err="1">
+                <a:solidFill>
+                  <a:srgbClr val="1B75C7"/>
+                </a:solidFill>
+                <a:latin typeface="Arial" charset="0"/>
+                <a:cs typeface="Arial" charset="0"/>
+              </a:rPr>
+              <a:t>автоматично</a:t>
+            </a:r>
+            <a:r>
+              <a:rPr lang="en-US" sz="2400" dirty="0">
+                <a:solidFill>
+                  <a:srgbClr val="1B75C7"/>
+                </a:solidFill>
+                <a:latin typeface="Arial" charset="0"/>
+                <a:cs typeface="Arial" charset="0"/>
+              </a:rPr>
+              <a:t>, </a:t>
+            </a:r>
+            <a:r>
+              <a:rPr lang="en-US" sz="2400" dirty="0" err="1">
+                <a:solidFill>
+                  <a:srgbClr val="1B75C7"/>
+                </a:solidFill>
+                <a:latin typeface="Arial" charset="0"/>
+                <a:cs typeface="Arial" charset="0"/>
+              </a:rPr>
+              <a:t>за</a:t>
+            </a:r>
+            <a:r>
+              <a:rPr lang="en-US" sz="2400" dirty="0">
+                <a:solidFill>
+                  <a:srgbClr val="1B75C7"/>
+                </a:solidFill>
+                <a:latin typeface="Arial" charset="0"/>
+                <a:cs typeface="Arial" charset="0"/>
+              </a:rPr>
+              <a:t> </a:t>
+            </a:r>
+            <a:r>
+              <a:rPr lang="en-US" sz="2400" dirty="0" err="1">
+                <a:solidFill>
+                  <a:srgbClr val="1B75C7"/>
+                </a:solidFill>
+                <a:latin typeface="Arial" charset="0"/>
+                <a:cs typeface="Arial" charset="0"/>
+              </a:rPr>
+              <a:t>да</a:t>
+            </a:r>
+            <a:r>
+              <a:rPr lang="en-US" sz="2400" dirty="0">
+                <a:solidFill>
+                  <a:srgbClr val="1B75C7"/>
+                </a:solidFill>
+                <a:latin typeface="Arial" charset="0"/>
+                <a:cs typeface="Arial" charset="0"/>
+              </a:rPr>
+              <a:t> </a:t>
+            </a:r>
+            <a:r>
+              <a:rPr lang="en-US" sz="2400" dirty="0" err="1">
+                <a:solidFill>
+                  <a:srgbClr val="1B75C7"/>
+                </a:solidFill>
+                <a:latin typeface="Arial" charset="0"/>
+                <a:cs typeface="Arial" charset="0"/>
+              </a:rPr>
+              <a:t>се</a:t>
+            </a:r>
+            <a:r>
+              <a:rPr lang="en-US" sz="2400" dirty="0">
+                <a:solidFill>
+                  <a:srgbClr val="1B75C7"/>
+                </a:solidFill>
+                <a:latin typeface="Arial" charset="0"/>
+                <a:cs typeface="Arial" charset="0"/>
+              </a:rPr>
+              <a:t> </a:t>
+            </a:r>
+            <a:r>
+              <a:rPr lang="en-US" sz="2400" dirty="0" err="1">
+                <a:solidFill>
+                  <a:srgbClr val="1B75C7"/>
+                </a:solidFill>
+                <a:latin typeface="Arial" charset="0"/>
+                <a:cs typeface="Arial" charset="0"/>
+              </a:rPr>
+              <a:t>изчислят</a:t>
+            </a:r>
+            <a:r>
+              <a:rPr lang="en-US" sz="2400" dirty="0">
+                <a:solidFill>
+                  <a:srgbClr val="1B75C7"/>
+                </a:solidFill>
+                <a:latin typeface="Arial" charset="0"/>
+                <a:cs typeface="Arial" charset="0"/>
+              </a:rPr>
+              <a:t> </a:t>
+            </a:r>
+            <a:r>
+              <a:rPr lang="en-US" sz="2400" dirty="0" err="1">
+                <a:solidFill>
+                  <a:srgbClr val="1B75C7"/>
+                </a:solidFill>
+                <a:latin typeface="Arial" charset="0"/>
+                <a:cs typeface="Arial" charset="0"/>
+              </a:rPr>
+              <a:t>окончателните</a:t>
+            </a:r>
+            <a:r>
+              <a:rPr lang="en-US" sz="2400" dirty="0">
+                <a:solidFill>
+                  <a:srgbClr val="1B75C7"/>
+                </a:solidFill>
+                <a:latin typeface="Arial" charset="0"/>
+                <a:cs typeface="Arial" charset="0"/>
+              </a:rPr>
+              <a:t> </a:t>
+            </a:r>
+            <a:r>
+              <a:rPr lang="en-US" sz="2400" dirty="0" err="1">
+                <a:solidFill>
+                  <a:srgbClr val="1B75C7"/>
+                </a:solidFill>
+                <a:latin typeface="Arial" charset="0"/>
+                <a:cs typeface="Arial" charset="0"/>
+              </a:rPr>
+              <a:t>оценки</a:t>
+            </a:r>
+            <a:r>
+              <a:rPr lang="en-US" sz="2400" dirty="0">
+                <a:solidFill>
+                  <a:srgbClr val="1B75C7"/>
+                </a:solidFill>
+                <a:latin typeface="Arial" charset="0"/>
+                <a:cs typeface="Arial" charset="0"/>
+              </a:rPr>
+              <a:t> </a:t>
+            </a:r>
+            <a:r>
+              <a:rPr lang="en-US" sz="2400" dirty="0" err="1">
+                <a:solidFill>
+                  <a:srgbClr val="1B75C7"/>
+                </a:solidFill>
+                <a:latin typeface="Arial" charset="0"/>
+                <a:cs typeface="Arial" charset="0"/>
+              </a:rPr>
+              <a:t>за</a:t>
+            </a:r>
+            <a:r>
+              <a:rPr lang="en-US" sz="2400" dirty="0">
+                <a:solidFill>
+                  <a:srgbClr val="1B75C7"/>
+                </a:solidFill>
+                <a:latin typeface="Arial" charset="0"/>
+                <a:cs typeface="Arial" charset="0"/>
+              </a:rPr>
+              <a:t> </a:t>
+            </a:r>
+            <a:r>
+              <a:rPr lang="en-US" sz="2400" dirty="0" err="1">
+                <a:solidFill>
+                  <a:srgbClr val="1B75C7"/>
+                </a:solidFill>
+                <a:latin typeface="Arial" charset="0"/>
+                <a:cs typeface="Arial" charset="0"/>
+              </a:rPr>
+              <a:t>дипломата</a:t>
+            </a:r>
+            <a:r>
+              <a:rPr lang="en-US" sz="2400" dirty="0">
+                <a:solidFill>
+                  <a:srgbClr val="1B75C7"/>
+                </a:solidFill>
+                <a:latin typeface="Arial" charset="0"/>
+                <a:cs typeface="Arial" charset="0"/>
+              </a:rPr>
+              <a:t>.</a:t>
+            </a:r>
+            <a:r>
+              <a:rPr lang="bg-BG" sz="2400" dirty="0">
+                <a:solidFill>
+                  <a:srgbClr val="1B75C7"/>
+                </a:solidFill>
+                <a:latin typeface="Arial" charset="0"/>
+                <a:cs typeface="Arial" charset="0"/>
+              </a:rPr>
+              <a:t> Тези данни могат да се използват като входни данни в програмата „АдминПро“, чрез която се разпечатват официално дипломите за средно образование.</a:t>
+            </a:r>
+            <a:endParaRPr lang="en-US" sz="2400" dirty="0"/>
+          </a:p>
+        </p:txBody>
+      </p:sp>
+      <p:sp>
+        <p:nvSpPr>
+          <p:cNvPr id="3" name="Subtitle 2"/>
+          <p:cNvSpPr>
+            <a:spLocks noGrp="1"/>
+          </p:cNvSpPr>
+          <p:nvPr>
+            <p:ph type="subTitle" idx="1"/>
+          </p:nvPr>
+        </p:nvSpPr>
+        <p:spPr>
+          <a:xfrm>
+            <a:off x="2438400" y="838200"/>
+            <a:ext cx="5762563" cy="1364531"/>
+          </a:xfrm>
+        </p:spPr>
+        <p:txBody>
+          <a:bodyPr>
+            <a:normAutofit/>
+          </a:bodyPr>
+          <a:lstStyle/>
+          <a:p>
+            <a:r>
+              <a:rPr lang="bg-BG" sz="2900" dirty="0">
+                <a:solidFill>
+                  <a:srgbClr val="1B75C7"/>
+                </a:solidFill>
+                <a:latin typeface="Arial" charset="0"/>
+                <a:cs typeface="Arial" charset="0"/>
+              </a:rPr>
+              <a:t>В допълнение към всичко това :</a:t>
+            </a:r>
+            <a:endParaRPr lang="en-US" sz="2900" dirty="0"/>
+          </a:p>
+        </p:txBody>
+      </p:sp>
+    </p:spTree>
+    <p:extLst>
+      <p:ext uri="{BB962C8B-B14F-4D97-AF65-F5344CB8AC3E}">
+        <p14:creationId xmlns:p14="http://schemas.microsoft.com/office/powerpoint/2010/main" val="4195681997"/>
+      </p:ext>
+    </p:extLst>
+  </p:cSld>
+  <p:clrMapOvr>
+    <a:masterClrMapping/>
+  </p:clrMapOvr>
+  <p:timing>
+    <p:tnLst>
+      <p:par>
+        <p:cTn id="1" dur="indefinite" restart="never" nodeType="tmRoot"/>
+      </p:par>
+    </p:tnLst>
+  </p:timing>
+</p:sld>
+</file>
+
+<file path=ppt/slides/slide16.xml><?xml version="1.0" encoding="utf-8"?>
+<p:sld xmlns:a="http://schemas.openxmlformats.org/drawingml/2006/main" xmlns:r="http://schemas.openxmlformats.org/officeDocument/2006/relationships" xmlns:p="http://schemas.openxmlformats.org/presentationml/2006/main">
+  <p:cSld>
+    <p:spTree>
+      <p:nvGrpSpPr>
+        <p:cNvPr id="1" name=""/>
+        <p:cNvGrpSpPr/>
+        <p:nvPr/>
+      </p:nvGrpSpPr>
+      <p:grpSpPr>
+        <a:xfrm>
+          <a:off x="0" y="0"/>
+          <a:ext cx="0" cy="0"/>
+          <a:chOff x="0" y="0"/>
+          <a:chExt cx="0" cy="0"/>
+        </a:xfrm>
+      </p:grpSpPr>
+      <p:sp>
+        <p:nvSpPr>
+          <p:cNvPr id="2" name="Title 1"/>
+          <p:cNvSpPr>
+            <a:spLocks noGrp="1"/>
+          </p:cNvSpPr>
+          <p:nvPr>
+            <p:ph type="title"/>
+          </p:nvPr>
+        </p:nvSpPr>
+        <p:spPr/>
+        <p:txBody>
+          <a:bodyPr>
+            <a:normAutofit/>
+          </a:bodyPr>
+          <a:lstStyle/>
+          <a:p>
+            <a:r>
+              <a:rPr lang="bg-BG" sz="6200" b="1" i="1" dirty="0" smtClean="0">
+                <a:solidFill>
+                  <a:schemeClr val="accent1">
+                    <a:lumMod val="75000"/>
+                  </a:schemeClr>
+                </a:solidFill>
+              </a:rPr>
+              <a:t>Благодарим Ви за вниманието !</a:t>
+            </a:r>
+            <a:endParaRPr lang="en-US" sz="6200" b="1" i="1" dirty="0">
+              <a:solidFill>
+                <a:schemeClr val="accent1">
+                  <a:lumMod val="75000"/>
+                </a:schemeClr>
+              </a:solidFill>
+            </a:endParaRPr>
+          </a:p>
+        </p:txBody>
+      </p:sp>
+      <p:sp>
+        <p:nvSpPr>
+          <p:cNvPr id="3" name="Text Placeholder 2"/>
+          <p:cNvSpPr>
+            <a:spLocks noGrp="1"/>
+          </p:cNvSpPr>
+          <p:nvPr>
+            <p:ph type="body" idx="1"/>
+          </p:nvPr>
+        </p:nvSpPr>
+        <p:spPr/>
+        <p:txBody>
+          <a:bodyPr/>
+          <a:lstStyle/>
+          <a:p>
+            <a:endParaRPr lang="en-US"/>
+          </a:p>
+        </p:txBody>
+      </p:sp>
+    </p:spTree>
+    <p:extLst>
+      <p:ext uri="{BB962C8B-B14F-4D97-AF65-F5344CB8AC3E}">
+        <p14:creationId xmlns:p14="http://schemas.microsoft.com/office/powerpoint/2010/main" val="2910248216"/>
+      </p:ext>
+    </p:extLst>
+  </p:cSld>
+  <p:clrMapOvr>
+    <a:masterClrMapping/>
+  </p:clrMapOvr>
   <p:timing>
     <p:tnLst>
       <p:par>
@@ -24393,216 +25963,67 @@
             <p:ph type="title"/>
           </p:nvPr>
         </p:nvSpPr>
-        <p:spPr>
-          <a:xfrm>
-            <a:off x="982133" y="304801"/>
-            <a:ext cx="7704667" cy="761999"/>
-          </a:xfrm>
-        </p:spPr>
-        <p:txBody>
-          <a:bodyPr>
-            <a:normAutofit fontScale="90000"/>
-          </a:bodyPr>
+        <p:spPr/>
+        <p:txBody>
+          <a:bodyPr/>
           <a:lstStyle/>
           <a:p>
             <a:r>
-              <a:rPr lang="bg-BG" sz="4900" dirty="0">
-                <a:ln w="3175" cmpd="sng">
-                  <a:solidFill>
-                    <a:srgbClr val="212121">
-                      <a:lumMod val="50000"/>
-                      <a:lumOff val="50000"/>
-                    </a:srgbClr>
-                  </a:solidFill>
-                </a:ln>
-                <a:solidFill>
-                  <a:srgbClr val="4094E0"/>
-                </a:solidFill>
-                <a:effectLst>
-                  <a:outerShdw blurRad="38100" dist="38100" dir="2700000" algn="tl">
-                    <a:srgbClr val="000000">
-                      <a:alpha val="43137"/>
-                    </a:srgbClr>
-                  </a:outerShdw>
-                </a:effectLst>
+              <a:rPr lang="bg-BG" sz="6200" b="1" i="1" dirty="0" smtClean="0">
+                <a:solidFill>
+                  <a:schemeClr val="accent1">
+                    <a:lumMod val="75000"/>
+                  </a:schemeClr>
+                </a:solidFill>
               </a:rPr>
-              <a:t>Цели и предназначение</a:t>
-            </a:r>
-            <a:r>
-              <a:rPr lang="en-US" sz="4300" dirty="0">
-                <a:solidFill>
-                  <a:srgbClr val="FFFFFF"/>
-                </a:solidFill>
-                <a:effectLst>
-                  <a:outerShdw blurRad="38100" dist="38100" dir="2700000" algn="tl">
-                    <a:srgbClr val="000000">
-                      <a:alpha val="43137"/>
-                    </a:srgbClr>
-                  </a:outerShdw>
-                </a:effectLst>
-              </a:rPr>
-              <a:t/>
-            </a:r>
-            <a:br>
-              <a:rPr lang="en-US" sz="4300" dirty="0">
-                <a:solidFill>
-                  <a:srgbClr val="FFFFFF"/>
-                </a:solidFill>
-                <a:effectLst>
-                  <a:outerShdw blurRad="38100" dist="38100" dir="2700000" algn="tl">
-                    <a:srgbClr val="000000">
-                      <a:alpha val="43137"/>
-                    </a:srgbClr>
-                  </a:outerShdw>
-                </a:effectLst>
-              </a:rPr>
-            </a:br>
-            <a:endParaRPr lang="bg-BG" dirty="0"/>
-          </a:p>
-        </p:txBody>
-      </p:sp>
-      <p:sp>
-        <p:nvSpPr>
-          <p:cNvPr id="3" name="Content Placeholder 2"/>
+              <a:t>Предговор</a:t>
+            </a:r>
+            <a:endParaRPr lang="en-US" sz="6200" b="1" i="1" dirty="0">
+              <a:solidFill>
+                <a:schemeClr val="accent1">
+                  <a:lumMod val="75000"/>
+                </a:schemeClr>
+              </a:solidFill>
+            </a:endParaRPr>
+          </a:p>
+        </p:txBody>
+      </p:sp>
+      <p:sp>
+        <p:nvSpPr>
+          <p:cNvPr id="3" name="Text Placeholder 2"/>
           <p:cNvSpPr>
             <a:spLocks noGrp="1"/>
           </p:cNvSpPr>
           <p:nvPr>
-            <p:ph idx="1"/>
-          </p:nvPr>
-        </p:nvSpPr>
-        <p:spPr>
-          <a:xfrm>
-            <a:off x="982133" y="914400"/>
-            <a:ext cx="7704667" cy="5085416"/>
-          </a:xfrm>
-        </p:spPr>
+            <p:ph type="body" idx="1"/>
+          </p:nvPr>
+        </p:nvSpPr>
+        <p:spPr/>
         <p:txBody>
           <a:bodyPr/>
           <a:lstStyle/>
           <a:p>
-            <a:pPr marL="457200" lvl="1" indent="0" defTabSz="914400" fontAlgn="base">
-              <a:spcBef>
-                <a:spcPts val="600"/>
-              </a:spcBef>
-              <a:spcAft>
-                <a:spcPct val="0"/>
-              </a:spcAft>
-              <a:buClrTx/>
-              <a:buSzPct val="80000"/>
-              <a:buNone/>
-              <a:defRPr/>
-            </a:pPr>
-            <a:r>
-              <a:rPr lang="en-US" sz="2800" dirty="0">
-                <a:solidFill>
-                  <a:srgbClr val="1B75C7"/>
-                </a:solidFill>
-                <a:latin typeface="Arial" panose="020B0604020202020204" pitchFamily="34" charset="0"/>
-                <a:cs typeface="Arial" panose="020B0604020202020204" pitchFamily="34" charset="0"/>
-              </a:rPr>
-              <a:t>Личните картони на учениците са част от задължителната училищна документация с постоянен срок на съхранение.</a:t>
-            </a:r>
-            <a:r>
-              <a:rPr lang="bg-BG" sz="2800" dirty="0">
-                <a:solidFill>
-                  <a:srgbClr val="1B75C7"/>
-                </a:solidFill>
-                <a:latin typeface="Arial" panose="020B0604020202020204" pitchFamily="34" charset="0"/>
-                <a:cs typeface="Arial" panose="020B0604020202020204" pitchFamily="34" charset="0"/>
-              </a:rPr>
-              <a:t>Те</a:t>
-            </a:r>
-            <a:r>
-              <a:rPr lang="en-US" sz="2800" dirty="0">
-                <a:solidFill>
-                  <a:srgbClr val="1B75C7"/>
-                </a:solidFill>
-                <a:latin typeface="Arial" panose="020B0604020202020204" pitchFamily="34" charset="0"/>
-                <a:cs typeface="Arial" panose="020B0604020202020204" pitchFamily="34" charset="0"/>
-              </a:rPr>
-              <a:t> представлява един вид "досие", въз основа на което училището издава диплома за завършено средно образование</a:t>
-            </a:r>
-            <a:r>
-              <a:rPr lang="bg-BG" sz="2800" dirty="0" smtClean="0">
-                <a:solidFill>
-                  <a:srgbClr val="1B75C7"/>
-                </a:solidFill>
-                <a:latin typeface="Arial" panose="020B0604020202020204" pitchFamily="34" charset="0"/>
-                <a:cs typeface="Arial" panose="020B0604020202020204" pitchFamily="34" charset="0"/>
-              </a:rPr>
-              <a:t>. </a:t>
-            </a:r>
-          </a:p>
-          <a:p>
-            <a:pPr marL="457200" lvl="1" indent="0" defTabSz="914400" fontAlgn="base">
-              <a:spcBef>
-                <a:spcPts val="600"/>
-              </a:spcBef>
-              <a:spcAft>
-                <a:spcPct val="0"/>
-              </a:spcAft>
-              <a:buClrTx/>
-              <a:buSzPct val="80000"/>
-              <a:buNone/>
-              <a:defRPr/>
-            </a:pPr>
-            <a:r>
-              <a:rPr lang="bg-BG" sz="2800" dirty="0" smtClean="0">
-                <a:solidFill>
-                  <a:srgbClr val="1B75C7"/>
-                </a:solidFill>
-                <a:latin typeface="Arial" panose="020B0604020202020204" pitchFamily="34" charset="0"/>
-                <a:cs typeface="Arial" panose="020B0604020202020204" pitchFamily="34" charset="0"/>
-              </a:rPr>
-              <a:t>Сега те се попълват от класните ръководители и това е един </a:t>
-            </a:r>
-            <a:r>
-              <a:rPr lang="bg-BG" sz="2800" dirty="0">
-                <a:solidFill>
-                  <a:srgbClr val="1B75C7"/>
-                </a:solidFill>
-                <a:latin typeface="Arial" panose="020B0604020202020204" pitchFamily="34" charset="0"/>
-                <a:cs typeface="Arial" panose="020B0604020202020204" pitchFamily="34" charset="0"/>
-              </a:rPr>
-              <a:t>трудоемък </a:t>
-            </a:r>
-            <a:r>
-              <a:rPr lang="bg-BG" sz="2800" dirty="0" smtClean="0">
-                <a:solidFill>
-                  <a:srgbClr val="1B75C7"/>
-                </a:solidFill>
-                <a:latin typeface="Arial" panose="020B0604020202020204" pitchFamily="34" charset="0"/>
-                <a:cs typeface="Arial" panose="020B0604020202020204" pitchFamily="34" charset="0"/>
-              </a:rPr>
-              <a:t>процес.</a:t>
-            </a:r>
-            <a:endParaRPr lang="bg-BG" sz="2800" dirty="0">
-              <a:solidFill>
-                <a:srgbClr val="1B75C7"/>
-              </a:solidFill>
-              <a:latin typeface="Arial" panose="020B0604020202020204" pitchFamily="34" charset="0"/>
-              <a:cs typeface="Arial" panose="020B0604020202020204" pitchFamily="34" charset="0"/>
-            </a:endParaRPr>
-          </a:p>
-          <a:p>
-            <a:pPr marL="0" indent="0">
-              <a:buNone/>
-            </a:pPr>
-            <a:endParaRPr lang="bg-BG" dirty="0"/>
+            <a:endParaRPr lang="en-US"/>
           </a:p>
         </p:txBody>
       </p:sp>
     </p:spTree>
     <p:extLst>
       <p:ext uri="{BB962C8B-B14F-4D97-AF65-F5344CB8AC3E}">
-        <p14:creationId xmlns:p14="http://schemas.microsoft.com/office/powerpoint/2010/main" val="1385838725"/>
+        <p14:creationId xmlns:p14="http://schemas.microsoft.com/office/powerpoint/2010/main" val="728007106"/>
       </p:ext>
     </p:extLst>
   </p:cSld>
   <p:clrMapOvr>
     <a:masterClrMapping/>
   </p:clrMapOvr>
+  <p:timing>
+    <p:tnLst>
+      <p:par>
+        <p:cTn id="1" dur="indefinite" restart="never" nodeType="tmRoot"/>
+      </p:par>
+    </p:tnLst>
+  </p:timing>
 </p:sld>
 </file>
 
@@ -24635,28 +26056,20 @@
         </p:nvSpPr>
         <p:spPr>
           <a:xfrm>
-            <a:off x="982133" y="457201"/>
+            <a:off x="982133" y="304801"/>
             <a:ext cx="7704667" cy="761999"/>
           </a:xfrm>
         </p:spPr>
         <p:txBody>
           <a:bodyPr>
-            <a:noAutofit/>
+            <a:normAutofit fontScale="90000"/>
           </a:bodyPr>
           <a:lstStyle/>
           <a:p>
             <a:r>
-              <a:rPr lang="bg-BG" sz="4400" dirty="0" smtClean="0">
-                <a:ln w="3175" cmpd="sng">
-                  <a:solidFill>
-                    <a:srgbClr val="212121">
-                      <a:lumMod val="50000"/>
-                      <a:lumOff val="50000"/>
-                    </a:srgbClr>
-                  </a:solidFill>
-                </a:ln>
-                <a:solidFill>
-                  <a:srgbClr val="4094E0"/>
+              <a:rPr lang="en-US" sz="4300" dirty="0">
+                <a:solidFill>
+                  <a:srgbClr val="FFFFFF"/>
                 </a:solidFill>
                 <a:effectLst>
                   <a:outerShdw blurRad="38100" dist="38100" dir="2700000" algn="tl">
@@ -24666,9 +26079,23 @@
                   </a:outerShdw>
                 </a:effectLst>
               </a:rPr>
-              <a:t>Цели и предназначение</a:t>
-            </a:r>
-            <a:endParaRPr lang="bg-BG" sz="4400" dirty="0"/>
+              <a:t/>
+            </a:r>
+            <a:br>
+              <a:rPr lang="en-US" sz="4300" dirty="0">
+                <a:solidFill>
+                  <a:srgbClr val="FFFFFF"/>
+                </a:solidFill>
+                <a:effectLst>
+                  <a:outerShdw blurRad="38100" dist="38100" dir="2700000" algn="tl">
+                    <a:srgbClr val="000000">
+                      <a:alpha val="43137"/>
+                    </a:srgbClr>
+                  </a:outerShdw>
+                </a:effectLst>
+              </a:rPr>
+            </a:br>
+            <a:endParaRPr lang="bg-BG" dirty="0"/>
           </a:p>
         </p:txBody>
       </p:sp>
@@ -24684,13 +26111,13 @@
         </p:nvSpPr>
         <p:spPr>
           <a:xfrm>
-            <a:off x="995988" y="1447800"/>
-            <a:ext cx="7933267" cy="4780616"/>
+            <a:off x="982133" y="914400"/>
+            <a:ext cx="7704667" cy="5085416"/>
           </a:xfrm>
         </p:spPr>
         <p:txBody>
           <a:bodyPr>
-            <a:normAutofit/>
+            <a:normAutofit fontScale="92500"/>
           </a:bodyPr>
           <a:lstStyle/>
           <a:p>
@@ -24707,16 +26134,30 @@
               <a:defRPr/>
             </a:pPr>
             <a:r>
-              <a:rPr lang="ru-RU" sz="3200" dirty="0">
+              <a:rPr lang="bg-BG" sz="2800" dirty="0" smtClean="0">
                 <a:solidFill>
                   <a:srgbClr val="1B75C7"/>
                 </a:solidFill>
                 <a:latin typeface="Arial" panose="020B0604020202020204" pitchFamily="34" charset="0"/>
                 <a:cs typeface="Arial" panose="020B0604020202020204" pitchFamily="34" charset="0"/>
               </a:rPr>
-              <a:t>Целта на нашият проект е да се създаде приложение, което напълно да автоматизира воденето на личния картон на ученика в едно средно училище и да е в помощ при изработването на дипломата за средно образование като изходен документ.</a:t>
-            </a:r>
-            <a:endParaRPr lang="bg-BG" sz="3200" dirty="0">
+              <a:t>	</a:t>
+            </a:r>
+          </a:p>
+          <a:p>
+            <a:pPr marL="457200" lvl="1" indent="0" defTabSz="914400" fontAlgn="base">
+              <a:spcBef>
+                <a:spcPts val="600"/>
+              </a:spcBef>
+              <a:spcAft>
+                <a:spcPct val="0"/>
+              </a:spcAft>
+              <a:buClrTx/>
+              <a:buSzPct val="80000"/>
+              <a:buNone/>
+              <a:defRPr/>
+            </a:pPr>
+            <a:endParaRPr lang="bg-BG" sz="2800" dirty="0">
               <a:solidFill>
                 <a:srgbClr val="1B75C7"/>
               </a:solidFill>
@@ -24725,6 +26166,286 @@
             </a:endParaRPr>
           </a:p>
           <a:p>
+            <a:pPr lvl="1" defTabSz="914400" fontAlgn="base">
+              <a:spcBef>
+                <a:spcPts val="600"/>
+              </a:spcBef>
+              <a:spcAft>
+                <a:spcPct val="0"/>
+              </a:spcAft>
+              <a:buClrTx/>
+              <a:buSzPct val="80000"/>
+              <a:buFont typeface="Wingdings" panose="05000000000000000000" pitchFamily="2" charset="2"/>
+              <a:buChar char="Ø"/>
+              <a:defRPr/>
+            </a:pPr>
+            <a:r>
+              <a:rPr lang="bg-BG" sz="2800" dirty="0" smtClean="0">
+                <a:solidFill>
+                  <a:srgbClr val="1B75C7"/>
+                </a:solidFill>
+                <a:latin typeface="Arial" panose="020B0604020202020204" pitchFamily="34" charset="0"/>
+                <a:cs typeface="Arial" panose="020B0604020202020204" pitchFamily="34" charset="0"/>
+              </a:rPr>
+              <a:t>	</a:t>
+            </a:r>
+            <a:r>
+              <a:rPr lang="en-US" sz="2800" b="1" dirty="0" err="1" smtClean="0">
+                <a:solidFill>
+                  <a:srgbClr val="1B75C7"/>
+                </a:solidFill>
+                <a:latin typeface="Arial" panose="020B0604020202020204" pitchFamily="34" charset="0"/>
+                <a:cs typeface="Arial" panose="020B0604020202020204" pitchFamily="34" charset="0"/>
+              </a:rPr>
+              <a:t>Лични</a:t>
+            </a:r>
+            <a:r>
+              <a:rPr lang="bg-BG" sz="2800" b="1" dirty="0" smtClean="0">
+                <a:solidFill>
+                  <a:srgbClr val="1B75C7"/>
+                </a:solidFill>
+                <a:latin typeface="Arial" panose="020B0604020202020204" pitchFamily="34" charset="0"/>
+                <a:cs typeface="Arial" panose="020B0604020202020204" pitchFamily="34" charset="0"/>
+              </a:rPr>
+              <a:t>ят</a:t>
+            </a:r>
+            <a:r>
+              <a:rPr lang="en-US" sz="2800" b="1" dirty="0" smtClean="0">
+                <a:solidFill>
+                  <a:srgbClr val="1B75C7"/>
+                </a:solidFill>
+                <a:latin typeface="Arial" panose="020B0604020202020204" pitchFamily="34" charset="0"/>
+                <a:cs typeface="Arial" panose="020B0604020202020204" pitchFamily="34" charset="0"/>
+              </a:rPr>
+              <a:t> </a:t>
+            </a:r>
+            <a:r>
+              <a:rPr lang="en-US" sz="2800" b="1" dirty="0" err="1" smtClean="0">
+                <a:solidFill>
+                  <a:srgbClr val="1B75C7"/>
+                </a:solidFill>
+                <a:latin typeface="Arial" panose="020B0604020202020204" pitchFamily="34" charset="0"/>
+                <a:cs typeface="Arial" panose="020B0604020202020204" pitchFamily="34" charset="0"/>
+              </a:rPr>
+              <a:t>картон</a:t>
+            </a:r>
+            <a:r>
+              <a:rPr lang="en-US" sz="2800" b="1" dirty="0" smtClean="0">
+                <a:solidFill>
+                  <a:srgbClr val="1B75C7"/>
+                </a:solidFill>
+                <a:latin typeface="Arial" panose="020B0604020202020204" pitchFamily="34" charset="0"/>
+                <a:cs typeface="Arial" panose="020B0604020202020204" pitchFamily="34" charset="0"/>
+              </a:rPr>
+              <a:t> </a:t>
+            </a:r>
+            <a:r>
+              <a:rPr lang="en-US" sz="2800" dirty="0" err="1">
+                <a:solidFill>
+                  <a:srgbClr val="1B75C7"/>
+                </a:solidFill>
+                <a:latin typeface="Arial" panose="020B0604020202020204" pitchFamily="34" charset="0"/>
+                <a:cs typeface="Arial" panose="020B0604020202020204" pitchFamily="34" charset="0"/>
+              </a:rPr>
+              <a:t>на</a:t>
+            </a:r>
+            <a:r>
+              <a:rPr lang="en-US" sz="2800" dirty="0">
+                <a:solidFill>
+                  <a:srgbClr val="1B75C7"/>
+                </a:solidFill>
+                <a:latin typeface="Arial" panose="020B0604020202020204" pitchFamily="34" charset="0"/>
+                <a:cs typeface="Arial" panose="020B0604020202020204" pitchFamily="34" charset="0"/>
+              </a:rPr>
+              <a:t> </a:t>
+            </a:r>
+            <a:r>
+              <a:rPr lang="en-US" sz="2800" dirty="0" err="1" smtClean="0">
+                <a:solidFill>
+                  <a:srgbClr val="1B75C7"/>
+                </a:solidFill>
+                <a:latin typeface="Arial" panose="020B0604020202020204" pitchFamily="34" charset="0"/>
+                <a:cs typeface="Arial" panose="020B0604020202020204" pitchFamily="34" charset="0"/>
+              </a:rPr>
+              <a:t>учени</a:t>
+            </a:r>
+            <a:r>
+              <a:rPr lang="bg-BG" sz="2800" dirty="0" smtClean="0">
+                <a:solidFill>
+                  <a:srgbClr val="1B75C7"/>
+                </a:solidFill>
+                <a:latin typeface="Arial" panose="020B0604020202020204" pitchFamily="34" charset="0"/>
+                <a:cs typeface="Arial" panose="020B0604020202020204" pitchFamily="34" charset="0"/>
+              </a:rPr>
+              <a:t>ка</a:t>
+            </a:r>
+            <a:r>
+              <a:rPr lang="en-US" sz="2800" dirty="0" smtClean="0">
+                <a:solidFill>
+                  <a:srgbClr val="1B75C7"/>
+                </a:solidFill>
+                <a:latin typeface="Arial" panose="020B0604020202020204" pitchFamily="34" charset="0"/>
+                <a:cs typeface="Arial" panose="020B0604020202020204" pitchFamily="34" charset="0"/>
+              </a:rPr>
+              <a:t> </a:t>
+            </a:r>
+            <a:r>
+              <a:rPr lang="bg-BG" sz="2800" dirty="0" smtClean="0">
+                <a:solidFill>
+                  <a:srgbClr val="1B75C7"/>
+                </a:solidFill>
+                <a:latin typeface="Arial" panose="020B0604020202020204" pitchFamily="34" charset="0"/>
+                <a:cs typeface="Arial" panose="020B0604020202020204" pitchFamily="34" charset="0"/>
+              </a:rPr>
+              <a:t>е</a:t>
+            </a:r>
+            <a:r>
+              <a:rPr lang="en-US" sz="2800" dirty="0" smtClean="0">
+                <a:solidFill>
+                  <a:srgbClr val="1B75C7"/>
+                </a:solidFill>
+                <a:latin typeface="Arial" panose="020B0604020202020204" pitchFamily="34" charset="0"/>
+                <a:cs typeface="Arial" panose="020B0604020202020204" pitchFamily="34" charset="0"/>
+              </a:rPr>
+              <a:t> </a:t>
+            </a:r>
+            <a:r>
+              <a:rPr lang="en-US" sz="2800" dirty="0">
+                <a:solidFill>
+                  <a:srgbClr val="1B75C7"/>
+                </a:solidFill>
+                <a:latin typeface="Arial" panose="020B0604020202020204" pitchFamily="34" charset="0"/>
+                <a:cs typeface="Arial" panose="020B0604020202020204" pitchFamily="34" charset="0"/>
+              </a:rPr>
+              <a:t>част от задължителната училищна документация с постоянен срок на </a:t>
+            </a:r>
+            <a:r>
+              <a:rPr lang="en-US" sz="2800" dirty="0" err="1">
+                <a:solidFill>
+                  <a:srgbClr val="1B75C7"/>
+                </a:solidFill>
+                <a:latin typeface="Arial" panose="020B0604020202020204" pitchFamily="34" charset="0"/>
+                <a:cs typeface="Arial" panose="020B0604020202020204" pitchFamily="34" charset="0"/>
+              </a:rPr>
+              <a:t>съхранение</a:t>
+            </a:r>
+            <a:r>
+              <a:rPr lang="en-US" sz="2800" dirty="0" smtClean="0">
+                <a:solidFill>
+                  <a:srgbClr val="1B75C7"/>
+                </a:solidFill>
+                <a:latin typeface="Arial" panose="020B0604020202020204" pitchFamily="34" charset="0"/>
+                <a:cs typeface="Arial" panose="020B0604020202020204" pitchFamily="34" charset="0"/>
+              </a:rPr>
+              <a:t>.</a:t>
+            </a:r>
+            <a:r>
+              <a:rPr lang="bg-BG" sz="2800" dirty="0">
+                <a:solidFill>
+                  <a:srgbClr val="1B75C7"/>
+                </a:solidFill>
+                <a:latin typeface="Arial" panose="020B0604020202020204" pitchFamily="34" charset="0"/>
+                <a:cs typeface="Arial" panose="020B0604020202020204" pitchFamily="34" charset="0"/>
+              </a:rPr>
+              <a:t> </a:t>
+            </a:r>
+            <a:r>
+              <a:rPr lang="bg-BG" sz="2800" dirty="0" smtClean="0">
+                <a:solidFill>
+                  <a:srgbClr val="1B75C7"/>
+                </a:solidFill>
+                <a:latin typeface="Arial" panose="020B0604020202020204" pitchFamily="34" charset="0"/>
+                <a:cs typeface="Arial" panose="020B0604020202020204" pitchFamily="34" charset="0"/>
+              </a:rPr>
+              <a:t>Той</a:t>
+            </a:r>
+            <a:r>
+              <a:rPr lang="en-US" sz="2800" dirty="0" smtClean="0">
+                <a:solidFill>
+                  <a:srgbClr val="1B75C7"/>
+                </a:solidFill>
+                <a:latin typeface="Arial" panose="020B0604020202020204" pitchFamily="34" charset="0"/>
+                <a:cs typeface="Arial" panose="020B0604020202020204" pitchFamily="34" charset="0"/>
+              </a:rPr>
+              <a:t> </a:t>
+            </a:r>
+            <a:r>
+              <a:rPr lang="en-US" sz="2800" dirty="0">
+                <a:solidFill>
+                  <a:srgbClr val="1B75C7"/>
+                </a:solidFill>
+                <a:latin typeface="Arial" panose="020B0604020202020204" pitchFamily="34" charset="0"/>
+                <a:cs typeface="Arial" panose="020B0604020202020204" pitchFamily="34" charset="0"/>
+              </a:rPr>
+              <a:t>представлява един вид "досие", въз основа на което училището издава диплома за завършено средно образование</a:t>
+            </a:r>
+            <a:r>
+              <a:rPr lang="bg-BG" sz="2800" dirty="0" smtClean="0">
+                <a:solidFill>
+                  <a:srgbClr val="1B75C7"/>
+                </a:solidFill>
+                <a:latin typeface="Arial" panose="020B0604020202020204" pitchFamily="34" charset="0"/>
+                <a:cs typeface="Arial" panose="020B0604020202020204" pitchFamily="34" charset="0"/>
+              </a:rPr>
+              <a:t>. </a:t>
+            </a:r>
+          </a:p>
+          <a:p>
+            <a:pPr lvl="1" defTabSz="914400" fontAlgn="base">
+              <a:spcBef>
+                <a:spcPts val="600"/>
+              </a:spcBef>
+              <a:spcAft>
+                <a:spcPct val="0"/>
+              </a:spcAft>
+              <a:buClrTx/>
+              <a:buSzPct val="80000"/>
+              <a:buFont typeface="Wingdings" panose="05000000000000000000" pitchFamily="2" charset="2"/>
+              <a:buChar char="Ø"/>
+              <a:defRPr/>
+            </a:pPr>
+            <a:r>
+              <a:rPr lang="bg-BG" sz="2800" dirty="0">
+                <a:solidFill>
+                  <a:srgbClr val="1B75C7"/>
+                </a:solidFill>
+                <a:latin typeface="Arial" panose="020B0604020202020204" pitchFamily="34" charset="0"/>
+                <a:cs typeface="Arial" panose="020B0604020202020204" pitchFamily="34" charset="0"/>
+              </a:rPr>
+              <a:t> </a:t>
+            </a:r>
+            <a:r>
+              <a:rPr lang="bg-BG" sz="2800" dirty="0" smtClean="0">
+                <a:solidFill>
+                  <a:srgbClr val="1B75C7"/>
+                </a:solidFill>
+                <a:latin typeface="Arial" panose="020B0604020202020204" pitchFamily="34" charset="0"/>
+                <a:cs typeface="Arial" panose="020B0604020202020204" pitchFamily="34" charset="0"/>
+              </a:rPr>
+              <a:t> </a:t>
+            </a:r>
+            <a:r>
+              <a:rPr lang="bg-BG" sz="2600" dirty="0" smtClean="0">
+                <a:solidFill>
+                  <a:srgbClr val="1B75C7"/>
+                </a:solidFill>
+                <a:latin typeface="Arial" panose="020B0604020202020204" pitchFamily="34" charset="0"/>
+                <a:cs typeface="Arial" panose="020B0604020202020204" pitchFamily="34" charset="0"/>
+              </a:rPr>
+              <a:t>До момента всички дейности са се изпълнявали ръчно от класните ръководители, което представлява един доста трудоемък процес.</a:t>
+            </a:r>
+            <a:endParaRPr lang="bg-BG" sz="2600" dirty="0">
+              <a:solidFill>
+                <a:srgbClr val="1B75C7"/>
+              </a:solidFill>
+              <a:latin typeface="Arial" panose="020B0604020202020204" pitchFamily="34" charset="0"/>
+              <a:cs typeface="Arial" panose="020B0604020202020204" pitchFamily="34" charset="0"/>
+            </a:endParaRPr>
+          </a:p>
+          <a:p>
+            <a:pPr marL="0" indent="0">
+              <a:buNone/>
+            </a:pPr>
             <a:endParaRPr lang="bg-BG" dirty="0"/>
           </a:p>
         </p:txBody>
@@ -24732,13 +26453,20 @@
     </p:spTree>
     <p:extLst>
       <p:ext uri="{BB962C8B-B14F-4D97-AF65-F5344CB8AC3E}">
-        <p14:creationId xmlns:p14="http://schemas.microsoft.com/office/powerpoint/2010/main" val="477284858"/>
+        <p14:creationId xmlns:p14="http://schemas.microsoft.com/office/powerpoint/2010/main" val="1385838725"/>
       </p:ext>
     </p:extLst>
   </p:cSld>
   <p:clrMapOvr>
     <a:masterClrMapping/>
   </p:clrMapOvr>
+  <p:timing>
+    <p:tnLst>
+      <p:par>
+        <p:cTn id="1" dur="indefinite" restart="never" nodeType="tmRoot"/>
+      </p:par>
+    </p:tnLst>
+  </p:timing>
 </p:sld>
 </file>
 
@@ -24769,664 +26497,67 @@
             <p:ph type="title"/>
           </p:nvPr>
         </p:nvSpPr>
-        <p:spPr>
-          <a:xfrm>
-            <a:off x="982133" y="228601"/>
-            <a:ext cx="7704667" cy="457200"/>
-          </a:xfrm>
-        </p:spPr>
-        <p:txBody>
-          <a:bodyPr>
-            <a:noAutofit/>
-          </a:bodyPr>
+        <p:spPr/>
+        <p:txBody>
+          <a:bodyPr/>
           <a:lstStyle/>
           <a:p>
             <a:r>
-              <a:rPr lang="bg-BG" sz="4800" dirty="0">
-                <a:ln w="3175" cmpd="sng">
-                  <a:solidFill>
-                    <a:srgbClr val="212121">
-                      <a:lumMod val="50000"/>
-                      <a:lumOff val="50000"/>
-                    </a:srgbClr>
-                  </a:solidFill>
-                </a:ln>
-                <a:solidFill>
-                  <a:srgbClr val="4094E0"/>
-                </a:solidFill>
-                <a:effectLst>
-                  <a:outerShdw blurRad="38100" dist="38100" dir="2700000" algn="tl">
-                    <a:srgbClr val="000000">
-                      <a:alpha val="43137"/>
-                    </a:srgbClr>
-                  </a:outerShdw>
-                </a:effectLst>
+              <a:rPr lang="bg-BG" sz="6200" b="1" i="1" dirty="0" smtClean="0">
+                <a:solidFill>
+                  <a:schemeClr val="accent1">
+                    <a:lumMod val="75000"/>
+                  </a:schemeClr>
+                </a:solidFill>
               </a:rPr>
-              <a:t>Същност</a:t>
-            </a:r>
-            <a:endParaRPr lang="bg-BG" sz="4800" dirty="0"/>
-          </a:p>
-        </p:txBody>
-      </p:sp>
-      <p:sp>
-        <p:nvSpPr>
-          <p:cNvPr id="3" name="Content Placeholder 2"/>
+              <a:t>Цел на проекта</a:t>
+            </a:r>
+            <a:endParaRPr lang="en-US" sz="6200" b="1" i="1" dirty="0">
+              <a:solidFill>
+                <a:schemeClr val="accent1">
+                  <a:lumMod val="75000"/>
+                </a:schemeClr>
+              </a:solidFill>
+            </a:endParaRPr>
+          </a:p>
+        </p:txBody>
+      </p:sp>
+      <p:sp>
+        <p:nvSpPr>
+          <p:cNvPr id="3" name="Text Placeholder 2"/>
           <p:cNvSpPr>
             <a:spLocks noGrp="1"/>
           </p:cNvSpPr>
           <p:nvPr>
-            <p:ph idx="1"/>
-          </p:nvPr>
-        </p:nvSpPr>
-        <p:spPr>
-          <a:xfrm>
-            <a:off x="968278" y="990600"/>
-            <a:ext cx="8085667" cy="5715000"/>
-          </a:xfrm>
-        </p:spPr>
-        <p:txBody>
-          <a:bodyPr>
-            <a:normAutofit lnSpcReduction="10000"/>
-          </a:bodyPr>
+            <p:ph type="body" idx="1"/>
+          </p:nvPr>
+        </p:nvSpPr>
+        <p:spPr/>
+        <p:txBody>
+          <a:bodyPr/>
           <a:lstStyle/>
           <a:p>
-            <a:pPr marL="457200" lvl="1" indent="0" defTabSz="914400" fontAlgn="base">
-              <a:spcBef>
-                <a:spcPts val="600"/>
-              </a:spcBef>
-              <a:spcAft>
-                <a:spcPct val="0"/>
-              </a:spcAft>
-              <a:buClrTx/>
-              <a:buSzPct val="80000"/>
-              <a:buNone/>
-              <a:defRPr/>
-            </a:pPr>
-            <a:r>
-              <a:rPr lang="ru-RU" sz="2400" dirty="0">
-                <a:solidFill>
-                  <a:srgbClr val="1B75C7"/>
-                </a:solidFill>
-                <a:latin typeface="Arial" panose="020B0604020202020204" pitchFamily="34" charset="0"/>
-                <a:cs typeface="Arial" panose="020B0604020202020204" pitchFamily="34" charset="0"/>
-              </a:rPr>
-              <a:t>Проектът представлява приложна програма, работеща с база от данни и предлага следните дейности: </a:t>
-            </a:r>
-          </a:p>
-          <a:p>
-            <a:pPr marL="457200" lvl="1" indent="0" defTabSz="914400" fontAlgn="base">
-              <a:spcBef>
-                <a:spcPts val="600"/>
-              </a:spcBef>
-              <a:spcAft>
-                <a:spcPct val="0"/>
-              </a:spcAft>
-              <a:buClrTx/>
-              <a:buSzPct val="80000"/>
-              <a:buNone/>
-              <a:defRPr/>
-            </a:pPr>
-            <a:r>
-              <a:rPr lang="ru-RU" sz="2400" dirty="0">
-                <a:solidFill>
-                  <a:srgbClr val="1B75C7"/>
-                </a:solidFill>
-                <a:latin typeface="Arial" panose="020B0604020202020204" pitchFamily="34" charset="0"/>
-                <a:cs typeface="Arial" panose="020B0604020202020204" pitchFamily="34" charset="0"/>
-              </a:rPr>
-              <a:t>Дейности на </a:t>
-            </a:r>
-            <a:r>
-              <a:rPr lang="ru-RU" sz="2400" dirty="0" smtClean="0">
-                <a:solidFill>
-                  <a:srgbClr val="1B75C7"/>
-                </a:solidFill>
-                <a:latin typeface="Arial" panose="020B0604020202020204" pitchFamily="34" charset="0"/>
-                <a:cs typeface="Arial" panose="020B0604020202020204" pitchFamily="34" charset="0"/>
-              </a:rPr>
-              <a:t>администратора - въвеждане на:</a:t>
-            </a:r>
-          </a:p>
-          <a:p>
-            <a:pPr marL="457200" lvl="1" indent="0" defTabSz="914400" fontAlgn="base">
-              <a:spcBef>
-                <a:spcPts val="600"/>
-              </a:spcBef>
-              <a:spcAft>
-                <a:spcPct val="0"/>
-              </a:spcAft>
-              <a:buClrTx/>
-              <a:buSzPct val="80000"/>
-              <a:buNone/>
-              <a:defRPr/>
-            </a:pPr>
-            <a:endParaRPr lang="ru-RU" dirty="0">
-              <a:solidFill>
-                <a:srgbClr val="1B75C7"/>
-              </a:solidFill>
-              <a:latin typeface="Arial" panose="020B0604020202020204" pitchFamily="34" charset="0"/>
-              <a:cs typeface="Arial" panose="020B0604020202020204" pitchFamily="34" charset="0"/>
-            </a:endParaRPr>
-          </a:p>
-          <a:p>
-            <a:pPr marL="1063625" lvl="0" indent="-342900" defTabSz="914400" fontAlgn="base">
-              <a:spcBef>
-                <a:spcPct val="0"/>
-              </a:spcBef>
-              <a:spcAft>
-                <a:spcPct val="0"/>
-              </a:spcAft>
-              <a:buClrTx/>
-              <a:buSzTx/>
-              <a:buFont typeface="Wingdings" panose="05000000000000000000" pitchFamily="2" charset="2"/>
-              <a:buChar char="ü"/>
-            </a:pPr>
-            <a:r>
-              <a:rPr lang="bg-BG" sz="2000" dirty="0">
-                <a:solidFill>
-                  <a:srgbClr val="1B75C7"/>
-                </a:solidFill>
-                <a:latin typeface="Arial" panose="020B0604020202020204" pitchFamily="34" charset="0"/>
-                <a:cs typeface="Arial" panose="020B0604020202020204" pitchFamily="34" charset="0"/>
-              </a:rPr>
-              <a:t>Учебнитесрокове – </a:t>
-            </a:r>
-            <a:r>
-              <a:rPr lang="en-US" sz="2000" dirty="0">
-                <a:solidFill>
-                  <a:srgbClr val="1B75C7"/>
-                </a:solidFill>
-                <a:latin typeface="Arial" panose="020B0604020202020204" pitchFamily="34" charset="0"/>
-                <a:cs typeface="Arial" panose="020B0604020202020204" pitchFamily="34" charset="0"/>
-              </a:rPr>
-              <a:t>I </a:t>
-            </a:r>
-            <a:r>
-              <a:rPr lang="bg-BG" sz="2000" dirty="0">
-                <a:solidFill>
-                  <a:srgbClr val="1B75C7"/>
-                </a:solidFill>
-                <a:latin typeface="Arial" panose="020B0604020202020204" pitchFamily="34" charset="0"/>
-                <a:cs typeface="Arial" panose="020B0604020202020204" pitchFamily="34" charset="0"/>
-              </a:rPr>
-              <a:t>срок, </a:t>
-            </a:r>
-            <a:r>
-              <a:rPr lang="en-US" sz="2000" dirty="0">
-                <a:solidFill>
-                  <a:srgbClr val="1B75C7"/>
-                </a:solidFill>
-                <a:latin typeface="Arial" panose="020B0604020202020204" pitchFamily="34" charset="0"/>
-                <a:cs typeface="Arial" panose="020B0604020202020204" pitchFamily="34" charset="0"/>
-              </a:rPr>
-              <a:t>II</a:t>
-            </a:r>
-            <a:r>
-              <a:rPr lang="bg-BG" sz="2000" dirty="0">
-                <a:solidFill>
-                  <a:srgbClr val="1B75C7"/>
-                </a:solidFill>
-                <a:latin typeface="Arial" panose="020B0604020202020204" pitchFamily="34" charset="0"/>
-                <a:cs typeface="Arial" panose="020B0604020202020204" pitchFamily="34" charset="0"/>
-              </a:rPr>
-              <a:t> срок и за </a:t>
-            </a:r>
-            <a:r>
-              <a:rPr lang="bg-BG" sz="2000" dirty="0" smtClean="0">
-                <a:solidFill>
-                  <a:srgbClr val="1B75C7"/>
-                </a:solidFill>
-                <a:latin typeface="Arial" panose="020B0604020202020204" pitchFamily="34" charset="0"/>
-                <a:cs typeface="Arial" panose="020B0604020202020204" pitchFamily="34" charset="0"/>
-              </a:rPr>
-              <a:t>годината;</a:t>
-            </a:r>
-            <a:endParaRPr lang="bg-BG" sz="2000" dirty="0">
-              <a:solidFill>
-                <a:srgbClr val="1B75C7"/>
-              </a:solidFill>
-              <a:latin typeface="Arial" panose="020B0604020202020204" pitchFamily="34" charset="0"/>
-              <a:cs typeface="Arial" panose="020B0604020202020204" pitchFamily="34" charset="0"/>
-            </a:endParaRPr>
-          </a:p>
-          <a:p>
-            <a:pPr marL="1063625" lvl="0" indent="-342900" defTabSz="914400" fontAlgn="base">
-              <a:spcBef>
-                <a:spcPct val="0"/>
-              </a:spcBef>
-              <a:spcAft>
-                <a:spcPct val="0"/>
-              </a:spcAft>
-              <a:buClrTx/>
-              <a:buSzTx/>
-              <a:buFont typeface="Wingdings" panose="05000000000000000000" pitchFamily="2" charset="2"/>
-              <a:buChar char="ü"/>
-            </a:pPr>
-            <a:r>
-              <a:rPr lang="bg-BG" sz="2000" dirty="0">
-                <a:solidFill>
-                  <a:srgbClr val="1B75C7"/>
-                </a:solidFill>
-                <a:latin typeface="Arial" panose="020B0604020202020204" pitchFamily="34" charset="0"/>
-                <a:cs typeface="Arial" panose="020B0604020202020204" pitchFamily="34" charset="0"/>
-              </a:rPr>
-              <a:t>Вид отсъствия – </a:t>
-            </a:r>
-            <a:r>
-              <a:rPr lang="bg-BG" sz="2000" dirty="0" smtClean="0">
-                <a:solidFill>
-                  <a:srgbClr val="1B75C7"/>
-                </a:solidFill>
-                <a:latin typeface="Arial" panose="020B0604020202020204" pitchFamily="34" charset="0"/>
-                <a:cs typeface="Arial" panose="020B0604020202020204" pitchFamily="34" charset="0"/>
-              </a:rPr>
-              <a:t>извинени/неизвинени;</a:t>
-            </a:r>
-            <a:endParaRPr lang="bg-BG" sz="2000" dirty="0">
-              <a:solidFill>
-                <a:srgbClr val="1B75C7"/>
-              </a:solidFill>
-              <a:latin typeface="Arial" panose="020B0604020202020204" pitchFamily="34" charset="0"/>
-              <a:cs typeface="Arial" panose="020B0604020202020204" pitchFamily="34" charset="0"/>
-            </a:endParaRPr>
-          </a:p>
-          <a:p>
-            <a:pPr marL="1063625" lvl="0" indent="-342900" defTabSz="914400" fontAlgn="base">
-              <a:spcBef>
-                <a:spcPct val="0"/>
-              </a:spcBef>
-              <a:spcAft>
-                <a:spcPct val="0"/>
-              </a:spcAft>
-              <a:buClrTx/>
-              <a:buSzTx/>
-              <a:buFont typeface="Wingdings" panose="05000000000000000000" pitchFamily="2" charset="2"/>
-              <a:buChar char="ü"/>
-            </a:pPr>
-            <a:r>
-              <a:rPr lang="bg-BG" sz="2000" dirty="0">
-                <a:solidFill>
-                  <a:srgbClr val="1B75C7"/>
-                </a:solidFill>
-                <a:latin typeface="Arial" panose="020B0604020202020204" pitchFamily="34" charset="0"/>
-                <a:cs typeface="Arial" panose="020B0604020202020204" pitchFamily="34" charset="0"/>
-              </a:rPr>
-              <a:t>Настоящата учебна </a:t>
-            </a:r>
-            <a:r>
-              <a:rPr lang="bg-BG" sz="2000" dirty="0" smtClean="0">
-                <a:solidFill>
-                  <a:srgbClr val="1B75C7"/>
-                </a:solidFill>
-                <a:latin typeface="Arial" panose="020B0604020202020204" pitchFamily="34" charset="0"/>
-                <a:cs typeface="Arial" panose="020B0604020202020204" pitchFamily="34" charset="0"/>
-              </a:rPr>
-              <a:t>година;</a:t>
-            </a:r>
-            <a:endParaRPr lang="bg-BG" sz="2000" dirty="0">
-              <a:solidFill>
-                <a:srgbClr val="1B75C7"/>
-              </a:solidFill>
-              <a:latin typeface="Arial" panose="020B0604020202020204" pitchFamily="34" charset="0"/>
-              <a:cs typeface="Arial" panose="020B0604020202020204" pitchFamily="34" charset="0"/>
-            </a:endParaRPr>
-          </a:p>
-          <a:p>
-            <a:pPr marL="1063625" lvl="0" indent="-342900" defTabSz="914400" fontAlgn="base">
-              <a:spcBef>
-                <a:spcPct val="0"/>
-              </a:spcBef>
-              <a:spcAft>
-                <a:spcPct val="0"/>
-              </a:spcAft>
-              <a:buClrTx/>
-              <a:buSzTx/>
-              <a:buFont typeface="Wingdings" panose="05000000000000000000" pitchFamily="2" charset="2"/>
-              <a:buChar char="ü"/>
-            </a:pPr>
-            <a:r>
-              <a:rPr lang="bg-BG" sz="2000" dirty="0">
-                <a:solidFill>
-                  <a:srgbClr val="1B75C7"/>
-                </a:solidFill>
-                <a:latin typeface="Arial" panose="020B0604020202020204" pitchFamily="34" charset="0"/>
-                <a:cs typeface="Arial" panose="020B0604020202020204" pitchFamily="34" charset="0"/>
-              </a:rPr>
-              <a:t>Всички учебни предмети, съгласно учебните планове на министерството на </a:t>
-            </a:r>
-            <a:r>
-              <a:rPr lang="bg-BG" sz="2000" dirty="0" smtClean="0">
-                <a:solidFill>
-                  <a:srgbClr val="1B75C7"/>
-                </a:solidFill>
-                <a:latin typeface="Arial" panose="020B0604020202020204" pitchFamily="34" charset="0"/>
-                <a:cs typeface="Arial" panose="020B0604020202020204" pitchFamily="34" charset="0"/>
-              </a:rPr>
-              <a:t>образованието;</a:t>
-            </a:r>
-            <a:endParaRPr lang="bg-BG" sz="2000" dirty="0">
-              <a:solidFill>
-                <a:srgbClr val="1B75C7"/>
-              </a:solidFill>
-              <a:latin typeface="Arial" panose="020B0604020202020204" pitchFamily="34" charset="0"/>
-              <a:cs typeface="Arial" panose="020B0604020202020204" pitchFamily="34" charset="0"/>
-            </a:endParaRPr>
-          </a:p>
-          <a:p>
-            <a:pPr marL="1063625" lvl="0" indent="-342900" defTabSz="914400" fontAlgn="base">
-              <a:spcBef>
-                <a:spcPct val="0"/>
-              </a:spcBef>
-              <a:spcAft>
-                <a:spcPct val="0"/>
-              </a:spcAft>
-              <a:buClrTx/>
-              <a:buSzTx/>
-              <a:buFont typeface="Wingdings" panose="05000000000000000000" pitchFamily="2" charset="2"/>
-              <a:buChar char="ü"/>
-            </a:pPr>
-            <a:r>
-              <a:rPr lang="bg-BG" sz="2000" dirty="0">
-                <a:solidFill>
-                  <a:srgbClr val="1B75C7"/>
-                </a:solidFill>
-                <a:latin typeface="Arial" panose="020B0604020202020204" pitchFamily="34" charset="0"/>
-                <a:cs typeface="Arial" panose="020B0604020202020204" pitchFamily="34" charset="0"/>
-              </a:rPr>
-              <a:t>Типа на учебните предмети – ЗП, ЗИП, ЗПП, СИП, </a:t>
-            </a:r>
-            <a:r>
-              <a:rPr lang="bg-BG" sz="2000" dirty="0" smtClean="0">
-                <a:solidFill>
-                  <a:srgbClr val="1B75C7"/>
-                </a:solidFill>
-                <a:latin typeface="Arial" panose="020B0604020202020204" pitchFamily="34" charset="0"/>
-                <a:cs typeface="Arial" panose="020B0604020202020204" pitchFamily="34" charset="0"/>
-              </a:rPr>
-              <a:t>ДЗИ;</a:t>
-            </a:r>
-            <a:endParaRPr lang="bg-BG" sz="2000" dirty="0">
-              <a:solidFill>
-                <a:srgbClr val="1B75C7"/>
-              </a:solidFill>
-              <a:latin typeface="Arial" panose="020B0604020202020204" pitchFamily="34" charset="0"/>
-              <a:cs typeface="Arial" panose="020B0604020202020204" pitchFamily="34" charset="0"/>
-            </a:endParaRPr>
-          </a:p>
-          <a:p>
-            <a:pPr marL="1063625" lvl="0" indent="-342900" defTabSz="914400" fontAlgn="base">
-              <a:spcBef>
-                <a:spcPct val="0"/>
-              </a:spcBef>
-              <a:spcAft>
-                <a:spcPct val="0"/>
-              </a:spcAft>
-              <a:buClrTx/>
-              <a:buSzTx/>
-              <a:buFont typeface="Wingdings" panose="05000000000000000000" pitchFamily="2" charset="2"/>
-              <a:buChar char="ü"/>
-            </a:pPr>
-            <a:r>
-              <a:rPr lang="bg-BG" sz="2000" dirty="0">
-                <a:solidFill>
-                  <a:srgbClr val="1B75C7"/>
-                </a:solidFill>
-                <a:latin typeface="Arial" panose="020B0604020202020204" pitchFamily="34" charset="0"/>
-                <a:cs typeface="Arial" panose="020B0604020202020204" pitchFamily="34" charset="0"/>
-              </a:rPr>
-              <a:t>Профилите на </a:t>
-            </a:r>
-            <a:r>
-              <a:rPr lang="bg-BG" sz="2000" dirty="0" smtClean="0">
-                <a:solidFill>
-                  <a:srgbClr val="1B75C7"/>
-                </a:solidFill>
-                <a:latin typeface="Arial" panose="020B0604020202020204" pitchFamily="34" charset="0"/>
-                <a:cs typeface="Arial" panose="020B0604020202020204" pitchFamily="34" charset="0"/>
-              </a:rPr>
-              <a:t>паралелките;</a:t>
-            </a:r>
-            <a:endParaRPr lang="bg-BG" sz="2000" dirty="0">
-              <a:solidFill>
-                <a:srgbClr val="1B75C7"/>
-              </a:solidFill>
-              <a:latin typeface="Arial" panose="020B0604020202020204" pitchFamily="34" charset="0"/>
-              <a:cs typeface="Arial" panose="020B0604020202020204" pitchFamily="34" charset="0"/>
-            </a:endParaRPr>
-          </a:p>
-          <a:p>
-            <a:pPr marL="1063625" lvl="0" indent="-342900" defTabSz="914400" fontAlgn="base">
-              <a:spcBef>
-                <a:spcPct val="0"/>
-              </a:spcBef>
-              <a:spcAft>
-                <a:spcPct val="0"/>
-              </a:spcAft>
-              <a:buClrTx/>
-              <a:buSzTx/>
-              <a:buFont typeface="Wingdings" panose="05000000000000000000" pitchFamily="2" charset="2"/>
-              <a:buChar char="ü"/>
-            </a:pPr>
-            <a:r>
-              <a:rPr lang="bg-BG" sz="2000" dirty="0">
-                <a:solidFill>
-                  <a:srgbClr val="1B75C7"/>
-                </a:solidFill>
-                <a:latin typeface="Arial" panose="020B0604020202020204" pitchFamily="34" charset="0"/>
-                <a:cs typeface="Arial" panose="020B0604020202020204" pitchFamily="34" charset="0"/>
-              </a:rPr>
-              <a:t>Всички 9-ти класове – 9 а, 9 б, 9 в и т.н</a:t>
-            </a:r>
-            <a:r>
-              <a:rPr lang="bg-BG" sz="2000" dirty="0" smtClean="0">
-                <a:solidFill>
-                  <a:srgbClr val="1B75C7"/>
-                </a:solidFill>
-                <a:latin typeface="Arial" panose="020B0604020202020204" pitchFamily="34" charset="0"/>
-                <a:cs typeface="Arial" panose="020B0604020202020204" pitchFamily="34" charset="0"/>
-              </a:rPr>
-              <a:t>.;</a:t>
-            </a:r>
-          </a:p>
-          <a:p>
-            <a:pPr marL="1063625" indent="-342900" defTabSz="914400" fontAlgn="base">
-              <a:spcBef>
-                <a:spcPct val="0"/>
-              </a:spcBef>
-              <a:spcAft>
-                <a:spcPct val="0"/>
-              </a:spcAft>
-              <a:buClrTx/>
-              <a:buSzTx/>
-              <a:buFont typeface="Wingdings" panose="05000000000000000000" pitchFamily="2" charset="2"/>
-              <a:buChar char="ü"/>
-            </a:pPr>
-            <a:r>
-              <a:rPr lang="bg-BG" sz="2000" dirty="0">
-                <a:solidFill>
-                  <a:srgbClr val="1B75C7"/>
-                </a:solidFill>
-                <a:latin typeface="Arial" panose="020B0604020202020204" pitchFamily="34" charset="0"/>
-                <a:cs typeface="Arial" panose="020B0604020202020204" pitchFamily="34" charset="0"/>
-              </a:rPr>
-              <a:t>Да прехвърли всички 9-ти класове в 10-ти </a:t>
-            </a:r>
-            <a:r>
-              <a:rPr lang="bg-BG" sz="2000" dirty="0" smtClean="0">
-                <a:solidFill>
-                  <a:srgbClr val="1B75C7"/>
-                </a:solidFill>
-                <a:latin typeface="Arial" panose="020B0604020202020204" pitchFamily="34" charset="0"/>
-                <a:cs typeface="Arial" panose="020B0604020202020204" pitchFamily="34" charset="0"/>
-              </a:rPr>
-              <a:t>клас и т.н.;</a:t>
-            </a:r>
-            <a:endParaRPr lang="bg-BG" sz="2000" dirty="0">
-              <a:solidFill>
-                <a:srgbClr val="1B75C7"/>
-              </a:solidFill>
-              <a:latin typeface="Arial" panose="020B0604020202020204" pitchFamily="34" charset="0"/>
-              <a:cs typeface="Arial" panose="020B0604020202020204" pitchFamily="34" charset="0"/>
-            </a:endParaRPr>
-          </a:p>
-          <a:p>
-            <a:pPr marL="1063625" lvl="0" indent="-342900" defTabSz="914400" fontAlgn="base">
-              <a:spcBef>
-                <a:spcPct val="0"/>
-              </a:spcBef>
-              <a:spcAft>
-                <a:spcPct val="0"/>
-              </a:spcAft>
-              <a:buClrTx/>
-              <a:buSzTx/>
-              <a:buFont typeface="Wingdings" panose="05000000000000000000" pitchFamily="2" charset="2"/>
-              <a:buChar char="ü"/>
-            </a:pPr>
-            <a:r>
-              <a:rPr lang="bg-BG" sz="2000" dirty="0">
-                <a:solidFill>
-                  <a:srgbClr val="1B75C7"/>
-                </a:solidFill>
-                <a:latin typeface="Arial" panose="020B0604020202020204" pitchFamily="34" charset="0"/>
-                <a:cs typeface="Arial" panose="020B0604020202020204" pitchFamily="34" charset="0"/>
-              </a:rPr>
-              <a:t>Имената на учениците от тези </a:t>
-            </a:r>
-            <a:r>
-              <a:rPr lang="bg-BG" sz="2000" dirty="0" smtClean="0">
-                <a:solidFill>
-                  <a:srgbClr val="1B75C7"/>
-                </a:solidFill>
-                <a:latin typeface="Arial" panose="020B0604020202020204" pitchFamily="34" charset="0"/>
-                <a:cs typeface="Arial" panose="020B0604020202020204" pitchFamily="34" charset="0"/>
-              </a:rPr>
-              <a:t>класове;</a:t>
-            </a:r>
-            <a:endParaRPr lang="bg-BG" sz="2000" dirty="0">
-              <a:solidFill>
-                <a:srgbClr val="1B75C7"/>
-              </a:solidFill>
-              <a:latin typeface="Arial" panose="020B0604020202020204" pitchFamily="34" charset="0"/>
-              <a:cs typeface="Arial" panose="020B0604020202020204" pitchFamily="34" charset="0"/>
-            </a:endParaRPr>
-          </a:p>
-          <a:p>
-            <a:pPr marL="1063625" lvl="0" indent="-342900" defTabSz="914400" fontAlgn="base">
-              <a:spcBef>
-                <a:spcPct val="0"/>
-              </a:spcBef>
-              <a:spcAft>
-                <a:spcPct val="0"/>
-              </a:spcAft>
-              <a:buClrTx/>
-              <a:buSzTx/>
-              <a:buFont typeface="Wingdings" panose="05000000000000000000" pitchFamily="2" charset="2"/>
-              <a:buChar char="ü"/>
-            </a:pPr>
-            <a:r>
-              <a:rPr lang="bg-BG" sz="2000" dirty="0">
-                <a:solidFill>
-                  <a:srgbClr val="1B75C7"/>
-                </a:solidFill>
-                <a:latin typeface="Arial" panose="020B0604020202020204" pitchFamily="34" charset="0"/>
-                <a:cs typeface="Arial" panose="020B0604020202020204" pitchFamily="34" charset="0"/>
-              </a:rPr>
-              <a:t>Данните на </a:t>
-            </a:r>
-            <a:r>
-              <a:rPr lang="bg-BG" sz="2000" dirty="0" smtClean="0">
-                <a:solidFill>
-                  <a:srgbClr val="1B75C7"/>
-                </a:solidFill>
-                <a:latin typeface="Arial" panose="020B0604020202020204" pitchFamily="34" charset="0"/>
-                <a:cs typeface="Arial" panose="020B0604020202020204" pitchFamily="34" charset="0"/>
-              </a:rPr>
-              <a:t>учителите - </a:t>
-            </a:r>
-            <a:r>
-              <a:rPr lang="bg-BG" sz="2000" dirty="0">
-                <a:solidFill>
-                  <a:srgbClr val="1B75C7"/>
-                </a:solidFill>
-                <a:latin typeface="Arial" panose="020B0604020202020204" pitchFamily="34" charset="0"/>
-                <a:cs typeface="Arial" panose="020B0604020202020204" pitchFamily="34" charset="0"/>
-              </a:rPr>
-              <a:t>класни </a:t>
-            </a:r>
-            <a:r>
-              <a:rPr lang="bg-BG" sz="2000" dirty="0" smtClean="0">
-                <a:solidFill>
-                  <a:srgbClr val="1B75C7"/>
-                </a:solidFill>
-                <a:latin typeface="Arial" panose="020B0604020202020204" pitchFamily="34" charset="0"/>
-                <a:cs typeface="Arial" panose="020B0604020202020204" pitchFamily="34" charset="0"/>
-              </a:rPr>
-              <a:t>ръководители;</a:t>
-            </a:r>
-            <a:endParaRPr lang="bg-BG" sz="2000" dirty="0">
-              <a:solidFill>
-                <a:srgbClr val="1B75C7"/>
-              </a:solidFill>
-              <a:latin typeface="Arial" panose="020B0604020202020204" pitchFamily="34" charset="0"/>
-              <a:cs typeface="Arial" panose="020B0604020202020204" pitchFamily="34" charset="0"/>
-            </a:endParaRPr>
-          </a:p>
-          <a:p>
-            <a:pPr marL="1063625" lvl="0" indent="-342900" defTabSz="914400" fontAlgn="base">
-              <a:spcBef>
-                <a:spcPct val="0"/>
-              </a:spcBef>
-              <a:spcAft>
-                <a:spcPct val="0"/>
-              </a:spcAft>
-              <a:buClrTx/>
-              <a:buSzTx/>
-              <a:buFont typeface="Wingdings" panose="05000000000000000000" pitchFamily="2" charset="2"/>
-              <a:buChar char="ü"/>
-            </a:pPr>
-            <a:r>
-              <a:rPr lang="bg-BG" sz="2000" dirty="0">
-                <a:solidFill>
-                  <a:srgbClr val="1B75C7"/>
-                </a:solidFill>
-                <a:latin typeface="Arial" panose="020B0604020202020204" pitchFamily="34" charset="0"/>
-                <a:cs typeface="Arial" panose="020B0604020202020204" pitchFamily="34" charset="0"/>
-              </a:rPr>
-              <a:t>Названията на населените места (градове и села) от адресите на </a:t>
-            </a:r>
-            <a:r>
-              <a:rPr lang="bg-BG" sz="2000" dirty="0" smtClean="0">
-                <a:solidFill>
-                  <a:srgbClr val="1B75C7"/>
-                </a:solidFill>
-                <a:latin typeface="Arial" panose="020B0604020202020204" pitchFamily="34" charset="0"/>
-                <a:cs typeface="Arial" panose="020B0604020202020204" pitchFamily="34" charset="0"/>
-              </a:rPr>
-              <a:t>учениците;</a:t>
-            </a:r>
-            <a:endParaRPr lang="bg-BG" sz="2000" dirty="0">
-              <a:solidFill>
-                <a:srgbClr val="1B75C7"/>
-              </a:solidFill>
-              <a:latin typeface="Arial" panose="020B0604020202020204" pitchFamily="34" charset="0"/>
-              <a:cs typeface="Arial" panose="020B0604020202020204" pitchFamily="34" charset="0"/>
-            </a:endParaRPr>
-          </a:p>
-          <a:p>
-            <a:endParaRPr lang="bg-BG" dirty="0"/>
+            <a:endParaRPr lang="en-US"/>
           </a:p>
         </p:txBody>
       </p:sp>
     </p:spTree>
     <p:extLst>
       <p:ext uri="{BB962C8B-B14F-4D97-AF65-F5344CB8AC3E}">
-        <p14:creationId xmlns:p14="http://schemas.microsoft.com/office/powerpoint/2010/main" val="1211743575"/>
+        <p14:creationId xmlns:p14="http://schemas.microsoft.com/office/powerpoint/2010/main" val="1875009306"/>
       </p:ext>
     </p:extLst>
   </p:cSld>
   <p:clrMapOvr>
     <a:masterClrMapping/>
   </p:clrMapOvr>
+  <p:timing>
+    <p:tnLst>
+      <p:par>
+        <p:cTn id="1" dur="indefinite" restart="never" nodeType="tmRoot"/>
+      </p:par>
+    </p:tnLst>
+  </p:timing>
 </p:sld>
 </file>
 
@@ -25469,30 +26600,7 @@
           </a:bodyPr>
           <a:lstStyle/>
           <a:p>
-            <a:r>
-              <a:rPr lang="bg-BG" sz="4800" dirty="0">
-                <a:ln w="3175" cmpd="sng">
-                  <a:solidFill>
-                    <a:srgbClr val="212121">
-                      <a:lumMod val="50000"/>
-                      <a:lumOff val="50000"/>
-                    </a:srgbClr>
-                  </a:solidFill>
-                </a:ln>
-                <a:solidFill>
-                  <a:srgbClr val="4094E0"/>
-                </a:solidFill>
-                <a:effectLst>
-                  <a:outerShdw blurRad="38100" dist="38100" dir="2700000" algn="tl">
-                    <a:srgbClr val="000000">
-                      <a:alpha val="43137"/>
-                    </a:srgbClr>
-                  </a:outerShdw>
-                </a:effectLst>
-              </a:rPr>
-              <a:t>Същност</a:t>
-            </a:r>
-            <a:endParaRPr lang="bg-BG" sz="4800" dirty="0"/>
+            <a:endParaRPr lang="bg-BG" sz="4400" dirty="0"/>
           </a:p>
         </p:txBody>
       </p:sp>
@@ -25508,8 +26616,8 @@
         </p:nvSpPr>
         <p:spPr>
           <a:xfrm>
-            <a:off x="982133" y="1447800"/>
-            <a:ext cx="7704667" cy="4552016"/>
+            <a:off x="995988" y="1447800"/>
+            <a:ext cx="7933267" cy="4780616"/>
           </a:xfrm>
         </p:spPr>
         <p:txBody>
@@ -25518,42 +26626,83 @@
           </a:bodyPr>
           <a:lstStyle/>
           <a:p>
-            <a:pPr marL="720725" indent="0" defTabSz="914400" fontAlgn="base">
+            <a:pPr marL="457200" lvl="1" indent="0" defTabSz="914400" fontAlgn="base">
               <a:spcBef>
-                <a:spcPct val="0"/>
+                <a:spcPts val="600"/>
               </a:spcBef>
               <a:spcAft>
                 <a:spcPct val="0"/>
               </a:spcAft>
               <a:buClrTx/>
-              <a:buSzTx/>
-              <a:buNone/>
+              <a:buSzPct val="80000"/>
+              <a:buNone/>
+              <a:defRPr/>
             </a:pPr>
             <a:r>
-              <a:rPr lang="ru-RU" sz="2800" dirty="0">
+              <a:rPr lang="ru-RU" sz="3200" dirty="0" smtClean="0">
                 <a:solidFill>
                   <a:srgbClr val="1B75C7"/>
                 </a:solidFill>
                 <a:latin typeface="Arial" panose="020B0604020202020204" pitchFamily="34" charset="0"/>
                 <a:cs typeface="Arial" panose="020B0604020202020204" pitchFamily="34" charset="0"/>
               </a:rPr>
-              <a:t>Дейности на класния ръководител:</a:t>
-            </a:r>
-          </a:p>
-          <a:p>
-            <a:pPr marL="1063625" indent="-342900" defTabSz="914400" fontAlgn="base">
+              <a:t>	Целта </a:t>
+            </a:r>
+            <a:r>
+              <a:rPr lang="ru-RU" sz="3200" dirty="0">
+                <a:solidFill>
+                  <a:srgbClr val="1B75C7"/>
+                </a:solidFill>
+                <a:latin typeface="Arial" panose="020B0604020202020204" pitchFamily="34" charset="0"/>
+                <a:cs typeface="Arial" panose="020B0604020202020204" pitchFamily="34" charset="0"/>
+              </a:rPr>
+              <a:t>на </a:t>
+            </a:r>
+            <a:r>
+              <a:rPr lang="ru-RU" sz="3200" dirty="0" smtClean="0">
+                <a:solidFill>
+                  <a:srgbClr val="1B75C7"/>
+                </a:solidFill>
+                <a:latin typeface="Arial" panose="020B0604020202020204" pitchFamily="34" charset="0"/>
+                <a:cs typeface="Arial" panose="020B0604020202020204" pitchFamily="34" charset="0"/>
+              </a:rPr>
+              <a:t>нашия </a:t>
+            </a:r>
+            <a:r>
+              <a:rPr lang="ru-RU" sz="3200" dirty="0">
+                <a:solidFill>
+                  <a:srgbClr val="1B75C7"/>
+                </a:solidFill>
+                <a:latin typeface="Arial" panose="020B0604020202020204" pitchFamily="34" charset="0"/>
+                <a:cs typeface="Arial" panose="020B0604020202020204" pitchFamily="34" charset="0"/>
+              </a:rPr>
+              <a:t>проект </a:t>
+            </a:r>
+            <a:r>
+              <a:rPr lang="ru-RU" sz="3200" dirty="0" smtClean="0">
+                <a:solidFill>
+                  <a:srgbClr val="1B75C7"/>
+                </a:solidFill>
+                <a:latin typeface="Arial" panose="020B0604020202020204" pitchFamily="34" charset="0"/>
+                <a:cs typeface="Arial" panose="020B0604020202020204" pitchFamily="34" charset="0"/>
+              </a:rPr>
+              <a:t>е :</a:t>
+            </a:r>
+          </a:p>
+          <a:p>
+            <a:pPr marL="457200" lvl="1" indent="0" defTabSz="914400" fontAlgn="base">
               <a:spcBef>
-                <a:spcPct val="0"/>
+                <a:spcPts val="600"/>
               </a:spcBef>
               <a:spcAft>
                 <a:spcPct val="0"/>
               </a:spcAft>
               <a:buClrTx/>
-              <a:buSzTx/>
-              <a:buFont typeface="Wingdings" panose="05000000000000000000" pitchFamily="2" charset="2"/>
-              <a:buChar char="ü"/>
+              <a:buSzPct val="80000"/>
+              <a:buNone/>
+              <a:defRPr/>
             </a:pPr>
-            <a:endParaRPr lang="ru-RU" sz="2800" dirty="0">
+            <a:endParaRPr lang="ru-RU" sz="3200" dirty="0" smtClean="0">
               <a:solidFill>
                 <a:srgbClr val="1B75C7"/>
               </a:solidFill>
@@ -25562,103 +26711,40 @@
             </a:endParaRPr>
           </a:p>
           <a:p>
-            <a:pPr marL="1063625" indent="-342900" defTabSz="914400" fontAlgn="base">
+            <a:pPr lvl="1" defTabSz="914400" fontAlgn="base">
               <a:spcBef>
-                <a:spcPct val="0"/>
+                <a:spcPts val="600"/>
               </a:spcBef>
               <a:spcAft>
                 <a:spcPct val="0"/>
               </a:spcAft>
               <a:buClrTx/>
-              <a:buSzTx/>
+              <a:buSzPct val="80000"/>
               <a:buFont typeface="Wingdings" panose="05000000000000000000" pitchFamily="2" charset="2"/>
-              <a:buChar char="ü"/>
+              <a:buChar char="Ø"/>
+              <a:defRPr/>
             </a:pPr>
             <a:r>
-              <a:rPr lang="ru-RU" sz="2800" dirty="0">
+              <a:rPr lang="ru-RU" sz="3200" dirty="0" smtClean="0">
                 <a:solidFill>
                   <a:srgbClr val="1B75C7"/>
                 </a:solidFill>
                 <a:latin typeface="Arial" panose="020B0604020202020204" pitchFamily="34" charset="0"/>
                 <a:cs typeface="Arial" panose="020B0604020202020204" pitchFamily="34" charset="0"/>
               </a:rPr>
-              <a:t>Въвеждане на </a:t>
-            </a:r>
-            <a:r>
-              <a:rPr lang="ru-RU" sz="2800" dirty="0" smtClean="0">
+              <a:t>  Създаване на приложение</a:t>
+            </a:r>
+            <a:r>
+              <a:rPr lang="ru-RU" sz="3200" dirty="0">
                 <a:solidFill>
                   <a:srgbClr val="1B75C7"/>
                 </a:solidFill>
                 <a:latin typeface="Arial" panose="020B0604020202020204" pitchFamily="34" charset="0"/>
                 <a:cs typeface="Arial" panose="020B0604020202020204" pitchFamily="34" charset="0"/>
               </a:rPr>
-              <a:t>срочните и годишни оценки </a:t>
-            </a:r>
-            <a:r>
-              <a:rPr lang="ru-RU" sz="2800" dirty="0">
-                <a:solidFill>
-                  <a:srgbClr val="1B75C7"/>
-                </a:solidFill>
-                <a:latin typeface="Arial" panose="020B0604020202020204" pitchFamily="34" charset="0"/>
-                <a:cs typeface="Arial" panose="020B0604020202020204" pitchFamily="34" charset="0"/>
-              </a:rPr>
-              <a:t>по всички предмети  </a:t>
-            </a:r>
-            <a:r>
-              <a:rPr lang="ru-RU" sz="2800" dirty="0" smtClean="0">
-                <a:solidFill>
-                  <a:srgbClr val="1B75C7"/>
-                </a:solidFill>
-                <a:latin typeface="Arial" panose="020B0604020202020204" pitchFamily="34" charset="0"/>
-                <a:cs typeface="Arial" panose="020B0604020202020204" pitchFamily="34" charset="0"/>
-              </a:rPr>
-              <a:t>за учебната година, както и отсъствията;</a:t>
-            </a:r>
-          </a:p>
-          <a:p>
-            <a:pPr marL="1063625" indent="-342900" defTabSz="914400" fontAlgn="base">
-              <a:spcBef>
-                <a:spcPct val="0"/>
-              </a:spcBef>
-              <a:spcAft>
-                <a:spcPct val="0"/>
-              </a:spcAft>
-              <a:buClrTx/>
-              <a:buSzTx/>
-              <a:buFont typeface="Wingdings" panose="05000000000000000000" pitchFamily="2" charset="2"/>
-              <a:buChar char="ü"/>
-            </a:pPr>
-            <a:r>
-              <a:rPr lang="ru-RU" sz="2800" dirty="0" smtClean="0">
-                <a:solidFill>
-                  <a:srgbClr val="1B75C7"/>
-                </a:solidFill>
-                <a:latin typeface="Arial" panose="020B0604020202020204" pitchFamily="34" charset="0"/>
-                <a:cs typeface="Arial" panose="020B0604020202020204" pitchFamily="34" charset="0"/>
-              </a:rPr>
-              <a:t>Въвеждане на оценките от </a:t>
-            </a:r>
-            <a:r>
-              <a:rPr lang="ru-RU" sz="2800" dirty="0">
-                <a:solidFill>
-                  <a:srgbClr val="1B75C7"/>
-                </a:solidFill>
-                <a:latin typeface="Arial" panose="020B0604020202020204" pitchFamily="34" charset="0"/>
-                <a:cs typeface="Arial" panose="020B0604020202020204" pitchFamily="34" charset="0"/>
-              </a:rPr>
-              <a:t>успешно </a:t>
-            </a:r>
-            <a:r>
-              <a:rPr lang="ru-RU" sz="2800" dirty="0" smtClean="0">
-                <a:solidFill>
-                  <a:srgbClr val="1B75C7"/>
-                </a:solidFill>
-                <a:latin typeface="Arial" panose="020B0604020202020204" pitchFamily="34" charset="0"/>
-                <a:cs typeface="Arial" panose="020B0604020202020204" pitchFamily="34" charset="0"/>
-              </a:rPr>
-              <a:t>положените изпитити от ДЗИ при завършване на 12 клас; </a:t>
-            </a:r>
-            <a:endParaRPr lang="ru-RU" sz="2800" dirty="0">
+              <a:t>, което напълно да автоматизира воденето на личния картон на ученика в едно средно училище и да е в помощ при изработването на дипломата за средно образование като изходен документ.</a:t>
+            </a:r>
+            <a:endParaRPr lang="bg-BG" sz="3200" dirty="0">
               <a:solidFill>
                 <a:srgbClr val="1B75C7"/>
               </a:solidFill>
@@ -25667,40 +26753,6 @@
             </a:endParaRPr>
           </a:p>
           <a:p>
-            <a:pPr marL="1063625" indent="-342900" defTabSz="914400" fontAlgn="base">
-              <a:spcBef>
-                <a:spcPct val="0"/>
-              </a:spcBef>
-              <a:spcAft>
-                <a:spcPct val="0"/>
-              </a:spcAft>
-              <a:buClrTx/>
-              <a:buSzTx/>
-              <a:buFont typeface="Wingdings" panose="05000000000000000000" pitchFamily="2" charset="2"/>
-              <a:buChar char="ü"/>
-            </a:pPr>
-            <a:r>
-              <a:rPr lang="ru-RU" sz="2800" dirty="0" smtClean="0">
-                <a:solidFill>
-                  <a:srgbClr val="1B75C7"/>
-                </a:solidFill>
-                <a:latin typeface="Arial" panose="020B0604020202020204" pitchFamily="34" charset="0"/>
-                <a:cs typeface="Arial" panose="020B0604020202020204" pitchFamily="34" charset="0"/>
-              </a:rPr>
-              <a:t>Възможност </a:t>
-            </a:r>
-            <a:r>
-              <a:rPr lang="ru-RU" sz="2800" dirty="0">
-                <a:solidFill>
-                  <a:srgbClr val="1B75C7"/>
-                </a:solidFill>
-                <a:latin typeface="Arial" panose="020B0604020202020204" pitchFamily="34" charset="0"/>
-                <a:cs typeface="Arial" panose="020B0604020202020204" pitchFamily="34" charset="0"/>
-              </a:rPr>
-              <a:t>за промяна/редактиране на оценки.</a:t>
-            </a:r>
-          </a:p>
-          <a:p>
             <a:endParaRPr lang="bg-BG" dirty="0"/>
           </a:p>
         </p:txBody>
@@ -25708,13 +26760,20 @@
     </p:spTree>
     <p:extLst>
       <p:ext uri="{BB962C8B-B14F-4D97-AF65-F5344CB8AC3E}">
-        <p14:creationId xmlns:p14="http://schemas.microsoft.com/office/powerpoint/2010/main" val="3862014874"/>
+        <p14:creationId xmlns:p14="http://schemas.microsoft.com/office/powerpoint/2010/main" val="477284858"/>
       </p:ext>
     </p:extLst>
   </p:cSld>
   <p:clrMapOvr>
     <a:masterClrMapping/>
   </p:clrMapOvr>
+  <p:timing>
+    <p:tnLst>
+      <p:par>
+        <p:cTn id="1" dur="indefinite" restart="never" nodeType="tmRoot"/>
+      </p:par>
+    </p:tnLst>
+  </p:timing>
 </p:sld>
 </file>
 
@@ -25745,261 +26804,73 @@
             <p:ph type="title"/>
           </p:nvPr>
         </p:nvSpPr>
-        <p:spPr>
-          <a:xfrm>
-            <a:off x="982133" y="304800"/>
-            <a:ext cx="7704667" cy="609599"/>
-          </a:xfrm>
-        </p:spPr>
-        <p:txBody>
-          <a:bodyPr>
-            <a:noAutofit/>
-          </a:bodyPr>
+        <p:spPr/>
+        <p:txBody>
+          <a:bodyPr/>
           <a:lstStyle/>
           <a:p>
             <a:r>
-              <a:rPr lang="bg-BG" sz="4800" dirty="0">
-                <a:ln w="3175" cmpd="sng">
-                  <a:solidFill>
-                    <a:srgbClr val="212121">
-                      <a:lumMod val="50000"/>
-                      <a:lumOff val="50000"/>
-                    </a:srgbClr>
-                  </a:solidFill>
-                </a:ln>
-                <a:solidFill>
-                  <a:srgbClr val="4094E0"/>
-                </a:solidFill>
-                <a:effectLst>
-                  <a:outerShdw blurRad="38100" dist="38100" dir="2700000" algn="tl">
-                    <a:srgbClr val="000000">
-                      <a:alpha val="43137"/>
-                    </a:srgbClr>
-                  </a:outerShdw>
-                </a:effectLst>
+              <a:rPr lang="bg-BG" sz="6200" b="1" i="1" dirty="0" smtClean="0">
+                <a:solidFill>
+                  <a:schemeClr val="accent1">
+                    <a:lumMod val="75000"/>
+                  </a:schemeClr>
+                </a:solidFill>
               </a:rPr>
               <a:t>Същност</a:t>
             </a:r>
-            <a:endParaRPr lang="bg-BG" sz="4800" dirty="0"/>
-          </a:p>
-        </p:txBody>
-      </p:sp>
-      <p:sp>
-        <p:nvSpPr>
-          <p:cNvPr id="3" name="Content Placeholder 2"/>
+            <a:endParaRPr lang="en-US" sz="6200" b="1" i="1" dirty="0">
+              <a:solidFill>
+                <a:schemeClr val="accent1">
+                  <a:lumMod val="75000"/>
+                </a:schemeClr>
+              </a:solidFill>
+            </a:endParaRPr>
+          </a:p>
+        </p:txBody>
+      </p:sp>
+      <p:sp>
+        <p:nvSpPr>
+          <p:cNvPr id="3" name="Text Placeholder 2"/>
           <p:cNvSpPr>
             <a:spLocks noGrp="1"/>
           </p:cNvSpPr>
           <p:nvPr>
-            <p:ph idx="1"/>
-          </p:nvPr>
-        </p:nvSpPr>
-        <p:spPr>
-          <a:xfrm>
-            <a:off x="982133" y="1295401"/>
-            <a:ext cx="8161867" cy="5562599"/>
-          </a:xfrm>
-        </p:spPr>
-        <p:txBody>
-          <a:bodyPr>
-            <a:noAutofit/>
-          </a:bodyPr>
+            <p:ph type="body" idx="1"/>
+          </p:nvPr>
+        </p:nvSpPr>
+        <p:spPr/>
+        <p:txBody>
+          <a:bodyPr/>
           <a:lstStyle/>
           <a:p>
-            <a:pPr marL="720725" lvl="0" indent="0" defTabSz="914400" fontAlgn="base">
-              <a:spcBef>
-                <a:spcPct val="0"/>
-              </a:spcBef>
-              <a:spcAft>
-                <a:spcPct val="0"/>
-              </a:spcAft>
-              <a:buClrTx/>
-              <a:buSzTx/>
-              <a:buNone/>
-            </a:pPr>
-            <a:r>
-              <a:rPr lang="ru-RU" sz="3200" dirty="0" smtClean="0">
-                <a:solidFill>
-                  <a:srgbClr val="1B75C7"/>
-                </a:solidFill>
-                <a:latin typeface="Arial" panose="020B0604020202020204" pitchFamily="34" charset="0"/>
-                <a:cs typeface="Arial" panose="020B0604020202020204" pitchFamily="34" charset="0"/>
-              </a:rPr>
-              <a:t>Накрая програмата: </a:t>
-            </a:r>
-          </a:p>
-          <a:p>
-            <a:pPr marL="1063625" lvl="0" indent="-342900" defTabSz="914400" fontAlgn="base">
-              <a:spcBef>
-                <a:spcPct val="0"/>
-              </a:spcBef>
-              <a:spcAft>
-                <a:spcPct val="0"/>
-              </a:spcAft>
-              <a:buClrTx/>
-              <a:buSzTx/>
-              <a:buFont typeface="Wingdings" panose="05000000000000000000" pitchFamily="2" charset="2"/>
-              <a:buChar char="ü"/>
-            </a:pPr>
-            <a:r>
-              <a:rPr lang="ru-RU" sz="3200" dirty="0" smtClean="0">
-                <a:solidFill>
-                  <a:srgbClr val="1B75C7"/>
-                </a:solidFill>
-                <a:latin typeface="Arial" panose="020B0604020202020204" pitchFamily="34" charset="0"/>
-                <a:cs typeface="Arial" panose="020B0604020202020204" pitchFamily="34" charset="0"/>
-              </a:rPr>
-              <a:t>Изчислява оценките</a:t>
-            </a:r>
-            <a:r>
-              <a:rPr lang="ru-RU" sz="3200" dirty="0">
-                <a:solidFill>
-                  <a:srgbClr val="1B75C7"/>
-                </a:solidFill>
-                <a:latin typeface="Arial" panose="020B0604020202020204" pitchFamily="34" charset="0"/>
-                <a:cs typeface="Arial" panose="020B0604020202020204" pitchFamily="34" charset="0"/>
-              </a:rPr>
-              <a:t>, които ще участват в </a:t>
-            </a:r>
-            <a:r>
-              <a:rPr lang="ru-RU" sz="3200" dirty="0" smtClean="0">
-                <a:solidFill>
-                  <a:srgbClr val="1B75C7"/>
-                </a:solidFill>
-                <a:latin typeface="Arial" panose="020B0604020202020204" pitchFamily="34" charset="0"/>
-                <a:cs typeface="Arial" panose="020B0604020202020204" pitchFamily="34" charset="0"/>
-              </a:rPr>
-              <a:t>дипломата;</a:t>
-            </a:r>
-            <a:endParaRPr lang="ru-RU" sz="3200" dirty="0">
-              <a:solidFill>
-                <a:srgbClr val="1B75C7"/>
-              </a:solidFill>
-              <a:latin typeface="Arial" panose="020B0604020202020204" pitchFamily="34" charset="0"/>
-              <a:cs typeface="Arial" panose="020B0604020202020204" pitchFamily="34" charset="0"/>
-            </a:endParaRPr>
-          </a:p>
-          <a:p>
-            <a:pPr marL="1063625" lvl="0" indent="-342900" defTabSz="914400" fontAlgn="base">
-              <a:spcBef>
-                <a:spcPct val="0"/>
-              </a:spcBef>
-              <a:spcAft>
-                <a:spcPct val="0"/>
-              </a:spcAft>
-              <a:buClrTx/>
-              <a:buSzTx/>
-              <a:buFont typeface="Wingdings" panose="05000000000000000000" pitchFamily="2" charset="2"/>
-              <a:buChar char="ü"/>
-            </a:pPr>
-            <a:r>
-              <a:rPr lang="ru-RU" sz="3200" dirty="0" smtClean="0">
-                <a:solidFill>
-                  <a:srgbClr val="1B75C7"/>
-                </a:solidFill>
-                <a:latin typeface="Arial" panose="020B0604020202020204" pitchFamily="34" charset="0"/>
-                <a:cs typeface="Arial" panose="020B0604020202020204" pitchFamily="34" charset="0"/>
-              </a:rPr>
-              <a:t>Изчислява средния </a:t>
-            </a:r>
-            <a:r>
-              <a:rPr lang="ru-RU" sz="3200" dirty="0">
-                <a:solidFill>
-                  <a:srgbClr val="1B75C7"/>
-                </a:solidFill>
-                <a:latin typeface="Arial" panose="020B0604020202020204" pitchFamily="34" charset="0"/>
-                <a:cs typeface="Arial" panose="020B0604020202020204" pitchFamily="34" charset="0"/>
-              </a:rPr>
-              <a:t>успех </a:t>
-            </a:r>
-            <a:r>
-              <a:rPr lang="ru-RU" sz="3200" dirty="0" smtClean="0">
-                <a:solidFill>
-                  <a:srgbClr val="1B75C7"/>
-                </a:solidFill>
-                <a:latin typeface="Arial" panose="020B0604020202020204" pitchFamily="34" charset="0"/>
-                <a:cs typeface="Arial" panose="020B0604020202020204" pitchFamily="34" charset="0"/>
-              </a:rPr>
-              <a:t>от </a:t>
-            </a:r>
-            <a:r>
-              <a:rPr lang="ru-RU" sz="3200" dirty="0">
-                <a:solidFill>
-                  <a:srgbClr val="1B75C7"/>
-                </a:solidFill>
-                <a:latin typeface="Arial" panose="020B0604020202020204" pitchFamily="34" charset="0"/>
-                <a:cs typeface="Arial" panose="020B0604020202020204" pitchFamily="34" charset="0"/>
-              </a:rPr>
-              <a:t>диплома за завършено средно </a:t>
-            </a:r>
-            <a:r>
-              <a:rPr lang="ru-RU" sz="3200" dirty="0" smtClean="0">
-                <a:solidFill>
-                  <a:srgbClr val="1B75C7"/>
-                </a:solidFill>
-                <a:latin typeface="Arial" panose="020B0604020202020204" pitchFamily="34" charset="0"/>
-                <a:cs typeface="Arial" panose="020B0604020202020204" pitchFamily="34" charset="0"/>
-              </a:rPr>
-              <a:t>образование;</a:t>
-            </a:r>
-          </a:p>
-          <a:p>
-            <a:pPr marL="1063625" lvl="0" indent="-342900" defTabSz="914400" fontAlgn="base">
-              <a:spcBef>
-                <a:spcPct val="0"/>
-              </a:spcBef>
-              <a:spcAft>
-                <a:spcPct val="0"/>
-              </a:spcAft>
-              <a:buClrTx/>
-              <a:buSzTx/>
-              <a:buFont typeface="Wingdings" panose="05000000000000000000" pitchFamily="2" charset="2"/>
-              <a:buChar char="ü"/>
-            </a:pPr>
-            <a:r>
-              <a:rPr lang="ru-RU" sz="3200" dirty="0" smtClean="0">
-                <a:solidFill>
-                  <a:srgbClr val="1B75C7"/>
-                </a:solidFill>
-                <a:latin typeface="Arial" panose="020B0604020202020204" pitchFamily="34" charset="0"/>
-                <a:cs typeface="Arial" panose="020B0604020202020204" pitchFamily="34" charset="0"/>
-              </a:rPr>
-              <a:t>Разпечатва документ с тези оценки, който може да послужи за вход на програмата АдминПро, чрез която официално се отпечатват дипломите.</a:t>
-            </a:r>
-            <a:endParaRPr lang="ru-RU" sz="3200" dirty="0">
-              <a:solidFill>
-                <a:srgbClr val="1B75C7"/>
-              </a:solidFill>
-              <a:latin typeface="Arial" panose="020B0604020202020204" pitchFamily="34" charset="0"/>
-              <a:cs typeface="Arial" panose="020B0604020202020204" pitchFamily="34" charset="0"/>
-            </a:endParaRPr>
-          </a:p>
-          <a:p>
-            <a:endParaRPr lang="bg-BG" sz="3200" dirty="0"/>
+            <a:endParaRPr lang="en-US"/>
           </a:p>
         </p:txBody>
       </p:sp>
     </p:spTree>
     <p:extLst>
       <p:ext uri="{BB962C8B-B14F-4D97-AF65-F5344CB8AC3E}">
-        <p14:creationId xmlns:p14="http://schemas.microsoft.com/office/powerpoint/2010/main" val="2222802274"/>
+        <p14:creationId xmlns:p14="http://schemas.microsoft.com/office/powerpoint/2010/main" val="2372267286"/>
       </p:ext>
     </p:extLst>
   </p:cSld>
   <p:clrMapOvr>
     <a:masterClrMapping/>
   </p:clrMapOvr>
+  <p:timing>
+    <p:tnLst>
+      <p:par>
+        <p:cTn id="1" dur="indefinite" restart="never" nodeType="tmRoot"/>
+      </p:par>
+    </p:tnLst>
+  </p:timing>
 </p:sld>
 </file>
 
 <file path=ppt/slides/slide8.xml><?xml version="1.0" encoding="utf-8"?>
 <p:sld xmlns:a="http://schemas.openxmlformats.org/drawingml/2006/main" xmlns:r="http://schemas.openxmlformats.org/officeDocument/2006/relationships" xmlns:p="http://schemas.openxmlformats.org/presentationml/2006/main">
   <p:cSld>
-    <p:bg>
-      <p:bgRef idx="1003">
-        <a:schemeClr val="bg2"/>
-      </p:bgRef>
-    </p:bg>
     <p:spTree>
       <p:nvGrpSpPr>
         <p:cNvPr id="1" name=""/>
@@ -26026,39 +26897,17 @@
         </p:nvSpPr>
         <p:spPr>
           <a:xfrm>
-            <a:off x="1219200" y="457201"/>
-            <a:ext cx="7467600" cy="914399"/>
+            <a:off x="982133" y="228601"/>
+            <a:ext cx="7704667" cy="457200"/>
           </a:xfrm>
         </p:spPr>
         <p:txBody>
           <a:bodyPr>
-            <a:normAutofit/>
+            <a:noAutofit/>
           </a:bodyPr>
           <a:lstStyle/>
           <a:p>
-            <a:r>
-              <a:rPr lang="bg-BG" sz="4400" dirty="0">
-                <a:ln w="3175" cmpd="sng">
-                  <a:solidFill>
-                    <a:schemeClr val="tx2">
-                      <a:lumMod val="50000"/>
-                      <a:lumOff val="50000"/>
-                    </a:schemeClr>
-                  </a:solidFill>
-                </a:ln>
-                <a:solidFill>
-                  <a:srgbClr val="4094E0"/>
-                </a:solidFill>
-                <a:effectLst>
-                  <a:outerShdw blurRad="38100" dist="38100" dir="2700000" algn="tl">
-                    <a:srgbClr val="000000">
-                      <a:alpha val="43137"/>
-                    </a:srgbClr>
-                  </a:outerShdw>
-                </a:effectLst>
-              </a:rPr>
-              <a:t>Използвани технологии</a:t>
-            </a:r>
+            <a:endParaRPr lang="bg-BG" sz="4800" dirty="0"/>
           </a:p>
         </p:txBody>
       </p:sp>
@@ -26074,110 +26923,706 @@
         </p:nvSpPr>
         <p:spPr>
           <a:xfrm>
-            <a:off x="982133" y="1676400"/>
-            <a:ext cx="7704667" cy="3332816"/>
+            <a:off x="968278" y="990600"/>
+            <a:ext cx="8085667" cy="5715000"/>
           </a:xfrm>
         </p:spPr>
         <p:txBody>
           <a:bodyPr>
-            <a:normAutofit/>
+            <a:normAutofit fontScale="92500"/>
           </a:bodyPr>
           <a:lstStyle/>
           <a:p>
-            <a:pPr marL="0" indent="0">
-              <a:buNone/>
+            <a:pPr marL="457200" lvl="1" indent="0" defTabSz="914400" fontAlgn="base">
+              <a:spcBef>
+                <a:spcPts val="600"/>
+              </a:spcBef>
+              <a:spcAft>
+                <a:spcPct val="0"/>
+              </a:spcAft>
+              <a:buClrTx/>
+              <a:buSzPct val="80000"/>
+              <a:buNone/>
+              <a:defRPr/>
             </a:pPr>
             <a:r>
-              <a:rPr lang="ru-RU" sz="3200" dirty="0">
+              <a:rPr lang="ru-RU" sz="2400" dirty="0">
                 <a:solidFill>
                   <a:srgbClr val="1B75C7"/>
                 </a:solidFill>
-                <a:latin typeface="Arial" charset="0"/>
-                <a:cs typeface="Arial" charset="0"/>
+                <a:latin typeface="Arial" panose="020B0604020202020204" pitchFamily="34" charset="0"/>
+                <a:cs typeface="Arial" panose="020B0604020202020204" pitchFamily="34" charset="0"/>
               </a:rPr>
-              <a:t>За реализацията на проекта използвахме Microsoft SQL Server за създаване и поддържане на базата от </a:t>
-            </a:r>
-            <a:r>
-              <a:rPr lang="ru-RU" sz="3200" dirty="0" smtClean="0">
+              <a:t>Проектът представлява приложна програма, работеща с база от данни и </a:t>
+            </a:r>
+            <a:r>
+              <a:rPr lang="ru-RU" sz="2400" dirty="0" smtClean="0">
                 <a:solidFill>
                   <a:srgbClr val="1B75C7"/>
                 </a:solidFill>
-                <a:latin typeface="Arial" charset="0"/>
-                <a:cs typeface="Arial" charset="0"/>
+                <a:latin typeface="Arial" panose="020B0604020202020204" pitchFamily="34" charset="0"/>
+                <a:cs typeface="Arial" panose="020B0604020202020204" pitchFamily="34" charset="0"/>
               </a:rPr>
-              <a:t>данни и Microsoft </a:t>
-            </a:r>
-            <a:r>
-              <a:rPr lang="ru-RU" sz="3200" dirty="0">
+              <a:t>предлагаща </a:t>
+            </a:r>
+            <a:r>
+              <a:rPr lang="ru-RU" sz="2400" dirty="0">
                 <a:solidFill>
                   <a:srgbClr val="1B75C7"/>
                 </a:solidFill>
-                <a:latin typeface="Arial" charset="0"/>
-                <a:cs typeface="Arial" charset="0"/>
+                <a:latin typeface="Arial" panose="020B0604020202020204" pitchFamily="34" charset="0"/>
+                <a:cs typeface="Arial" panose="020B0604020202020204" pitchFamily="34" charset="0"/>
               </a:rPr>
-              <a:t>Visual Studio за реализация на </a:t>
-            </a:r>
-            <a:r>
-              <a:rPr lang="ru-RU" sz="3200" dirty="0" smtClean="0">
+              <a:t>следните дейности</a:t>
+            </a:r>
+            <a:r>
+              <a:rPr lang="ru-RU" sz="2400" dirty="0" smtClean="0">
                 <a:solidFill>
                   <a:srgbClr val="1B75C7"/>
                 </a:solidFill>
-                <a:latin typeface="Arial" charset="0"/>
-                <a:cs typeface="Arial" charset="0"/>
+                <a:latin typeface="Arial" panose="020B0604020202020204" pitchFamily="34" charset="0"/>
+                <a:cs typeface="Arial" panose="020B0604020202020204" pitchFamily="34" charset="0"/>
               </a:rPr>
-              <a:t>интерфейса и бизнес-логиката. Програмният </a:t>
-            </a:r>
-            <a:r>
-              <a:rPr lang="ru-RU" sz="3200" dirty="0">
+              <a:t>:</a:t>
+            </a:r>
+          </a:p>
+          <a:p>
+            <a:pPr marL="457200" lvl="1" indent="0" defTabSz="914400" fontAlgn="base">
+              <a:spcBef>
+                <a:spcPts val="600"/>
+              </a:spcBef>
+              <a:spcAft>
+                <a:spcPct val="0"/>
+              </a:spcAft>
+              <a:buClrTx/>
+              <a:buSzPct val="80000"/>
+              <a:buNone/>
+              <a:defRPr/>
+            </a:pPr>
+            <a:r>
+              <a:rPr lang="ru-RU" sz="2400" dirty="0" smtClean="0">
                 <a:solidFill>
                   <a:srgbClr val="1B75C7"/>
                 </a:solidFill>
-                <a:latin typeface="Arial" charset="0"/>
-                <a:cs typeface="Arial" charset="0"/>
+                <a:latin typeface="Arial" panose="020B0604020202020204" pitchFamily="34" charset="0"/>
+                <a:cs typeface="Arial" panose="020B0604020202020204" pitchFamily="34" charset="0"/>
               </a:rPr>
-              <a:t>код </a:t>
-            </a:r>
-            <a:r>
-              <a:rPr lang="ru-RU" sz="3200" dirty="0" smtClean="0">
-                <a:solidFill>
-                  <a:srgbClr val="1B75C7"/>
-                </a:solidFill>
-                <a:latin typeface="Arial" charset="0"/>
-                <a:cs typeface="Arial" charset="0"/>
-              </a:rPr>
-              <a:t>е на C#. </a:t>
-            </a:r>
-            <a:endParaRPr lang="bg-BG" sz="3200" dirty="0">
+              <a:t> </a:t>
+            </a:r>
+            <a:endParaRPr lang="ru-RU" sz="2400" dirty="0">
               <a:solidFill>
                 <a:srgbClr val="1B75C7"/>
               </a:solidFill>
-              <a:latin typeface="Arial" charset="0"/>
-              <a:cs typeface="Arial" charset="0"/>
+              <a:latin typeface="Arial" panose="020B0604020202020204" pitchFamily="34" charset="0"/>
+              <a:cs typeface="Arial" panose="020B0604020202020204" pitchFamily="34" charset="0"/>
             </a:endParaRPr>
+          </a:p>
+          <a:p>
+            <a:pPr marL="457200" lvl="1" indent="0" defTabSz="914400" fontAlgn="base">
+              <a:spcBef>
+                <a:spcPts val="600"/>
+              </a:spcBef>
+              <a:spcAft>
+                <a:spcPct val="0"/>
+              </a:spcAft>
+              <a:buClrTx/>
+              <a:buSzPct val="80000"/>
+              <a:buNone/>
+              <a:defRPr/>
+            </a:pPr>
+            <a:r>
+              <a:rPr lang="ru-RU" sz="2400" dirty="0">
+                <a:solidFill>
+                  <a:srgbClr val="1B75C7"/>
+                </a:solidFill>
+                <a:latin typeface="Arial" panose="020B0604020202020204" pitchFamily="34" charset="0"/>
+                <a:cs typeface="Arial" panose="020B0604020202020204" pitchFamily="34" charset="0"/>
+              </a:rPr>
+              <a:t>Дейности на </a:t>
+            </a:r>
+            <a:r>
+              <a:rPr lang="ru-RU" sz="2400" dirty="0" smtClean="0">
+                <a:solidFill>
+                  <a:srgbClr val="1B75C7"/>
+                </a:solidFill>
+                <a:latin typeface="Arial" panose="020B0604020202020204" pitchFamily="34" charset="0"/>
+                <a:cs typeface="Arial" panose="020B0604020202020204" pitchFamily="34" charset="0"/>
+              </a:rPr>
+              <a:t>администратора - въвеждане на:</a:t>
+            </a:r>
+          </a:p>
+          <a:p>
+            <a:pPr marL="457200" lvl="1" indent="0" defTabSz="914400" fontAlgn="base">
+              <a:spcBef>
+                <a:spcPts val="600"/>
+              </a:spcBef>
+              <a:spcAft>
+                <a:spcPct val="0"/>
+              </a:spcAft>
+              <a:buClrTx/>
+              <a:buSzPct val="80000"/>
+              <a:buNone/>
+              <a:defRPr/>
+            </a:pPr>
+            <a:endParaRPr lang="ru-RU" dirty="0">
+              <a:solidFill>
+                <a:srgbClr val="1B75C7"/>
+              </a:solidFill>
+              <a:latin typeface="Arial" panose="020B0604020202020204" pitchFamily="34" charset="0"/>
+              <a:cs typeface="Arial" panose="020B0604020202020204" pitchFamily="34" charset="0"/>
+            </a:endParaRPr>
+          </a:p>
+          <a:p>
+            <a:pPr marL="1063625" lvl="0" indent="-342900" defTabSz="914400" fontAlgn="base">
+              <a:spcBef>
+                <a:spcPct val="0"/>
+              </a:spcBef>
+              <a:spcAft>
+                <a:spcPct val="0"/>
+              </a:spcAft>
+              <a:buClrTx/>
+              <a:buSzTx/>
+              <a:buFont typeface="Wingdings" panose="05000000000000000000" pitchFamily="2" charset="2"/>
+              <a:buChar char="ü"/>
+            </a:pPr>
+            <a:r>
+              <a:rPr lang="bg-BG" sz="2000" dirty="0" smtClean="0">
+                <a:solidFill>
+                  <a:srgbClr val="1B75C7"/>
+                </a:solidFill>
+                <a:latin typeface="Arial" panose="020B0604020202020204" pitchFamily="34" charset="0"/>
+                <a:cs typeface="Arial" panose="020B0604020202020204" pitchFamily="34" charset="0"/>
+              </a:rPr>
+              <a:t>Учебните</a:t>
+            </a:r>
+            <a:r>
+              <a:rPr lang="en-US" sz="2000" dirty="0" smtClean="0">
+                <a:solidFill>
+                  <a:srgbClr val="1B75C7"/>
+                </a:solidFill>
+                <a:latin typeface="Arial" panose="020B0604020202020204" pitchFamily="34" charset="0"/>
+                <a:cs typeface="Arial" panose="020B0604020202020204" pitchFamily="34" charset="0"/>
+              </a:rPr>
+              <a:t> </a:t>
+            </a:r>
+            <a:r>
+              <a:rPr lang="bg-BG" sz="2000" dirty="0" smtClean="0">
+                <a:solidFill>
+                  <a:srgbClr val="1B75C7"/>
+                </a:solidFill>
+                <a:latin typeface="Arial" panose="020B0604020202020204" pitchFamily="34" charset="0"/>
+                <a:cs typeface="Arial" panose="020B0604020202020204" pitchFamily="34" charset="0"/>
+              </a:rPr>
+              <a:t>срокове </a:t>
+            </a:r>
+            <a:r>
+              <a:rPr lang="bg-BG" sz="2000" dirty="0">
+                <a:solidFill>
+                  <a:srgbClr val="1B75C7"/>
+                </a:solidFill>
+                <a:latin typeface="Arial" panose="020B0604020202020204" pitchFamily="34" charset="0"/>
+                <a:cs typeface="Arial" panose="020B0604020202020204" pitchFamily="34" charset="0"/>
+              </a:rPr>
+              <a:t>– </a:t>
+            </a:r>
+            <a:r>
+              <a:rPr lang="en-US" sz="2000" dirty="0">
+                <a:solidFill>
+                  <a:srgbClr val="1B75C7"/>
+                </a:solidFill>
+                <a:latin typeface="Arial" panose="020B0604020202020204" pitchFamily="34" charset="0"/>
+                <a:cs typeface="Arial" panose="020B0604020202020204" pitchFamily="34" charset="0"/>
+              </a:rPr>
+              <a:t>I </a:t>
+            </a:r>
+            <a:r>
+              <a:rPr lang="bg-BG" sz="2000" dirty="0">
+                <a:solidFill>
+                  <a:srgbClr val="1B75C7"/>
+                </a:solidFill>
+                <a:latin typeface="Arial" panose="020B0604020202020204" pitchFamily="34" charset="0"/>
+                <a:cs typeface="Arial" panose="020B0604020202020204" pitchFamily="34" charset="0"/>
+              </a:rPr>
+              <a:t>срок, </a:t>
+            </a:r>
+            <a:r>
+              <a:rPr lang="en-US" sz="2000" dirty="0">
+                <a:solidFill>
+                  <a:srgbClr val="1B75C7"/>
+                </a:solidFill>
+                <a:latin typeface="Arial" panose="020B0604020202020204" pitchFamily="34" charset="0"/>
+                <a:cs typeface="Arial" panose="020B0604020202020204" pitchFamily="34" charset="0"/>
+              </a:rPr>
+              <a:t>II</a:t>
+            </a:r>
+            <a:r>
+              <a:rPr lang="bg-BG" sz="2000" dirty="0">
+                <a:solidFill>
+                  <a:srgbClr val="1B75C7"/>
+                </a:solidFill>
+                <a:latin typeface="Arial" panose="020B0604020202020204" pitchFamily="34" charset="0"/>
+                <a:cs typeface="Arial" panose="020B0604020202020204" pitchFamily="34" charset="0"/>
+              </a:rPr>
+              <a:t> срок и за </a:t>
+            </a:r>
+            <a:r>
+              <a:rPr lang="bg-BG" sz="2000" dirty="0" smtClean="0">
+                <a:solidFill>
+                  <a:srgbClr val="1B75C7"/>
+                </a:solidFill>
+                <a:latin typeface="Arial" panose="020B0604020202020204" pitchFamily="34" charset="0"/>
+                <a:cs typeface="Arial" panose="020B0604020202020204" pitchFamily="34" charset="0"/>
+              </a:rPr>
+              <a:t>годината;</a:t>
+            </a:r>
+            <a:endParaRPr lang="bg-BG" sz="2000" dirty="0">
+              <a:solidFill>
+                <a:srgbClr val="1B75C7"/>
+              </a:solidFill>
+              <a:latin typeface="Arial" panose="020B0604020202020204" pitchFamily="34" charset="0"/>
+              <a:cs typeface="Arial" panose="020B0604020202020204" pitchFamily="34" charset="0"/>
+            </a:endParaRPr>
+          </a:p>
+          <a:p>
+            <a:pPr marL="1063625" lvl="0" indent="-342900" defTabSz="914400" fontAlgn="base">
+              <a:spcBef>
+                <a:spcPct val="0"/>
+              </a:spcBef>
+              <a:spcAft>
+                <a:spcPct val="0"/>
+              </a:spcAft>
+              <a:buClrTx/>
+              <a:buSzTx/>
+              <a:buFont typeface="Wingdings" panose="05000000000000000000" pitchFamily="2" charset="2"/>
+              <a:buChar char="ü"/>
+            </a:pPr>
+            <a:r>
+              <a:rPr lang="bg-BG" sz="2000" dirty="0">
+                <a:solidFill>
+                  <a:srgbClr val="1B75C7"/>
+                </a:solidFill>
+                <a:latin typeface="Arial" panose="020B0604020202020204" pitchFamily="34" charset="0"/>
+                <a:cs typeface="Arial" panose="020B0604020202020204" pitchFamily="34" charset="0"/>
+              </a:rPr>
+              <a:t>Вид отсъствия – </a:t>
+            </a:r>
+            <a:r>
+              <a:rPr lang="bg-BG" sz="2000" dirty="0" smtClean="0">
+                <a:solidFill>
+                  <a:srgbClr val="1B75C7"/>
+                </a:solidFill>
+                <a:latin typeface="Arial" panose="020B0604020202020204" pitchFamily="34" charset="0"/>
+                <a:cs typeface="Arial" panose="020B0604020202020204" pitchFamily="34" charset="0"/>
+              </a:rPr>
+              <a:t>извинени/неизвинени;</a:t>
+            </a:r>
+            <a:endParaRPr lang="bg-BG" sz="2000" dirty="0">
+              <a:solidFill>
+                <a:srgbClr val="1B75C7"/>
+              </a:solidFill>
+              <a:latin typeface="Arial" panose="020B0604020202020204" pitchFamily="34" charset="0"/>
+              <a:cs typeface="Arial" panose="020B0604020202020204" pitchFamily="34" charset="0"/>
+            </a:endParaRPr>
+          </a:p>
+          <a:p>
+            <a:pPr marL="1063625" lvl="0" indent="-342900" defTabSz="914400" fontAlgn="base">
+              <a:spcBef>
+                <a:spcPct val="0"/>
+              </a:spcBef>
+              <a:spcAft>
+                <a:spcPct val="0"/>
+              </a:spcAft>
+              <a:buClrTx/>
+              <a:buSzTx/>
+              <a:buFont typeface="Wingdings" panose="05000000000000000000" pitchFamily="2" charset="2"/>
+              <a:buChar char="ü"/>
+            </a:pPr>
+            <a:r>
+              <a:rPr lang="bg-BG" sz="2000" dirty="0">
+                <a:solidFill>
+                  <a:srgbClr val="1B75C7"/>
+                </a:solidFill>
+                <a:latin typeface="Arial" panose="020B0604020202020204" pitchFamily="34" charset="0"/>
+                <a:cs typeface="Arial" panose="020B0604020202020204" pitchFamily="34" charset="0"/>
+              </a:rPr>
+              <a:t>Настоящата учебна </a:t>
+            </a:r>
+            <a:r>
+              <a:rPr lang="bg-BG" sz="2000" dirty="0" smtClean="0">
+                <a:solidFill>
+                  <a:srgbClr val="1B75C7"/>
+                </a:solidFill>
+                <a:latin typeface="Arial" panose="020B0604020202020204" pitchFamily="34" charset="0"/>
+                <a:cs typeface="Arial" panose="020B0604020202020204" pitchFamily="34" charset="0"/>
+              </a:rPr>
+              <a:t>година;</a:t>
+            </a:r>
+            <a:endParaRPr lang="bg-BG" sz="2000" dirty="0">
+              <a:solidFill>
+                <a:srgbClr val="1B75C7"/>
+              </a:solidFill>
+              <a:latin typeface="Arial" panose="020B0604020202020204" pitchFamily="34" charset="0"/>
+              <a:cs typeface="Arial" panose="020B0604020202020204" pitchFamily="34" charset="0"/>
+            </a:endParaRPr>
+          </a:p>
+          <a:p>
+            <a:pPr marL="1063625" lvl="0" indent="-342900" defTabSz="914400" fontAlgn="base">
+              <a:spcBef>
+                <a:spcPct val="0"/>
+              </a:spcBef>
+              <a:spcAft>
+                <a:spcPct val="0"/>
+              </a:spcAft>
+              <a:buClrTx/>
+              <a:buSzTx/>
+              <a:buFont typeface="Wingdings" panose="05000000000000000000" pitchFamily="2" charset="2"/>
+              <a:buChar char="ü"/>
+            </a:pPr>
+            <a:r>
+              <a:rPr lang="bg-BG" sz="2000" dirty="0">
+                <a:solidFill>
+                  <a:srgbClr val="1B75C7"/>
+                </a:solidFill>
+                <a:latin typeface="Arial" panose="020B0604020202020204" pitchFamily="34" charset="0"/>
+                <a:cs typeface="Arial" panose="020B0604020202020204" pitchFamily="34" charset="0"/>
+              </a:rPr>
+              <a:t>Всички учебни предмети, съгласно учебните планове на министерството на </a:t>
+            </a:r>
+            <a:r>
+              <a:rPr lang="bg-BG" sz="2000" dirty="0" smtClean="0">
+                <a:solidFill>
+                  <a:srgbClr val="1B75C7"/>
+                </a:solidFill>
+                <a:latin typeface="Arial" panose="020B0604020202020204" pitchFamily="34" charset="0"/>
+                <a:cs typeface="Arial" panose="020B0604020202020204" pitchFamily="34" charset="0"/>
+              </a:rPr>
+              <a:t>образованието;</a:t>
+            </a:r>
+            <a:endParaRPr lang="bg-BG" sz="2000" dirty="0">
+              <a:solidFill>
+                <a:srgbClr val="1B75C7"/>
+              </a:solidFill>
+              <a:latin typeface="Arial" panose="020B0604020202020204" pitchFamily="34" charset="0"/>
+              <a:cs typeface="Arial" panose="020B0604020202020204" pitchFamily="34" charset="0"/>
+            </a:endParaRPr>
+          </a:p>
+          <a:p>
+            <a:pPr marL="1063625" lvl="0" indent="-342900" defTabSz="914400" fontAlgn="base">
+              <a:spcBef>
+                <a:spcPct val="0"/>
+              </a:spcBef>
+              <a:spcAft>
+                <a:spcPct val="0"/>
+              </a:spcAft>
+              <a:buClrTx/>
+              <a:buSzTx/>
+              <a:buFont typeface="Wingdings" panose="05000000000000000000" pitchFamily="2" charset="2"/>
+              <a:buChar char="ü"/>
+            </a:pPr>
+            <a:r>
+              <a:rPr lang="bg-BG" sz="2000" dirty="0">
+                <a:solidFill>
+                  <a:srgbClr val="1B75C7"/>
+                </a:solidFill>
+                <a:latin typeface="Arial" panose="020B0604020202020204" pitchFamily="34" charset="0"/>
+                <a:cs typeface="Arial" panose="020B0604020202020204" pitchFamily="34" charset="0"/>
+              </a:rPr>
+              <a:t>Типа </a:t>
+            </a:r>
+            <a:r>
+              <a:rPr lang="bg-BG" sz="2000" dirty="0" smtClean="0">
+                <a:solidFill>
+                  <a:srgbClr val="1B75C7"/>
+                </a:solidFill>
+                <a:latin typeface="Arial" panose="020B0604020202020204" pitchFamily="34" charset="0"/>
+                <a:cs typeface="Arial" panose="020B0604020202020204" pitchFamily="34" charset="0"/>
+              </a:rPr>
+              <a:t>на тези </a:t>
+            </a:r>
+            <a:r>
+              <a:rPr lang="bg-BG" sz="2000" dirty="0">
+                <a:solidFill>
+                  <a:srgbClr val="1B75C7"/>
+                </a:solidFill>
+                <a:latin typeface="Arial" panose="020B0604020202020204" pitchFamily="34" charset="0"/>
+                <a:cs typeface="Arial" panose="020B0604020202020204" pitchFamily="34" charset="0"/>
+              </a:rPr>
+              <a:t>учебните предмети – ЗП, ЗИП, ЗПП, СИП, </a:t>
+            </a:r>
+            <a:r>
+              <a:rPr lang="bg-BG" sz="2000" dirty="0" smtClean="0">
+                <a:solidFill>
+                  <a:srgbClr val="1B75C7"/>
+                </a:solidFill>
+                <a:latin typeface="Arial" panose="020B0604020202020204" pitchFamily="34" charset="0"/>
+                <a:cs typeface="Arial" panose="020B0604020202020204" pitchFamily="34" charset="0"/>
+              </a:rPr>
+              <a:t>ДЗИ;</a:t>
+            </a:r>
+            <a:endParaRPr lang="bg-BG" sz="2000" dirty="0">
+              <a:solidFill>
+                <a:srgbClr val="1B75C7"/>
+              </a:solidFill>
+              <a:latin typeface="Arial" panose="020B0604020202020204" pitchFamily="34" charset="0"/>
+              <a:cs typeface="Arial" panose="020B0604020202020204" pitchFamily="34" charset="0"/>
+            </a:endParaRPr>
+          </a:p>
+          <a:p>
+            <a:pPr marL="1063625" lvl="0" indent="-342900" defTabSz="914400" fontAlgn="base">
+              <a:spcBef>
+                <a:spcPct val="0"/>
+              </a:spcBef>
+              <a:spcAft>
+                <a:spcPct val="0"/>
+              </a:spcAft>
+              <a:buClrTx/>
+              <a:buSzTx/>
+              <a:buFont typeface="Wingdings" panose="05000000000000000000" pitchFamily="2" charset="2"/>
+              <a:buChar char="ü"/>
+            </a:pPr>
+            <a:r>
+              <a:rPr lang="bg-BG" sz="2000" dirty="0">
+                <a:solidFill>
+                  <a:srgbClr val="1B75C7"/>
+                </a:solidFill>
+                <a:latin typeface="Arial" panose="020B0604020202020204" pitchFamily="34" charset="0"/>
+                <a:cs typeface="Arial" panose="020B0604020202020204" pitchFamily="34" charset="0"/>
+              </a:rPr>
+              <a:t>Профилите на </a:t>
+            </a:r>
+            <a:r>
+              <a:rPr lang="bg-BG" sz="2000" dirty="0" smtClean="0">
+                <a:solidFill>
+                  <a:srgbClr val="1B75C7"/>
+                </a:solidFill>
+                <a:latin typeface="Arial" panose="020B0604020202020204" pitchFamily="34" charset="0"/>
+                <a:cs typeface="Arial" panose="020B0604020202020204" pitchFamily="34" charset="0"/>
+              </a:rPr>
+              <a:t>паралелките;</a:t>
+            </a:r>
+          </a:p>
+          <a:p>
+            <a:pPr marL="1063625" lvl="0" indent="-342900" defTabSz="914400" fontAlgn="base">
+              <a:spcBef>
+                <a:spcPct val="0"/>
+              </a:spcBef>
+              <a:spcAft>
+                <a:spcPct val="0"/>
+              </a:spcAft>
+              <a:buClrTx/>
+              <a:buSzTx/>
+              <a:buFont typeface="Wingdings" panose="05000000000000000000" pitchFamily="2" charset="2"/>
+              <a:buChar char="ü"/>
+            </a:pPr>
+            <a:r>
+              <a:rPr lang="bg-BG" sz="2000" dirty="0" smtClean="0">
+                <a:solidFill>
+                  <a:srgbClr val="1B75C7"/>
+                </a:solidFill>
+                <a:latin typeface="Arial" panose="020B0604020202020204" pitchFamily="34" charset="0"/>
+                <a:cs typeface="Arial" panose="020B0604020202020204" pitchFamily="34" charset="0"/>
+              </a:rPr>
+              <a:t>Преминаване от 9-ти </a:t>
+            </a:r>
+            <a:r>
+              <a:rPr lang="bg-BG" sz="2000" dirty="0">
+                <a:solidFill>
+                  <a:srgbClr val="1B75C7"/>
+                </a:solidFill>
+                <a:latin typeface="Arial" panose="020B0604020202020204" pitchFamily="34" charset="0"/>
+                <a:cs typeface="Arial" panose="020B0604020202020204" pitchFamily="34" charset="0"/>
+              </a:rPr>
+              <a:t>класове в </a:t>
+            </a:r>
+            <a:r>
+              <a:rPr lang="bg-BG" sz="2000" dirty="0" smtClean="0">
+                <a:solidFill>
+                  <a:srgbClr val="1B75C7"/>
+                </a:solidFill>
+                <a:latin typeface="Arial" panose="020B0604020202020204" pitchFamily="34" charset="0"/>
+                <a:cs typeface="Arial" panose="020B0604020202020204" pitchFamily="34" charset="0"/>
+              </a:rPr>
+              <a:t>10-ти и т.н.;</a:t>
+            </a:r>
+            <a:endParaRPr lang="bg-BG" sz="2000" dirty="0">
+              <a:solidFill>
+                <a:srgbClr val="1B75C7"/>
+              </a:solidFill>
+              <a:latin typeface="Arial" panose="020B0604020202020204" pitchFamily="34" charset="0"/>
+              <a:cs typeface="Arial" panose="020B0604020202020204" pitchFamily="34" charset="0"/>
+            </a:endParaRPr>
+          </a:p>
+          <a:p>
+            <a:pPr marL="1063625" lvl="0" indent="-342900" defTabSz="914400" fontAlgn="base">
+              <a:spcBef>
+                <a:spcPct val="0"/>
+              </a:spcBef>
+              <a:spcAft>
+                <a:spcPct val="0"/>
+              </a:spcAft>
+              <a:buClrTx/>
+              <a:buSzTx/>
+              <a:buFont typeface="Wingdings" panose="05000000000000000000" pitchFamily="2" charset="2"/>
+              <a:buChar char="ü"/>
+            </a:pPr>
+            <a:r>
+              <a:rPr lang="bg-BG" sz="2000" dirty="0">
+                <a:solidFill>
+                  <a:srgbClr val="1B75C7"/>
+                </a:solidFill>
+                <a:latin typeface="Arial" panose="020B0604020202020204" pitchFamily="34" charset="0"/>
+                <a:cs typeface="Arial" panose="020B0604020202020204" pitchFamily="34" charset="0"/>
+              </a:rPr>
+              <a:t>Имената на учениците от тези </a:t>
+            </a:r>
+            <a:r>
+              <a:rPr lang="bg-BG" sz="2000" dirty="0" smtClean="0">
+                <a:solidFill>
+                  <a:srgbClr val="1B75C7"/>
+                </a:solidFill>
+                <a:latin typeface="Arial" panose="020B0604020202020204" pitchFamily="34" charset="0"/>
+                <a:cs typeface="Arial" panose="020B0604020202020204" pitchFamily="34" charset="0"/>
+              </a:rPr>
+              <a:t>класове;</a:t>
+            </a:r>
+            <a:endParaRPr lang="bg-BG" sz="2000" dirty="0">
+              <a:solidFill>
+                <a:srgbClr val="1B75C7"/>
+              </a:solidFill>
+              <a:latin typeface="Arial" panose="020B0604020202020204" pitchFamily="34" charset="0"/>
+              <a:cs typeface="Arial" panose="020B0604020202020204" pitchFamily="34" charset="0"/>
+            </a:endParaRPr>
+          </a:p>
+          <a:p>
+            <a:pPr marL="1063625" lvl="0" indent="-342900" defTabSz="914400" fontAlgn="base">
+              <a:spcBef>
+                <a:spcPct val="0"/>
+              </a:spcBef>
+              <a:spcAft>
+                <a:spcPct val="0"/>
+              </a:spcAft>
+              <a:buClrTx/>
+              <a:buSzTx/>
+              <a:buFont typeface="Wingdings" panose="05000000000000000000" pitchFamily="2" charset="2"/>
+              <a:buChar char="ü"/>
+            </a:pPr>
+            <a:r>
+              <a:rPr lang="bg-BG" sz="2000" dirty="0">
+                <a:solidFill>
+                  <a:srgbClr val="1B75C7"/>
+                </a:solidFill>
+                <a:latin typeface="Arial" panose="020B0604020202020204" pitchFamily="34" charset="0"/>
+                <a:cs typeface="Arial" panose="020B0604020202020204" pitchFamily="34" charset="0"/>
+              </a:rPr>
+              <a:t>Данните на </a:t>
+            </a:r>
+            <a:r>
+              <a:rPr lang="bg-BG" sz="2000" dirty="0" smtClean="0">
+                <a:solidFill>
+                  <a:srgbClr val="1B75C7"/>
+                </a:solidFill>
+                <a:latin typeface="Arial" panose="020B0604020202020204" pitchFamily="34" charset="0"/>
+                <a:cs typeface="Arial" panose="020B0604020202020204" pitchFamily="34" charset="0"/>
+              </a:rPr>
+              <a:t>учителите - </a:t>
+            </a:r>
+            <a:r>
+              <a:rPr lang="bg-BG" sz="2000" dirty="0">
+                <a:solidFill>
+                  <a:srgbClr val="1B75C7"/>
+                </a:solidFill>
+                <a:latin typeface="Arial" panose="020B0604020202020204" pitchFamily="34" charset="0"/>
+                <a:cs typeface="Arial" panose="020B0604020202020204" pitchFamily="34" charset="0"/>
+              </a:rPr>
+              <a:t>класни </a:t>
+            </a:r>
+            <a:r>
+              <a:rPr lang="bg-BG" sz="2000" dirty="0" smtClean="0">
+                <a:solidFill>
+                  <a:srgbClr val="1B75C7"/>
+                </a:solidFill>
+                <a:latin typeface="Arial" panose="020B0604020202020204" pitchFamily="34" charset="0"/>
+                <a:cs typeface="Arial" panose="020B0604020202020204" pitchFamily="34" charset="0"/>
+              </a:rPr>
+              <a:t>ръководители;</a:t>
+            </a:r>
+            <a:endParaRPr lang="bg-BG" sz="2000" dirty="0">
+              <a:solidFill>
+                <a:srgbClr val="1B75C7"/>
+              </a:solidFill>
+              <a:latin typeface="Arial" panose="020B0604020202020204" pitchFamily="34" charset="0"/>
+              <a:cs typeface="Arial" panose="020B0604020202020204" pitchFamily="34" charset="0"/>
+            </a:endParaRPr>
+          </a:p>
+          <a:p>
+            <a:pPr marL="1063625" lvl="0" indent="-342900" defTabSz="914400" fontAlgn="base">
+              <a:spcBef>
+                <a:spcPct val="0"/>
+              </a:spcBef>
+              <a:spcAft>
+                <a:spcPct val="0"/>
+              </a:spcAft>
+              <a:buClrTx/>
+              <a:buSzTx/>
+              <a:buFont typeface="Wingdings" panose="05000000000000000000" pitchFamily="2" charset="2"/>
+              <a:buChar char="ü"/>
+            </a:pPr>
+            <a:r>
+              <a:rPr lang="bg-BG" sz="2000" dirty="0">
+                <a:solidFill>
+                  <a:srgbClr val="1B75C7"/>
+                </a:solidFill>
+                <a:latin typeface="Arial" panose="020B0604020202020204" pitchFamily="34" charset="0"/>
+                <a:cs typeface="Arial" panose="020B0604020202020204" pitchFamily="34" charset="0"/>
+              </a:rPr>
+              <a:t>Названията на населените места (градове и села) от адресите на </a:t>
+            </a:r>
+            <a:r>
+              <a:rPr lang="bg-BG" sz="2000" dirty="0" smtClean="0">
+                <a:solidFill>
+                  <a:srgbClr val="1B75C7"/>
+                </a:solidFill>
+                <a:latin typeface="Arial" panose="020B0604020202020204" pitchFamily="34" charset="0"/>
+                <a:cs typeface="Arial" panose="020B0604020202020204" pitchFamily="34" charset="0"/>
+              </a:rPr>
+              <a:t>учениците;</a:t>
+            </a:r>
+            <a:endParaRPr lang="bg-BG" sz="2000" dirty="0">
+              <a:solidFill>
+                <a:srgbClr val="1B75C7"/>
+              </a:solidFill>
+              <a:latin typeface="Arial" panose="020B0604020202020204" pitchFamily="34" charset="0"/>
+              <a:cs typeface="Arial" panose="020B0604020202020204" pitchFamily="34" charset="0"/>
+            </a:endParaRPr>
+          </a:p>
+          <a:p>
+            <a:endParaRPr lang="bg-BG" dirty="0"/>
           </a:p>
         </p:txBody>
       </p:sp>
     </p:spTree>
     <p:extLst>
       <p:ext uri="{BB962C8B-B14F-4D97-AF65-F5344CB8AC3E}">
-        <p14:creationId xmlns:p14="http://schemas.microsoft.com/office/powerpoint/2010/main" val="243558547"/>
+        <p14:creationId xmlns:p14="http://schemas.microsoft.com/office/powerpoint/2010/main" val="1211743575"/>
       </p:ext>
     </p:extLst>
   </p:cSld>
   <p:clrMapOvr>
-    <a:overrideClrMapping bg1="lt1" tx1="dk1" bg2="lt2" tx2="dk2" accent1="accent1" accent2="accent2" accent3="accent3" accent4="accent4" accent5="accent5" accent6="accent6" hlink="hlink" folHlink="folHlink"/>
+    <a:masterClrMapping/>
   </p:clrMapOvr>
+  <p:timing>
+    <p:tnLst>
+      <p:par>
+        <p:cTn id="1" dur="indefinite" restart="never" nodeType="tmRoot"/>
+      </p:par>
+    </p:tnLst>
+  </p:timing>
 </p:sld>
 </file>
 
 <file path=ppt/slides/slide9.xml><?xml version="1.0" encoding="utf-8"?>
 <p:sld xmlns:a="http://schemas.openxmlformats.org/drawingml/2006/main" xmlns:r="http://schemas.openxmlformats.org/officeDocument/2006/relationships" xmlns:p="http://schemas.openxmlformats.org/presentationml/2006/main">
   <p:cSld>
-    <p:bg>
-      <p:bgRef idx="1003">
-        <a:schemeClr val="bg2"/>
-      </p:bgRef>
-    </p:bg>
     <p:spTree>
       <p:nvGrpSpPr>
         <p:cNvPr id="1" name=""/>
@@ -26204,8 +27649,34 @@
         </p:nvSpPr>
         <p:spPr>
           <a:xfrm>
-            <a:off x="1367366" y="228600"/>
-            <a:ext cx="7315200" cy="838199"/>
+            <a:off x="982133" y="457201"/>
+            <a:ext cx="7704667" cy="761999"/>
+          </a:xfrm>
+        </p:spPr>
+        <p:txBody>
+          <a:bodyPr>
+            <a:noAutofit/>
+          </a:bodyPr>
+          <a:lstStyle/>
+          <a:p>
+            <a:endParaRPr lang="bg-BG" sz="4800" dirty="0"/>
+          </a:p>
+        </p:txBody>
+      </p:sp>
+      <p:sp>
+        <p:nvSpPr>
+          <p:cNvPr id="3" name="Content Placeholder 2"/>
+          <p:cNvSpPr>
+            <a:spLocks noGrp="1"/>
+          </p:cNvSpPr>
+          <p:nvPr>
+            <p:ph idx="1"/>
+          </p:nvPr>
+        </p:nvSpPr>
+        <p:spPr>
+          <a:xfrm>
+            <a:off x="982133" y="1447800"/>
+            <a:ext cx="7704667" cy="4552016"/>
           </a:xfrm>
         </p:spPr>
         <p:txBody>
@@ -26214,189 +27685,220 @@
           </a:bodyPr>
           <a:lstStyle/>
           <a:p>
-            <a:r>
-              <a:rPr lang="bg-BG" sz="4800" dirty="0">
-                <a:ln w="3175" cmpd="sng">
-                  <a:solidFill>
-                    <a:schemeClr val="tx2">
-                      <a:lumMod val="50000"/>
-                      <a:lumOff val="50000"/>
-                    </a:schemeClr>
-                  </a:solidFill>
-                </a:ln>
-                <a:solidFill>
-                  <a:srgbClr val="4094E0"/>
-                </a:solidFill>
-                <a:effectLst>
-                  <a:outerShdw blurRad="38100" dist="38100" dir="2700000" algn="tl">
-                    <a:srgbClr val="000000">
-                      <a:alpha val="43137"/>
-                    </a:srgbClr>
-                  </a:outerShdw>
-                </a:effectLst>
+            <a:pPr marL="720725" indent="0" defTabSz="914400" fontAlgn="base">
+              <a:spcBef>
+                <a:spcPct val="0"/>
+              </a:spcBef>
+              <a:spcAft>
+                <a:spcPct val="0"/>
+              </a:spcAft>
+              <a:buClrTx/>
+              <a:buSzTx/>
+              <a:buNone/>
+            </a:pPr>
+            <a:r>
+              <a:rPr lang="ru-RU" sz="3000" dirty="0">
+                <a:solidFill>
+                  <a:srgbClr val="1B75C7"/>
+                </a:solidFill>
+                <a:latin typeface="Arial" panose="020B0604020202020204" pitchFamily="34" charset="0"/>
+                <a:cs typeface="Arial" panose="020B0604020202020204" pitchFamily="34" charset="0"/>
               </a:rPr>
-              <a:t>Заключение</a:t>
-            </a:r>
-          </a:p>
-        </p:txBody>
-      </p:sp>
-      <p:sp>
-        <p:nvSpPr>
-          <p:cNvPr id="3" name="Content Placeholder 2"/>
-          <p:cNvSpPr>
-            <a:spLocks noGrp="1"/>
-          </p:cNvSpPr>
-          <p:nvPr>
-            <p:ph idx="1"/>
-          </p:nvPr>
-        </p:nvSpPr>
-        <p:spPr>
-          <a:xfrm>
-            <a:off x="1600200" y="1066799"/>
-            <a:ext cx="7467600" cy="5562601"/>
-          </a:xfrm>
-        </p:spPr>
-        <p:txBody>
-          <a:bodyPr>
-            <a:noAutofit/>
-          </a:bodyPr>
-          <a:lstStyle/>
-          <a:p>
-            <a:pPr marL="0" indent="0">
-              <a:buNone/>
+              <a:t>Дейности на класния ръководител:</a:t>
+            </a:r>
+          </a:p>
+          <a:p>
+            <a:pPr marL="1063625" indent="-342900" defTabSz="914400" fontAlgn="base">
+              <a:spcBef>
+                <a:spcPct val="0"/>
+              </a:spcBef>
+              <a:spcAft>
+                <a:spcPct val="0"/>
+              </a:spcAft>
+              <a:buClrTx/>
+              <a:buSzTx/>
+              <a:buFont typeface="Wingdings" panose="05000000000000000000" pitchFamily="2" charset="2"/>
+              <a:buChar char="ü"/>
             </a:pPr>
-            <a:r>
-              <a:rPr lang="en-US" sz="2800" dirty="0">
-                <a:solidFill>
-                  <a:srgbClr val="1B75C7"/>
-                </a:solidFill>
-                <a:latin typeface="Arial" charset="0"/>
-                <a:cs typeface="Arial" charset="0"/>
-              </a:rPr>
-              <a:t>Прилож</a:t>
-            </a:r>
-            <a:r>
-              <a:rPr lang="bg-BG" sz="2800" dirty="0">
-                <a:solidFill>
-                  <a:srgbClr val="1B75C7"/>
-                </a:solidFill>
-                <a:latin typeface="Arial" charset="0"/>
-                <a:cs typeface="Arial" charset="0"/>
-              </a:rPr>
-              <a:t>ната програма</a:t>
-            </a:r>
-            <a:r>
-              <a:rPr lang="en-US" sz="2800" dirty="0">
-                <a:solidFill>
-                  <a:srgbClr val="1B75C7"/>
-                </a:solidFill>
-                <a:latin typeface="Arial" charset="0"/>
-                <a:cs typeface="Arial" charset="0"/>
-              </a:rPr>
-              <a:t> напълно автоматизира воденето на личния картон на </a:t>
-            </a:r>
-            <a:r>
-              <a:rPr lang="en-US" sz="2800" dirty="0" smtClean="0">
-                <a:solidFill>
-                  <a:srgbClr val="1B75C7"/>
-                </a:solidFill>
-                <a:latin typeface="Arial" charset="0"/>
-                <a:cs typeface="Arial" charset="0"/>
-              </a:rPr>
-              <a:t>ученика</a:t>
-            </a:r>
-            <a:r>
-              <a:rPr lang="bg-BG" sz="2800" dirty="0" smtClean="0">
-                <a:solidFill>
-                  <a:srgbClr val="1B75C7"/>
-                </a:solidFill>
-                <a:latin typeface="Arial" charset="0"/>
-                <a:cs typeface="Arial" charset="0"/>
-              </a:rPr>
-              <a:t>.</a:t>
-            </a:r>
-            <a:r>
-              <a:rPr lang="en-US" sz="2800" dirty="0" smtClean="0">
-                <a:solidFill>
-                  <a:srgbClr val="1B75C7"/>
-                </a:solidFill>
-                <a:latin typeface="Arial" charset="0"/>
-                <a:cs typeface="Arial" charset="0"/>
-              </a:rPr>
-              <a:t> </a:t>
-            </a:r>
-            <a:endParaRPr lang="bg-BG" sz="2800" dirty="0" smtClean="0">
+            <a:endParaRPr lang="ru-RU" sz="2900" dirty="0">
               <a:solidFill>
                 <a:srgbClr val="1B75C7"/>
               </a:solidFill>
-              <a:latin typeface="Arial" charset="0"/>
-              <a:cs typeface="Arial" charset="0"/>
+              <a:latin typeface="Arial" panose="020B0604020202020204" pitchFamily="34" charset="0"/>
+              <a:cs typeface="Arial" panose="020B0604020202020204" pitchFamily="34" charset="0"/>
             </a:endParaRPr>
           </a:p>
           <a:p>
-            <a:pPr marL="0" indent="0">
-              <a:buNone/>
+            <a:pPr marL="1063625" indent="-342900" defTabSz="914400" fontAlgn="base">
+              <a:spcBef>
+                <a:spcPct val="0"/>
+              </a:spcBef>
+              <a:spcAft>
+                <a:spcPct val="0"/>
+              </a:spcAft>
+              <a:buClrTx/>
+              <a:buSzTx/>
+              <a:buFont typeface="Wingdings" panose="05000000000000000000" pitchFamily="2" charset="2"/>
+              <a:buChar char="ü"/>
             </a:pPr>
             <a:r>
-              <a:rPr lang="en-US" sz="2800" dirty="0" smtClean="0">
+              <a:rPr lang="ru-RU" sz="2900" dirty="0" smtClean="0">
                 <a:solidFill>
                   <a:srgbClr val="1B75C7"/>
                 </a:solidFill>
-                <a:latin typeface="Arial" charset="0"/>
-                <a:cs typeface="Arial" charset="0"/>
+                <a:latin typeface="Arial" panose="020B0604020202020204" pitchFamily="34" charset="0"/>
+                <a:cs typeface="Arial" panose="020B0604020202020204" pitchFamily="34" charset="0"/>
               </a:rPr>
-              <a:t>Натрупаните </a:t>
-            </a:r>
-            <a:r>
-              <a:rPr lang="en-US" sz="2800" dirty="0">
+              <a:t> Въвеждане </a:t>
+            </a:r>
+            <a:r>
+              <a:rPr lang="ru-RU" sz="2900" dirty="0">
                 <a:solidFill>
                   <a:srgbClr val="1B75C7"/>
                 </a:solidFill>
-                <a:latin typeface="Arial" charset="0"/>
-                <a:cs typeface="Arial" charset="0"/>
+                <a:latin typeface="Arial" panose="020B0604020202020204" pitchFamily="34" charset="0"/>
+                <a:cs typeface="Arial" panose="020B0604020202020204" pitchFamily="34" charset="0"/>
               </a:rPr>
-              <a:t>в продължение на 4 години данни в базата се пренасят  автоматично, за да се изчислят окончателните оценки за дипломата.</a:t>
-            </a:r>
-            <a:r>
-              <a:rPr lang="bg-BG" sz="2800" dirty="0">
+              <a:t>на </a:t>
+            </a:r>
+            <a:r>
+              <a:rPr lang="ru-RU" sz="2900" dirty="0" smtClean="0">
                 <a:solidFill>
                   <a:srgbClr val="1B75C7"/>
                 </a:solidFill>
-                <a:latin typeface="Arial" charset="0"/>
-                <a:cs typeface="Arial" charset="0"/>
+                <a:latin typeface="Arial" panose="020B0604020202020204" pitchFamily="34" charset="0"/>
+                <a:cs typeface="Arial" panose="020B0604020202020204" pitchFamily="34" charset="0"/>
               </a:rPr>
-              <a:t> Тези данни могат да се използват като входни данни в програмата „АдминПро“, чрез която се разпечатват официално </a:t>
-            </a:r>
-            <a:r>
-              <a:rPr lang="bg-BG" sz="2800" dirty="0" smtClean="0">
+              <a:t>срочни и годишни оценки </a:t>
+            </a:r>
+            <a:r>
+              <a:rPr lang="ru-RU" sz="2900" dirty="0">
                 <a:solidFill>
                   <a:srgbClr val="1B75C7"/>
                 </a:solidFill>
-                <a:latin typeface="Arial" charset="0"/>
-                <a:cs typeface="Arial" charset="0"/>
+                <a:latin typeface="Arial" panose="020B0604020202020204" pitchFamily="34" charset="0"/>
+                <a:cs typeface="Arial" panose="020B0604020202020204" pitchFamily="34" charset="0"/>
               </a:rPr>
-              <a:t>дипломите за средно образование.</a:t>
-            </a:r>
-            <a:endParaRPr lang="bg-BG" sz="2800" dirty="0">
+              <a:t>по всички предмети  </a:t>
+            </a:r>
+            <a:r>
+              <a:rPr lang="ru-RU" sz="2900" dirty="0" smtClean="0">
+                <a:solidFill>
+                  <a:srgbClr val="1B75C7"/>
+                </a:solidFill>
+                <a:latin typeface="Arial" panose="020B0604020202020204" pitchFamily="34" charset="0"/>
+                <a:cs typeface="Arial" panose="020B0604020202020204" pitchFamily="34" charset="0"/>
+              </a:rPr>
+              <a:t>за учебната година, както и отсъствия;</a:t>
+            </a:r>
+          </a:p>
+          <a:p>
+            <a:pPr marL="1063625" indent="-342900" defTabSz="914400" fontAlgn="base">
+              <a:spcBef>
+                <a:spcPct val="0"/>
+              </a:spcBef>
+              <a:spcAft>
+                <a:spcPct val="0"/>
+              </a:spcAft>
+              <a:buClrTx/>
+              <a:buSzTx/>
+              <a:buFont typeface="Wingdings" panose="05000000000000000000" pitchFamily="2" charset="2"/>
+              <a:buChar char="ü"/>
+            </a:pPr>
+            <a:r>
+              <a:rPr lang="ru-RU" sz="2900" dirty="0" smtClean="0">
+                <a:solidFill>
+                  <a:srgbClr val="1B75C7"/>
+                </a:solidFill>
+                <a:latin typeface="Arial" panose="020B0604020202020204" pitchFamily="34" charset="0"/>
+                <a:cs typeface="Arial" panose="020B0604020202020204" pitchFamily="34" charset="0"/>
+              </a:rPr>
+              <a:t> Въвеждане на оценките от </a:t>
+            </a:r>
+            <a:r>
+              <a:rPr lang="ru-RU" sz="2900" dirty="0">
+                <a:solidFill>
+                  <a:srgbClr val="1B75C7"/>
+                </a:solidFill>
+                <a:latin typeface="Arial" panose="020B0604020202020204" pitchFamily="34" charset="0"/>
+                <a:cs typeface="Arial" panose="020B0604020202020204" pitchFamily="34" charset="0"/>
+              </a:rPr>
+              <a:t>успешно </a:t>
+            </a:r>
+            <a:r>
+              <a:rPr lang="ru-RU" sz="2900" dirty="0" smtClean="0">
+                <a:solidFill>
+                  <a:srgbClr val="1B75C7"/>
+                </a:solidFill>
+                <a:latin typeface="Arial" panose="020B0604020202020204" pitchFamily="34" charset="0"/>
+                <a:cs typeface="Arial" panose="020B0604020202020204" pitchFamily="34" charset="0"/>
+              </a:rPr>
+              <a:t>положените изпити от ДЗИ, при завършване на 12 клас; </a:t>
+            </a:r>
+            <a:endParaRPr lang="ru-RU" sz="2900" dirty="0">
               <a:solidFill>
                 <a:srgbClr val="1B75C7"/>
               </a:solidFill>
-              <a:latin typeface="Arial" charset="0"/>
-              <a:cs typeface="Arial" charset="0"/>
+              <a:latin typeface="Arial" panose="020B0604020202020204" pitchFamily="34" charset="0"/>
+              <a:cs typeface="Arial" panose="020B0604020202020204" pitchFamily="34" charset="0"/>
             </a:endParaRPr>
+          </a:p>
+          <a:p>
+            <a:pPr marL="1063625" indent="-342900" defTabSz="914400" fontAlgn="base">
+              <a:spcBef>
+                <a:spcPct val="0"/>
+              </a:spcBef>
+              <a:spcAft>
+                <a:spcPct val="0"/>
+              </a:spcAft>
+              <a:buClrTx/>
+              <a:buSzTx/>
+              <a:buFont typeface="Wingdings" panose="05000000000000000000" pitchFamily="2" charset="2"/>
+              <a:buChar char="ü"/>
+            </a:pPr>
+            <a:r>
+              <a:rPr lang="ru-RU" sz="2900" dirty="0" smtClean="0">
+                <a:solidFill>
+                  <a:srgbClr val="1B75C7"/>
+                </a:solidFill>
+                <a:latin typeface="Arial" panose="020B0604020202020204" pitchFamily="34" charset="0"/>
+                <a:cs typeface="Arial" panose="020B0604020202020204" pitchFamily="34" charset="0"/>
+              </a:rPr>
+              <a:t> Възможност </a:t>
+            </a:r>
+            <a:r>
+              <a:rPr lang="ru-RU" sz="2900" dirty="0">
+                <a:solidFill>
+                  <a:srgbClr val="1B75C7"/>
+                </a:solidFill>
+                <a:latin typeface="Arial" panose="020B0604020202020204" pitchFamily="34" charset="0"/>
+                <a:cs typeface="Arial" panose="020B0604020202020204" pitchFamily="34" charset="0"/>
+              </a:rPr>
+              <a:t>за промяна/редактиране на оценки.</a:t>
+            </a:r>
+          </a:p>
+          <a:p>
+            <a:endParaRPr lang="bg-BG" dirty="0"/>
           </a:p>
         </p:txBody>
       </p:sp>
     </p:spTree>
     <p:extLst>
       <p:ext uri="{BB962C8B-B14F-4D97-AF65-F5344CB8AC3E}">
-        <p14:creationId xmlns:p14="http://schemas.microsoft.com/office/powerpoint/2010/main" val="1961729163"/>
+        <p14:creationId xmlns:p14="http://schemas.microsoft.com/office/powerpoint/2010/main" val="3862014874"/>
       </p:ext>
     </p:extLst>
   </p:cSld>
   <p:clrMapOvr>
-    <a:overrideClrMapping bg1="lt1" tx1="dk1" bg2="lt2" tx2="dk2" accent1="accent1" accent2="accent2" accent3="accent3" accent4="accent4" accent5="accent5" accent6="accent6" hlink="hlink" folHlink="folHlink"/>
+    <a:masterClrMapping/>
   </p:clrMapOvr>
+  <p:timing>
+    <p:tnLst>
+      <p:par>
+        <p:cTn id="1" dur="indefinite" restart="never" nodeType="tmRoot"/>
+      </p:par>
+    </p:tnLst>
+  </p:timing>
 </p:sld>
 </file>
 

</xml_diff>